<commit_message>
Beginning the Wrap Up Process
I decided that instead of doing each chapter individually, I'd go through and write all of the questions, then all of the Josh's thoughts, ect.. So I'm in the process of doing that now. Should be working on figures (which is the last bit of the process) by the end of Wednesday.
</commit_message>
<xml_diff>
--- a/tex/figures/Induction/Figures.pptx
+++ b/tex/figures/Induction/Figures.pptx
@@ -5,7 +5,7 @@
     <p:sldMasterId id="2147483648" r:id="rId1"/>
   </p:sldMasterIdLst>
   <p:notesMasterIdLst>
-    <p:notesMasterId r:id="rId10"/>
+    <p:notesMasterId r:id="rId11"/>
   </p:notesMasterIdLst>
   <p:sldIdLst>
     <p:sldId id="271" r:id="rId2"/>
@@ -16,6 +16,7 @@
     <p:sldId id="302" r:id="rId7"/>
     <p:sldId id="303" r:id="rId8"/>
     <p:sldId id="305" r:id="rId9"/>
+    <p:sldId id="306" r:id="rId10"/>
   </p:sldIdLst>
   <p:sldSz cx="12192000" cy="6858000"/>
   <p:notesSz cx="6858000" cy="9144000"/>
@@ -122,6 +123,171 @@
 </p:presentation>
 </file>
 
+<file path=ppt/revisionInfo.xml><?xml version="1.0" encoding="utf-8"?>
+<p1510:revInfo xmlns:a="http://schemas.openxmlformats.org/drawingml/2006/main" xmlns:r="http://schemas.openxmlformats.org/officeDocument/2006/relationships" xmlns:p1510="http://schemas.microsoft.com/office/powerpoint/2015/10/main">
+  <p1510:revLst>
+    <p1510:client id="{5FAE5CB4-271D-42DA-9A38-56D21EB44C4E}" v="12" dt="2019-08-12T21:36:31.338"/>
+  </p1510:revLst>
+</p1510:revInfo>
+</file>
+
+<file path=ppt/changesInfos/changesInfo1.xml><?xml version="1.0" encoding="utf-8"?>
+<pc:chgInfo xmlns:a="http://schemas.openxmlformats.org/drawingml/2006/main" xmlns:r="http://schemas.openxmlformats.org/officeDocument/2006/relationships" xmlns:ac="http://schemas.microsoft.com/office/drawing/2013/main/command" xmlns:pc="http://schemas.microsoft.com/office/powerpoint/2013/main/command">
+  <pc:docChgLst>
+    <pc:chgData name="Joshua Rinaldo" userId="eeaa994f99e4e508" providerId="LiveId" clId="{5FAE5CB4-271D-42DA-9A38-56D21EB44C4E}"/>
+    <pc:docChg chg="custSel addSld modSld">
+      <pc:chgData name="Joshua Rinaldo" userId="eeaa994f99e4e508" providerId="LiveId" clId="{5FAE5CB4-271D-42DA-9A38-56D21EB44C4E}" dt="2019-08-12T21:36:41.945" v="26" actId="693"/>
+      <pc:docMkLst>
+        <pc:docMk/>
+      </pc:docMkLst>
+      <pc:sldChg chg="addSp delSp modSp add">
+        <pc:chgData name="Joshua Rinaldo" userId="eeaa994f99e4e508" providerId="LiveId" clId="{5FAE5CB4-271D-42DA-9A38-56D21EB44C4E}" dt="2019-08-12T21:36:41.945" v="26" actId="693"/>
+        <pc:sldMkLst>
+          <pc:docMk/>
+          <pc:sldMk cId="2804202308" sldId="306"/>
+        </pc:sldMkLst>
+        <pc:spChg chg="del">
+          <ac:chgData name="Joshua Rinaldo" userId="eeaa994f99e4e508" providerId="LiveId" clId="{5FAE5CB4-271D-42DA-9A38-56D21EB44C4E}" dt="2019-08-12T21:34:38.954" v="2" actId="478"/>
+          <ac:spMkLst>
+            <pc:docMk/>
+            <pc:sldMk cId="2804202308" sldId="306"/>
+            <ac:spMk id="2" creationId="{72EA427D-31CA-458D-B522-F6D1EF405E46}"/>
+          </ac:spMkLst>
+        </pc:spChg>
+        <pc:spChg chg="del">
+          <ac:chgData name="Joshua Rinaldo" userId="eeaa994f99e4e508" providerId="LiveId" clId="{5FAE5CB4-271D-42DA-9A38-56D21EB44C4E}" dt="2019-08-12T21:34:37.658" v="1" actId="478"/>
+          <ac:spMkLst>
+            <pc:docMk/>
+            <pc:sldMk cId="2804202308" sldId="306"/>
+            <ac:spMk id="3" creationId="{11AC38DD-E025-4668-A8E0-42BA61E2E8CD}"/>
+          </ac:spMkLst>
+        </pc:spChg>
+        <pc:spChg chg="add mod">
+          <ac:chgData name="Joshua Rinaldo" userId="eeaa994f99e4e508" providerId="LiveId" clId="{5FAE5CB4-271D-42DA-9A38-56D21EB44C4E}" dt="2019-08-12T21:36:22.953" v="24" actId="1076"/>
+          <ac:spMkLst>
+            <pc:docMk/>
+            <pc:sldMk cId="2804202308" sldId="306"/>
+            <ac:spMk id="19" creationId="{8F5578CA-58FF-4076-B30F-9B3E4591A002}"/>
+          </ac:spMkLst>
+        </pc:spChg>
+        <pc:cxnChg chg="add mod">
+          <ac:chgData name="Joshua Rinaldo" userId="eeaa994f99e4e508" providerId="LiveId" clId="{5FAE5CB4-271D-42DA-9A38-56D21EB44C4E}" dt="2019-08-12T21:35:57.724" v="18" actId="208"/>
+          <ac:cxnSpMkLst>
+            <pc:docMk/>
+            <pc:sldMk cId="2804202308" sldId="306"/>
+            <ac:cxnSpMk id="5" creationId="{64BA7913-C29C-4CF9-8F76-7ED98DA997C9}"/>
+          </ac:cxnSpMkLst>
+        </pc:cxnChg>
+        <pc:cxnChg chg="add mod">
+          <ac:chgData name="Joshua Rinaldo" userId="eeaa994f99e4e508" providerId="LiveId" clId="{5FAE5CB4-271D-42DA-9A38-56D21EB44C4E}" dt="2019-08-12T21:35:57.724" v="18" actId="208"/>
+          <ac:cxnSpMkLst>
+            <pc:docMk/>
+            <pc:sldMk cId="2804202308" sldId="306"/>
+            <ac:cxnSpMk id="6" creationId="{15775E8B-74CE-4CD8-A3D7-23BFDEDC9C36}"/>
+          </ac:cxnSpMkLst>
+        </pc:cxnChg>
+        <pc:cxnChg chg="add mod">
+          <ac:chgData name="Joshua Rinaldo" userId="eeaa994f99e4e508" providerId="LiveId" clId="{5FAE5CB4-271D-42DA-9A38-56D21EB44C4E}" dt="2019-08-12T21:35:57.724" v="18" actId="208"/>
+          <ac:cxnSpMkLst>
+            <pc:docMk/>
+            <pc:sldMk cId="2804202308" sldId="306"/>
+            <ac:cxnSpMk id="7" creationId="{37741DA9-D572-4A4A-B143-8546364949C2}"/>
+          </ac:cxnSpMkLst>
+        </pc:cxnChg>
+        <pc:cxnChg chg="add mod">
+          <ac:chgData name="Joshua Rinaldo" userId="eeaa994f99e4e508" providerId="LiveId" clId="{5FAE5CB4-271D-42DA-9A38-56D21EB44C4E}" dt="2019-08-12T21:35:57.724" v="18" actId="208"/>
+          <ac:cxnSpMkLst>
+            <pc:docMk/>
+            <pc:sldMk cId="2804202308" sldId="306"/>
+            <ac:cxnSpMk id="8" creationId="{8E6A6530-3762-4017-BE93-FBD7FA9A7D25}"/>
+          </ac:cxnSpMkLst>
+        </pc:cxnChg>
+        <pc:cxnChg chg="add mod">
+          <ac:chgData name="Joshua Rinaldo" userId="eeaa994f99e4e508" providerId="LiveId" clId="{5FAE5CB4-271D-42DA-9A38-56D21EB44C4E}" dt="2019-08-12T21:35:57.724" v="18" actId="208"/>
+          <ac:cxnSpMkLst>
+            <pc:docMk/>
+            <pc:sldMk cId="2804202308" sldId="306"/>
+            <ac:cxnSpMk id="9" creationId="{2705339F-1326-4F55-A974-99C8D48E8C56}"/>
+          </ac:cxnSpMkLst>
+        </pc:cxnChg>
+        <pc:cxnChg chg="add mod">
+          <ac:chgData name="Joshua Rinaldo" userId="eeaa994f99e4e508" providerId="LiveId" clId="{5FAE5CB4-271D-42DA-9A38-56D21EB44C4E}" dt="2019-08-12T21:35:57.724" v="18" actId="208"/>
+          <ac:cxnSpMkLst>
+            <pc:docMk/>
+            <pc:sldMk cId="2804202308" sldId="306"/>
+            <ac:cxnSpMk id="10" creationId="{5A6A1F3D-4115-477F-9B1D-DF5B6BFAAD77}"/>
+          </ac:cxnSpMkLst>
+        </pc:cxnChg>
+        <pc:cxnChg chg="add mod">
+          <ac:chgData name="Joshua Rinaldo" userId="eeaa994f99e4e508" providerId="LiveId" clId="{5FAE5CB4-271D-42DA-9A38-56D21EB44C4E}" dt="2019-08-12T21:35:57.724" v="18" actId="208"/>
+          <ac:cxnSpMkLst>
+            <pc:docMk/>
+            <pc:sldMk cId="2804202308" sldId="306"/>
+            <ac:cxnSpMk id="11" creationId="{8AA562E3-F431-429C-B29B-977EF5113395}"/>
+          </ac:cxnSpMkLst>
+        </pc:cxnChg>
+        <pc:cxnChg chg="add mod">
+          <ac:chgData name="Joshua Rinaldo" userId="eeaa994f99e4e508" providerId="LiveId" clId="{5FAE5CB4-271D-42DA-9A38-56D21EB44C4E}" dt="2019-08-12T21:35:57.724" v="18" actId="208"/>
+          <ac:cxnSpMkLst>
+            <pc:docMk/>
+            <pc:sldMk cId="2804202308" sldId="306"/>
+            <ac:cxnSpMk id="12" creationId="{85E65DEB-399C-4167-8E35-C856844D764E}"/>
+          </ac:cxnSpMkLst>
+        </pc:cxnChg>
+        <pc:cxnChg chg="add mod">
+          <ac:chgData name="Joshua Rinaldo" userId="eeaa994f99e4e508" providerId="LiveId" clId="{5FAE5CB4-271D-42DA-9A38-56D21EB44C4E}" dt="2019-08-12T21:35:57.724" v="18" actId="208"/>
+          <ac:cxnSpMkLst>
+            <pc:docMk/>
+            <pc:sldMk cId="2804202308" sldId="306"/>
+            <ac:cxnSpMk id="13" creationId="{51B2032A-70FD-46E4-8330-5B43A55BC25A}"/>
+          </ac:cxnSpMkLst>
+        </pc:cxnChg>
+        <pc:cxnChg chg="add mod">
+          <ac:chgData name="Joshua Rinaldo" userId="eeaa994f99e4e508" providerId="LiveId" clId="{5FAE5CB4-271D-42DA-9A38-56D21EB44C4E}" dt="2019-08-12T21:35:57.724" v="18" actId="208"/>
+          <ac:cxnSpMkLst>
+            <pc:docMk/>
+            <pc:sldMk cId="2804202308" sldId="306"/>
+            <ac:cxnSpMk id="14" creationId="{87273663-E154-45C6-A532-C9F2203A2DC9}"/>
+          </ac:cxnSpMkLst>
+        </pc:cxnChg>
+        <pc:cxnChg chg="add mod">
+          <ac:chgData name="Joshua Rinaldo" userId="eeaa994f99e4e508" providerId="LiveId" clId="{5FAE5CB4-271D-42DA-9A38-56D21EB44C4E}" dt="2019-08-12T21:35:57.724" v="18" actId="208"/>
+          <ac:cxnSpMkLst>
+            <pc:docMk/>
+            <pc:sldMk cId="2804202308" sldId="306"/>
+            <ac:cxnSpMk id="15" creationId="{8267661D-A991-40E5-919F-D37DE784A8D2}"/>
+          </ac:cxnSpMkLst>
+        </pc:cxnChg>
+        <pc:cxnChg chg="add mod">
+          <ac:chgData name="Joshua Rinaldo" userId="eeaa994f99e4e508" providerId="LiveId" clId="{5FAE5CB4-271D-42DA-9A38-56D21EB44C4E}" dt="2019-08-12T21:35:57.724" v="18" actId="208"/>
+          <ac:cxnSpMkLst>
+            <pc:docMk/>
+            <pc:sldMk cId="2804202308" sldId="306"/>
+            <ac:cxnSpMk id="16" creationId="{EDC19D22-0E0B-48F9-9A83-2263FFD3A594}"/>
+          </ac:cxnSpMkLst>
+        </pc:cxnChg>
+        <pc:cxnChg chg="add mod">
+          <ac:chgData name="Joshua Rinaldo" userId="eeaa994f99e4e508" providerId="LiveId" clId="{5FAE5CB4-271D-42DA-9A38-56D21EB44C4E}" dt="2019-08-12T21:36:07.011" v="20" actId="1076"/>
+          <ac:cxnSpMkLst>
+            <pc:docMk/>
+            <pc:sldMk cId="2804202308" sldId="306"/>
+            <ac:cxnSpMk id="18" creationId="{F3EAE365-63ED-4CAC-8405-41D971818B49}"/>
+          </ac:cxnSpMkLst>
+        </pc:cxnChg>
+        <pc:cxnChg chg="add mod">
+          <ac:chgData name="Joshua Rinaldo" userId="eeaa994f99e4e508" providerId="LiveId" clId="{5FAE5CB4-271D-42DA-9A38-56D21EB44C4E}" dt="2019-08-12T21:36:41.945" v="26" actId="693"/>
+          <ac:cxnSpMkLst>
+            <pc:docMk/>
+            <pc:sldMk cId="2804202308" sldId="306"/>
+            <ac:cxnSpMk id="21" creationId="{DD91B55B-1D32-44C6-AB61-8E03A37FE835}"/>
+          </ac:cxnSpMkLst>
+        </pc:cxnChg>
+      </pc:sldChg>
+    </pc:docChg>
+  </pc:docChgLst>
+</pc:chgInfo>
+</file>
+
 <file path=ppt/notesMasters/notesMaster1.xml><?xml version="1.0" encoding="utf-8"?>
 <p:notesMaster xmlns:a="http://schemas.openxmlformats.org/drawingml/2006/main" xmlns:r="http://schemas.openxmlformats.org/officeDocument/2006/relationships" xmlns:p="http://schemas.openxmlformats.org/presentationml/2006/main">
   <p:cSld>
@@ -204,7 +370,7 @@
           <a:p>
             <a:fld id="{FA15A6B2-55AC-CD4B-A1E6-BB01091FE9DC}" type="datetimeFigureOut">
               <a:rPr lang="en-US" smtClean="0"/>
-              <a:t>7/31/2019</a:t>
+              <a:t>8/12/2019</a:t>
             </a:fld>
             <a:endParaRPr lang="en-US"/>
           </a:p>
@@ -733,7 +899,7 @@
           <a:p>
             <a:fld id="{F7249F8D-641B-4CAF-BAE5-10524742F6F1}" type="datetimeFigureOut">
               <a:rPr lang="en-CA" smtClean="0"/>
-              <a:t>2019-07-31</a:t>
+              <a:t>2019-08-12</a:t>
             </a:fld>
             <a:endParaRPr lang="en-CA"/>
           </a:p>
@@ -903,7 +1069,7 @@
           <a:p>
             <a:fld id="{F7249F8D-641B-4CAF-BAE5-10524742F6F1}" type="datetimeFigureOut">
               <a:rPr lang="en-CA" smtClean="0"/>
-              <a:t>2019-07-31</a:t>
+              <a:t>2019-08-12</a:t>
             </a:fld>
             <a:endParaRPr lang="en-CA"/>
           </a:p>
@@ -1083,7 +1249,7 @@
           <a:p>
             <a:fld id="{F7249F8D-641B-4CAF-BAE5-10524742F6F1}" type="datetimeFigureOut">
               <a:rPr lang="en-CA" smtClean="0"/>
-              <a:t>2019-07-31</a:t>
+              <a:t>2019-08-12</a:t>
             </a:fld>
             <a:endParaRPr lang="en-CA"/>
           </a:p>
@@ -1253,7 +1419,7 @@
           <a:p>
             <a:fld id="{F7249F8D-641B-4CAF-BAE5-10524742F6F1}" type="datetimeFigureOut">
               <a:rPr lang="en-CA" smtClean="0"/>
-              <a:t>2019-07-31</a:t>
+              <a:t>2019-08-12</a:t>
             </a:fld>
             <a:endParaRPr lang="en-CA"/>
           </a:p>
@@ -1499,7 +1665,7 @@
           <a:p>
             <a:fld id="{F7249F8D-641B-4CAF-BAE5-10524742F6F1}" type="datetimeFigureOut">
               <a:rPr lang="en-CA" smtClean="0"/>
-              <a:t>2019-07-31</a:t>
+              <a:t>2019-08-12</a:t>
             </a:fld>
             <a:endParaRPr lang="en-CA"/>
           </a:p>
@@ -1731,7 +1897,7 @@
           <a:p>
             <a:fld id="{F7249F8D-641B-4CAF-BAE5-10524742F6F1}" type="datetimeFigureOut">
               <a:rPr lang="en-CA" smtClean="0"/>
-              <a:t>2019-07-31</a:t>
+              <a:t>2019-08-12</a:t>
             </a:fld>
             <a:endParaRPr lang="en-CA"/>
           </a:p>
@@ -2098,7 +2264,7 @@
           <a:p>
             <a:fld id="{F7249F8D-641B-4CAF-BAE5-10524742F6F1}" type="datetimeFigureOut">
               <a:rPr lang="en-CA" smtClean="0"/>
-              <a:t>2019-07-31</a:t>
+              <a:t>2019-08-12</a:t>
             </a:fld>
             <a:endParaRPr lang="en-CA"/>
           </a:p>
@@ -2216,7 +2382,7 @@
           <a:p>
             <a:fld id="{F7249F8D-641B-4CAF-BAE5-10524742F6F1}" type="datetimeFigureOut">
               <a:rPr lang="en-CA" smtClean="0"/>
-              <a:t>2019-07-31</a:t>
+              <a:t>2019-08-12</a:t>
             </a:fld>
             <a:endParaRPr lang="en-CA"/>
           </a:p>
@@ -2311,7 +2477,7 @@
           <a:p>
             <a:fld id="{F7249F8D-641B-4CAF-BAE5-10524742F6F1}" type="datetimeFigureOut">
               <a:rPr lang="en-CA" smtClean="0"/>
-              <a:t>2019-07-31</a:t>
+              <a:t>2019-08-12</a:t>
             </a:fld>
             <a:endParaRPr lang="en-CA"/>
           </a:p>
@@ -2588,7 +2754,7 @@
           <a:p>
             <a:fld id="{F7249F8D-641B-4CAF-BAE5-10524742F6F1}" type="datetimeFigureOut">
               <a:rPr lang="en-CA" smtClean="0"/>
-              <a:t>2019-07-31</a:t>
+              <a:t>2019-08-12</a:t>
             </a:fld>
             <a:endParaRPr lang="en-CA"/>
           </a:p>
@@ -2841,7 +3007,7 @@
           <a:p>
             <a:fld id="{F7249F8D-641B-4CAF-BAE5-10524742F6F1}" type="datetimeFigureOut">
               <a:rPr lang="en-CA" smtClean="0"/>
-              <a:t>2019-07-31</a:t>
+              <a:t>2019-08-12</a:t>
             </a:fld>
             <a:endParaRPr lang="en-CA"/>
           </a:p>
@@ -3054,7 +3220,7 @@
           <a:p>
             <a:fld id="{F7249F8D-641B-4CAF-BAE5-10524742F6F1}" type="datetimeFigureOut">
               <a:rPr lang="en-CA" smtClean="0"/>
-              <a:t>2019-07-31</a:t>
+              <a:t>2019-08-12</a:t>
             </a:fld>
             <a:endParaRPr lang="en-CA"/>
           </a:p>
@@ -12270,7 +12436,7 @@
                       </m:oMath>
                     </m:oMathPara>
                   </a14:m>
-                  <a:endParaRPr lang="en-US" sz="2000" dirty="0" smtClean="0">
+                  <a:endParaRPr lang="en-US" sz="2000" dirty="0">
                     <a:latin typeface="Arial" panose="020B0604020202020204" pitchFamily="34" charset="0"/>
                     <a:cs typeface="Arial" panose="020B0604020202020204" pitchFamily="34" charset="0"/>
                   </a:endParaRPr>
@@ -12358,7 +12524,7 @@
                       </m:oMath>
                     </m:oMathPara>
                   </a14:m>
-                  <a:endParaRPr lang="en-US" sz="2000" dirty="0" smtClean="0">
+                  <a:endParaRPr lang="en-US" sz="2000" dirty="0">
                     <a:latin typeface="Arial" panose="020B0604020202020204" pitchFamily="34" charset="0"/>
                     <a:cs typeface="Arial" panose="020B0604020202020204" pitchFamily="34" charset="0"/>
                   </a:endParaRPr>
@@ -12446,7 +12612,7 @@
                       </m:oMath>
                     </m:oMathPara>
                   </a14:m>
-                  <a:endParaRPr lang="en-US" sz="2000" dirty="0" smtClean="0">
+                  <a:endParaRPr lang="en-US" sz="2000" dirty="0">
                     <a:latin typeface="Arial" panose="020B0604020202020204" pitchFamily="34" charset="0"/>
                     <a:cs typeface="Arial" panose="020B0604020202020204" pitchFamily="34" charset="0"/>
                   </a:endParaRPr>
@@ -14150,7 +14316,7 @@
                       </m:oMath>
                     </m:oMathPara>
                   </a14:m>
-                  <a:endParaRPr lang="en-US" sz="2000" dirty="0" smtClean="0">
+                  <a:endParaRPr lang="en-US" sz="2000" dirty="0">
                     <a:solidFill>
                       <a:srgbClr val="FF0000"/>
                     </a:solidFill>
@@ -14260,7 +14426,7 @@
                       </m:oMath>
                     </m:oMathPara>
                   </a14:m>
-                  <a:endParaRPr lang="en-US" sz="2000" dirty="0" smtClean="0">
+                  <a:endParaRPr lang="en-US" sz="2000" dirty="0">
                     <a:solidFill>
                       <a:srgbClr val="FF0000"/>
                     </a:solidFill>
@@ -14446,7 +14612,7 @@
                       </m:oMath>
                     </m:oMathPara>
                   </a14:m>
-                  <a:endParaRPr lang="en-US" sz="2000" dirty="0" smtClean="0">
+                  <a:endParaRPr lang="en-US" sz="2000" dirty="0">
                     <a:latin typeface="Arial" panose="020B0604020202020204" pitchFamily="34" charset="0"/>
                     <a:cs typeface="Arial" panose="020B0604020202020204" pitchFamily="34" charset="0"/>
                   </a:endParaRPr>
@@ -14534,7 +14700,7 @@
                       </m:oMath>
                     </m:oMathPara>
                   </a14:m>
-                  <a:endParaRPr lang="en-US" sz="2000" dirty="0" smtClean="0">
+                  <a:endParaRPr lang="en-US" sz="2000" dirty="0">
                     <a:latin typeface="Arial" panose="020B0604020202020204" pitchFamily="34" charset="0"/>
                     <a:cs typeface="Arial" panose="020B0604020202020204" pitchFamily="34" charset="0"/>
                   </a:endParaRPr>
@@ -14792,7 +14958,7 @@
                       </m:oMath>
                     </m:oMathPara>
                   </a14:m>
-                  <a:endParaRPr lang="en-US" sz="2000" dirty="0" smtClean="0">
+                  <a:endParaRPr lang="en-US" sz="2000" dirty="0">
                     <a:latin typeface="Arial" panose="020B0604020202020204" pitchFamily="34" charset="0"/>
                     <a:cs typeface="Arial" panose="020B0604020202020204" pitchFamily="34" charset="0"/>
                   </a:endParaRPr>
@@ -14988,7 +15154,7 @@
                       </m:oMath>
                     </m:oMathPara>
                   </a14:m>
-                  <a:endParaRPr lang="en-US" sz="2000" dirty="0" smtClean="0">
+                  <a:endParaRPr lang="en-US" sz="2000" dirty="0">
                     <a:latin typeface="Arial" panose="020B0604020202020204" pitchFamily="34" charset="0"/>
                     <a:cs typeface="Arial" panose="020B0604020202020204" pitchFamily="34" charset="0"/>
                   </a:endParaRPr>
@@ -15184,7 +15350,7 @@
                       </m:oMath>
                     </m:oMathPara>
                   </a14:m>
-                  <a:endParaRPr lang="en-US" sz="2000" dirty="0" smtClean="0">
+                  <a:endParaRPr lang="en-US" sz="2000" dirty="0">
                     <a:latin typeface="Arial" panose="020B0604020202020204" pitchFamily="34" charset="0"/>
                     <a:cs typeface="Arial" panose="020B0604020202020204" pitchFamily="34" charset="0"/>
                   </a:endParaRPr>
@@ -15322,7 +15488,7 @@
                       </m:oMath>
                     </m:oMathPara>
                   </a14:m>
-                  <a:endParaRPr lang="en-US" sz="2000" dirty="0" smtClean="0">
+                  <a:endParaRPr lang="en-US" sz="2000" dirty="0">
                     <a:latin typeface="Arial" panose="020B0604020202020204" pitchFamily="34" charset="0"/>
                     <a:cs typeface="Arial" panose="020B0604020202020204" pitchFamily="34" charset="0"/>
                   </a:endParaRPr>
@@ -15410,7 +15576,7 @@
                       </m:oMath>
                     </m:oMathPara>
                   </a14:m>
-                  <a:endParaRPr lang="en-US" sz="2000" dirty="0" smtClean="0">
+                  <a:endParaRPr lang="en-US" sz="2000" dirty="0">
                     <a:latin typeface="Arial" panose="020B0604020202020204" pitchFamily="34" charset="0"/>
                     <a:cs typeface="Arial" panose="020B0604020202020204" pitchFamily="34" charset="0"/>
                   </a:endParaRPr>
@@ -15498,7 +15664,7 @@
                       </m:oMath>
                     </m:oMathPara>
                   </a14:m>
-                  <a:endParaRPr lang="en-US" sz="2000" dirty="0" smtClean="0">
+                  <a:endParaRPr lang="en-US" sz="2000" dirty="0">
                     <a:latin typeface="Arial" panose="020B0604020202020204" pitchFamily="34" charset="0"/>
                     <a:cs typeface="Arial" panose="020B0604020202020204" pitchFamily="34" charset="0"/>
                   </a:endParaRPr>
@@ -15656,7 +15822,7 @@
                       </m:oMath>
                     </m:oMathPara>
                   </a14:m>
-                  <a:endParaRPr lang="en-US" sz="2000" dirty="0" smtClean="0">
+                  <a:endParaRPr lang="en-US" sz="2000" dirty="0">
                     <a:latin typeface="Arial" panose="020B0604020202020204" pitchFamily="34" charset="0"/>
                     <a:cs typeface="Arial" panose="020B0604020202020204" pitchFamily="34" charset="0"/>
                   </a:endParaRPr>
@@ -25558,7 +25724,7 @@
                       </m:oMath>
                     </m:oMathPara>
                   </a14:m>
-                  <a:endParaRPr lang="en-US" sz="2800" dirty="0" smtClean="0">
+                  <a:endParaRPr lang="en-US" sz="2800" dirty="0">
                     <a:solidFill>
                       <a:srgbClr val="FF0000"/>
                     </a:solidFill>
@@ -25689,7 +25855,7 @@
                       </m:oMath>
                     </m:oMathPara>
                   </a14:m>
-                  <a:endParaRPr lang="en-US" sz="2800" dirty="0" smtClean="0">
+                  <a:endParaRPr lang="en-US" sz="2800" dirty="0">
                     <a:solidFill>
                       <a:schemeClr val="tx1"/>
                     </a:solidFill>
@@ -25860,7 +26026,7 @@
                       </m:oMath>
                     </m:oMathPara>
                   </a14:m>
-                  <a:endParaRPr lang="en-US" sz="2800" dirty="0" smtClean="0">
+                  <a:endParaRPr lang="en-US" sz="2800" dirty="0">
                     <a:solidFill>
                       <a:schemeClr val="tx1"/>
                     </a:solidFill>
@@ -25974,7 +26140,7 @@
                       </m:oMath>
                     </m:oMathPara>
                   </a14:m>
-                  <a:endParaRPr lang="en-US" sz="2800" dirty="0" smtClean="0">
+                  <a:endParaRPr lang="en-US" sz="2800" dirty="0">
                     <a:solidFill>
                       <a:schemeClr val="bg2">
                         <a:lumMod val="75000"/>
@@ -26103,7 +26269,7 @@
                       </m:oMath>
                     </m:oMathPara>
                   </a14:m>
-                  <a:endParaRPr lang="en-US" sz="2000" dirty="0" smtClean="0">
+                  <a:endParaRPr lang="en-US" sz="2000" dirty="0">
                     <a:latin typeface="Arial" panose="020B0604020202020204" pitchFamily="34" charset="0"/>
                     <a:cs typeface="Arial" panose="020B0604020202020204" pitchFamily="34" charset="0"/>
                   </a:endParaRPr>
@@ -26264,7 +26430,7 @@
                       </m:oMath>
                     </m:oMathPara>
                   </a14:m>
-                  <a:endParaRPr lang="en-US" sz="2800" dirty="0" smtClean="0">
+                  <a:endParaRPr lang="en-US" sz="2800" dirty="0">
                     <a:latin typeface="Arial" panose="020B0604020202020204" pitchFamily="34" charset="0"/>
                     <a:cs typeface="Arial" panose="020B0604020202020204" pitchFamily="34" charset="0"/>
                   </a:endParaRPr>
@@ -27042,7 +27208,7 @@
                           </m:oMath>
                         </m:oMathPara>
                       </a14:m>
-                      <a:endParaRPr lang="en-US" sz="2000" dirty="0" smtClean="0">
+                      <a:endParaRPr lang="en-US" sz="2000" dirty="0">
                         <a:solidFill>
                           <a:schemeClr val="bg2">
                             <a:lumMod val="75000"/>
@@ -27257,7 +27423,7 @@
                             </m:oMath>
                           </m:oMathPara>
                         </a14:m>
-                        <a:endParaRPr lang="en-US" sz="2000" dirty="0" smtClean="0">
+                        <a:endParaRPr lang="en-US" sz="2000" dirty="0">
                           <a:latin typeface="Arial" panose="020B0604020202020204" pitchFamily="34" charset="0"/>
                           <a:cs typeface="Arial" panose="020B0604020202020204" pitchFamily="34" charset="0"/>
                         </a:endParaRPr>
@@ -27345,7 +27511,7 @@
                             </m:oMath>
                           </m:oMathPara>
                         </a14:m>
-                        <a:endParaRPr lang="en-US" sz="2000" dirty="0" smtClean="0">
+                        <a:endParaRPr lang="en-US" sz="2000" dirty="0">
                           <a:latin typeface="Arial" panose="020B0604020202020204" pitchFamily="34" charset="0"/>
                           <a:cs typeface="Arial" panose="020B0604020202020204" pitchFamily="34" charset="0"/>
                         </a:endParaRPr>
@@ -27433,7 +27599,7 @@
                             </m:oMath>
                           </m:oMathPara>
                         </a14:m>
-                        <a:endParaRPr lang="en-US" sz="2000" dirty="0" smtClean="0">
+                        <a:endParaRPr lang="en-US" sz="2000" dirty="0">
                           <a:latin typeface="Arial" panose="020B0604020202020204" pitchFamily="34" charset="0"/>
                           <a:cs typeface="Arial" panose="020B0604020202020204" pitchFamily="34" charset="0"/>
                         </a:endParaRPr>
@@ -27571,7 +27737,7 @@
                           </m:oMath>
                         </m:oMathPara>
                       </a14:m>
-                      <a:endParaRPr lang="en-US" sz="2000" dirty="0" smtClean="0">
+                      <a:endParaRPr lang="en-US" sz="2000" dirty="0">
                         <a:latin typeface="Arial" panose="020B0604020202020204" pitchFamily="34" charset="0"/>
                         <a:cs typeface="Arial" panose="020B0604020202020204" pitchFamily="34" charset="0"/>
                       </a:endParaRPr>
@@ -27714,7 +27880,7 @@
                           </m:oMath>
                         </m:oMathPara>
                       </a14:m>
-                      <a:endParaRPr lang="en-US" sz="2000" dirty="0" smtClean="0">
+                      <a:endParaRPr lang="en-US" sz="2000" dirty="0">
                         <a:solidFill>
                           <a:srgbClr val="FF0000"/>
                         </a:solidFill>
@@ -27877,7 +28043,7 @@
                           </m:oMath>
                         </m:oMathPara>
                       </a14:m>
-                      <a:endParaRPr lang="en-US" sz="2000" dirty="0" smtClean="0">
+                      <a:endParaRPr lang="en-US" sz="2000" dirty="0">
                         <a:latin typeface="Arial" panose="020B0604020202020204" pitchFamily="34" charset="0"/>
                         <a:cs typeface="Arial" panose="020B0604020202020204" pitchFamily="34" charset="0"/>
                       </a:endParaRPr>
@@ -27965,7 +28131,7 @@
                           </m:oMath>
                         </m:oMathPara>
                       </a14:m>
-                      <a:endParaRPr lang="en-US" sz="2000" dirty="0" smtClean="0">
+                      <a:endParaRPr lang="en-US" sz="2000" dirty="0">
                         <a:latin typeface="Arial" panose="020B0604020202020204" pitchFamily="34" charset="0"/>
                         <a:cs typeface="Arial" panose="020B0604020202020204" pitchFamily="34" charset="0"/>
                       </a:endParaRPr>
@@ -28173,7 +28339,7 @@
                           </m:oMath>
                         </m:oMathPara>
                       </a14:m>
-                      <a:endParaRPr lang="en-US" sz="2000" dirty="0" smtClean="0">
+                      <a:endParaRPr lang="en-US" sz="2000" dirty="0">
                         <a:latin typeface="Arial" panose="020B0604020202020204" pitchFamily="34" charset="0"/>
                         <a:cs typeface="Arial" panose="020B0604020202020204" pitchFamily="34" charset="0"/>
                       </a:endParaRPr>
@@ -28317,7 +28483,7 @@
                           </m:oMath>
                         </m:oMathPara>
                       </a14:m>
-                      <a:endParaRPr lang="en-US" sz="2000" dirty="0" smtClean="0">
+                      <a:endParaRPr lang="en-US" sz="2000" dirty="0">
                         <a:latin typeface="Arial" panose="020B0604020202020204" pitchFamily="34" charset="0"/>
                         <a:cs typeface="Arial" panose="020B0604020202020204" pitchFamily="34" charset="0"/>
                       </a:endParaRPr>
@@ -28472,7 +28638,7 @@
                           </m:oMath>
                         </m:oMathPara>
                       </a14:m>
-                      <a:endParaRPr lang="en-US" sz="2000" dirty="0" smtClean="0">
+                      <a:endParaRPr lang="en-US" sz="2000" dirty="0">
                         <a:latin typeface="Arial" panose="020B0604020202020204" pitchFamily="34" charset="0"/>
                         <a:cs typeface="Arial" panose="020B0604020202020204" pitchFamily="34" charset="0"/>
                       </a:endParaRPr>
@@ -28579,7 +28745,7 @@
                           </m:oMath>
                         </m:oMathPara>
                       </a14:m>
-                      <a:endParaRPr lang="en-US" sz="2000" dirty="0" smtClean="0">
+                      <a:endParaRPr lang="en-US" sz="2000" dirty="0">
                         <a:solidFill>
                           <a:srgbClr val="FF0000"/>
                         </a:solidFill>
@@ -28855,7 +29021,7 @@
                           </m:oMath>
                         </m:oMathPara>
                       </a14:m>
-                      <a:endParaRPr lang="en-US" sz="2000" dirty="0" smtClean="0">
+                      <a:endParaRPr lang="en-US" sz="2000" dirty="0">
                         <a:latin typeface="Arial" panose="020B0604020202020204" pitchFamily="34" charset="0"/>
                         <a:cs typeface="Arial" panose="020B0604020202020204" pitchFamily="34" charset="0"/>
                       </a:endParaRPr>
@@ -28982,7 +29148,7 @@
                         </m:oMath>
                       </m:oMathPara>
                     </a14:m>
-                    <a:endParaRPr lang="en-US" sz="2000" dirty="0" smtClean="0">
+                    <a:endParaRPr lang="en-US" sz="2000" dirty="0">
                       <a:latin typeface="Arial" panose="020B0604020202020204" pitchFamily="34" charset="0"/>
                       <a:cs typeface="Arial" panose="020B0604020202020204" pitchFamily="34" charset="0"/>
                     </a:endParaRPr>
@@ -29108,7 +29274,7 @@
                         </m:oMath>
                       </m:oMathPara>
                     </a14:m>
-                    <a:endParaRPr lang="en-US" sz="2000" dirty="0" smtClean="0">
+                    <a:endParaRPr lang="en-US" sz="2000" dirty="0">
                       <a:latin typeface="Arial" panose="020B0604020202020204" pitchFamily="34" charset="0"/>
                       <a:cs typeface="Arial" panose="020B0604020202020204" pitchFamily="34" charset="0"/>
                     </a:endParaRPr>
@@ -29586,7 +29752,7 @@
                       </m:oMath>
                     </m:oMathPara>
                   </a14:m>
-                  <a:endParaRPr lang="en-US" sz="2000" dirty="0" smtClean="0">
+                  <a:endParaRPr lang="en-US" sz="2000" dirty="0">
                     <a:solidFill>
                       <a:schemeClr val="bg2">
                         <a:lumMod val="75000"/>
@@ -38019,7 +38185,7 @@
                           </m:oMath>
                         </m:oMathPara>
                       </a14:m>
-                      <a:endParaRPr lang="en-US" sz="2000" dirty="0" smtClean="0">
+                      <a:endParaRPr lang="en-US" sz="2000" dirty="0">
                         <a:latin typeface="Arial" panose="020B0604020202020204" pitchFamily="34" charset="0"/>
                         <a:cs typeface="Arial" panose="020B0604020202020204" pitchFamily="34" charset="0"/>
                       </a:endParaRPr>
@@ -38165,7 +38331,7 @@
                           </m:oMath>
                         </m:oMathPara>
                       </a14:m>
-                      <a:endParaRPr lang="en-US" sz="2000" dirty="0" smtClean="0">
+                      <a:endParaRPr lang="en-US" sz="2000" dirty="0">
                         <a:latin typeface="Arial" panose="020B0604020202020204" pitchFamily="34" charset="0"/>
                         <a:cs typeface="Arial" panose="020B0604020202020204" pitchFamily="34" charset="0"/>
                       </a:endParaRPr>
@@ -38266,7 +38432,7 @@
                           </m:oMath>
                         </m:oMathPara>
                       </a14:m>
-                      <a:endParaRPr lang="en-US" sz="2000" dirty="0" smtClean="0">
+                      <a:endParaRPr lang="en-US" sz="2000" dirty="0">
                         <a:latin typeface="Arial" panose="020B0604020202020204" pitchFamily="34" charset="0"/>
                         <a:cs typeface="Arial" panose="020B0604020202020204" pitchFamily="34" charset="0"/>
                       </a:endParaRPr>
@@ -38379,7 +38545,7 @@
                       </m:oMath>
                     </m:oMathPara>
                   </a14:m>
-                  <a:endParaRPr lang="en-US" sz="2800" dirty="0" smtClean="0">
+                  <a:endParaRPr lang="en-US" sz="2800" dirty="0">
                     <a:solidFill>
                       <a:schemeClr val="bg2">
                         <a:lumMod val="75000"/>
@@ -38496,7 +38662,7 @@
                     </m:oMath>
                   </m:oMathPara>
                 </a14:m>
-                <a:endParaRPr lang="en-US" sz="2800" dirty="0" smtClean="0">
+                <a:endParaRPr lang="en-US" sz="2800" dirty="0">
                   <a:solidFill>
                     <a:schemeClr val="bg2">
                       <a:lumMod val="75000"/>
@@ -43556,7 +43722,7 @@
                           </m:oMath>
                         </m:oMathPara>
                       </a14:m>
-                      <a:endParaRPr lang="en-US" sz="2000" dirty="0" smtClean="0">
+                      <a:endParaRPr lang="en-US" sz="2000" dirty="0">
                         <a:solidFill>
                           <a:schemeClr val="accent5"/>
                         </a:solidFill>
@@ -43885,7 +44051,7 @@
                         </m:oMath>
                       </m:oMathPara>
                     </a14:m>
-                    <a:endParaRPr lang="en-US" sz="2000" dirty="0" smtClean="0">
+                    <a:endParaRPr lang="en-US" sz="2000" dirty="0">
                       <a:latin typeface="Arial" panose="020B0604020202020204" pitchFamily="34" charset="0"/>
                       <a:cs typeface="Arial" panose="020B0604020202020204" pitchFamily="34" charset="0"/>
                     </a:endParaRPr>
@@ -43976,7 +44142,7 @@
                         </m:oMath>
                       </m:oMathPara>
                     </a14:m>
-                    <a:endParaRPr lang="en-US" sz="2000" dirty="0" smtClean="0">
+                    <a:endParaRPr lang="en-US" sz="2000" dirty="0">
                       <a:solidFill>
                         <a:srgbClr val="FF0000"/>
                       </a:solidFill>
@@ -44769,7 +44935,7 @@
                         </m:oMath>
                       </m:oMathPara>
                     </a14:m>
-                    <a:endParaRPr lang="en-US" sz="2000" dirty="0" smtClean="0">
+                    <a:endParaRPr lang="en-US" sz="2000" dirty="0">
                       <a:latin typeface="Arial" panose="020B0604020202020204" pitchFamily="34" charset="0"/>
                       <a:cs typeface="Arial" panose="020B0604020202020204" pitchFamily="34" charset="0"/>
                     </a:endParaRPr>
@@ -46009,7 +46175,7 @@
                         </m:oMath>
                       </m:oMathPara>
                     </a14:m>
-                    <a:endParaRPr lang="en-US" sz="2000" dirty="0" smtClean="0">
+                    <a:endParaRPr lang="en-US" sz="2000" dirty="0">
                       <a:latin typeface="Arial" panose="020B0604020202020204" pitchFamily="34" charset="0"/>
                       <a:cs typeface="Arial" panose="020B0604020202020204" pitchFamily="34" charset="0"/>
                     </a:endParaRPr>
@@ -46150,7 +46316,7 @@
                         </m:oMath>
                       </m:oMathPara>
                     </a14:m>
-                    <a:endParaRPr lang="en-US" sz="2000" dirty="0" smtClean="0">
+                    <a:endParaRPr lang="en-US" sz="2000" dirty="0">
                       <a:latin typeface="Arial" panose="020B0604020202020204" pitchFamily="34" charset="0"/>
                       <a:cs typeface="Arial" panose="020B0604020202020204" pitchFamily="34" charset="0"/>
                     </a:endParaRPr>
@@ -46252,7 +46418,7 @@
                         </m:oMath>
                       </m:oMathPara>
                     </a14:m>
-                    <a:endParaRPr lang="en-US" sz="2000" dirty="0" smtClean="0">
+                    <a:endParaRPr lang="en-US" sz="2000" dirty="0">
                       <a:latin typeface="Arial" panose="020B0604020202020204" pitchFamily="34" charset="0"/>
                       <a:cs typeface="Arial" panose="020B0604020202020204" pitchFamily="34" charset="0"/>
                     </a:endParaRPr>
@@ -46940,7 +47106,7 @@
                         </m:oMath>
                       </m:oMathPara>
                     </a14:m>
-                    <a:endParaRPr lang="en-US" sz="2000" dirty="0" smtClean="0">
+                    <a:endParaRPr lang="en-US" sz="2000" dirty="0">
                       <a:latin typeface="Arial" panose="020B0604020202020204" pitchFamily="34" charset="0"/>
                       <a:cs typeface="Arial" panose="020B0604020202020204" pitchFamily="34" charset="0"/>
                     </a:endParaRPr>
@@ -47041,7 +47207,7 @@
                         </m:oMath>
                       </m:oMathPara>
                     </a14:m>
-                    <a:endParaRPr lang="en-US" sz="2000" dirty="0" smtClean="0">
+                    <a:endParaRPr lang="en-US" sz="2000" dirty="0">
                       <a:latin typeface="Arial" panose="020B0604020202020204" pitchFamily="34" charset="0"/>
                       <a:cs typeface="Arial" panose="020B0604020202020204" pitchFamily="34" charset="0"/>
                     </a:endParaRPr>
@@ -47132,7 +47298,7 @@
                         </m:oMath>
                       </m:oMathPara>
                     </a14:m>
-                    <a:endParaRPr lang="en-US" sz="2000" dirty="0" smtClean="0">
+                    <a:endParaRPr lang="en-US" sz="2000" dirty="0">
                       <a:solidFill>
                         <a:srgbClr val="FF0000"/>
                       </a:solidFill>
@@ -47226,7 +47392,7 @@
                         </m:oMath>
                       </m:oMathPara>
                     </a14:m>
-                    <a:endParaRPr lang="en-US" sz="2000" dirty="0" smtClean="0">
+                    <a:endParaRPr lang="en-US" sz="2000" dirty="0">
                       <a:solidFill>
                         <a:srgbClr val="FF0000"/>
                       </a:solidFill>
@@ -47341,7 +47507,7 @@
                       </m:oMath>
                     </m:oMathPara>
                   </a14:m>
-                  <a:endParaRPr lang="en-US" sz="2800" dirty="0" smtClean="0">
+                  <a:endParaRPr lang="en-US" sz="2800" dirty="0">
                     <a:solidFill>
                       <a:schemeClr val="bg2">
                         <a:lumMod val="75000"/>
@@ -48904,8 +49070,8 @@
               </a:fontRef>
             </p:style>
           </p:cxnSp>
-          <mc:AlternateContent xmlns:mc="http://schemas.openxmlformats.org/markup-compatibility/2006">
-            <mc:Choice xmlns:a14="http://schemas.microsoft.com/office/drawing/2010/main" Requires="a14">
+          <mc:AlternateContent xmlns:mc="http://schemas.openxmlformats.org/markup-compatibility/2006" xmlns:a14="http://schemas.microsoft.com/office/drawing/2010/main">
+            <mc:Choice Requires="a14">
               <p:sp>
                 <p:nvSpPr>
                   <p:cNvPr id="55" name="TextBox 54"/>
@@ -48928,6 +49094,7 @@
                   </a:bodyPr>
                   <a:lstStyle/>
                   <a:p>
+                    <a:pPr/>
                     <a14:m>
                       <m:oMathPara xmlns:m="http://schemas.openxmlformats.org/officeDocument/2006/math">
                         <m:oMathParaPr>
@@ -48975,7 +49142,7 @@
                         </m:oMath>
                       </m:oMathPara>
                     </a14:m>
-                    <a:endParaRPr lang="en-US" sz="2000" dirty="0" smtClean="0">
+                    <a:endParaRPr lang="en-US" sz="2000" dirty="0">
                       <a:latin typeface="Arial" panose="020B0604020202020204" pitchFamily="34" charset="0"/>
                       <a:cs typeface="Arial" panose="020B0604020202020204" pitchFamily="34" charset="0"/>
                     </a:endParaRPr>
@@ -48983,7 +49150,7 @@
                 </p:txBody>
               </p:sp>
             </mc:Choice>
-            <mc:Fallback>
+            <mc:Fallback xmlns="">
               <p:sp>
                 <p:nvSpPr>
                   <p:cNvPr id="55" name="TextBox 54"/>
@@ -49022,8 +49189,8 @@
               </p:sp>
             </mc:Fallback>
           </mc:AlternateContent>
-          <mc:AlternateContent xmlns:mc="http://schemas.openxmlformats.org/markup-compatibility/2006">
-            <mc:Choice xmlns:a14="http://schemas.microsoft.com/office/drawing/2010/main" Requires="a14">
+          <mc:AlternateContent xmlns:mc="http://schemas.openxmlformats.org/markup-compatibility/2006" xmlns:a14="http://schemas.microsoft.com/office/drawing/2010/main">
+            <mc:Choice Requires="a14">
               <p:sp>
                 <p:nvSpPr>
                   <p:cNvPr id="56" name="TextBox 55"/>
@@ -49046,6 +49213,7 @@
                   </a:bodyPr>
                   <a:lstStyle/>
                   <a:p>
+                    <a:pPr/>
                     <a14:m>
                       <m:oMathPara xmlns:m="http://schemas.openxmlformats.org/officeDocument/2006/math">
                         <m:oMathParaPr>
@@ -49093,7 +49261,7 @@
                         </m:oMath>
                       </m:oMathPara>
                     </a14:m>
-                    <a:endParaRPr lang="en-US" sz="2000" dirty="0" smtClean="0">
+                    <a:endParaRPr lang="en-US" sz="2000" dirty="0">
                       <a:latin typeface="Arial" panose="020B0604020202020204" pitchFamily="34" charset="0"/>
                       <a:cs typeface="Arial" panose="020B0604020202020204" pitchFamily="34" charset="0"/>
                     </a:endParaRPr>
@@ -49101,7 +49269,7 @@
                 </p:txBody>
               </p:sp>
             </mc:Choice>
-            <mc:Fallback>
+            <mc:Fallback xmlns="">
               <p:sp>
                 <p:nvSpPr>
                   <p:cNvPr id="56" name="TextBox 55"/>
@@ -49140,8 +49308,8 @@
               </p:sp>
             </mc:Fallback>
           </mc:AlternateContent>
-          <mc:AlternateContent xmlns:mc="http://schemas.openxmlformats.org/markup-compatibility/2006">
-            <mc:Choice xmlns:a14="http://schemas.microsoft.com/office/drawing/2010/main" Requires="a14">
+          <mc:AlternateContent xmlns:mc="http://schemas.openxmlformats.org/markup-compatibility/2006" xmlns:a14="http://schemas.microsoft.com/office/drawing/2010/main">
+            <mc:Choice Requires="a14">
               <p:sp>
                 <p:nvSpPr>
                   <p:cNvPr id="57" name="TextBox 56"/>
@@ -49164,6 +49332,7 @@
                   </a:bodyPr>
                   <a:lstStyle/>
                   <a:p>
+                    <a:pPr/>
                     <a14:m>
                       <m:oMathPara xmlns:m="http://schemas.openxmlformats.org/officeDocument/2006/math">
                         <m:oMathParaPr>
@@ -49201,7 +49370,7 @@
                         </m:oMath>
                       </m:oMathPara>
                     </a14:m>
-                    <a:endParaRPr lang="en-US" sz="2000" dirty="0" smtClean="0">
+                    <a:endParaRPr lang="en-US" sz="2000" dirty="0">
                       <a:latin typeface="Arial" panose="020B0604020202020204" pitchFamily="34" charset="0"/>
                       <a:cs typeface="Arial" panose="020B0604020202020204" pitchFamily="34" charset="0"/>
                     </a:endParaRPr>
@@ -49209,7 +49378,7 @@
                 </p:txBody>
               </p:sp>
             </mc:Choice>
-            <mc:Fallback>
+            <mc:Fallback xmlns="">
               <p:sp>
                 <p:nvSpPr>
                   <p:cNvPr id="57" name="TextBox 56"/>
@@ -49248,8 +49417,8 @@
               </p:sp>
             </mc:Fallback>
           </mc:AlternateContent>
-          <mc:AlternateContent xmlns:mc="http://schemas.openxmlformats.org/markup-compatibility/2006">
-            <mc:Choice xmlns:a14="http://schemas.microsoft.com/office/drawing/2010/main" Requires="a14">
+          <mc:AlternateContent xmlns:mc="http://schemas.openxmlformats.org/markup-compatibility/2006" xmlns:a14="http://schemas.microsoft.com/office/drawing/2010/main">
+            <mc:Choice Requires="a14">
               <p:sp>
                 <p:nvSpPr>
                   <p:cNvPr id="58" name="TextBox 57"/>
@@ -49272,6 +49441,7 @@
                   </a:bodyPr>
                   <a:lstStyle/>
                   <a:p>
+                    <a:pPr/>
                     <a14:m>
                       <m:oMathPara xmlns:m="http://schemas.openxmlformats.org/officeDocument/2006/math">
                         <m:oMathParaPr>
@@ -49309,7 +49479,7 @@
                         </m:oMath>
                       </m:oMathPara>
                     </a14:m>
-                    <a:endParaRPr lang="en-US" sz="2000" dirty="0" smtClean="0">
+                    <a:endParaRPr lang="en-US" sz="2000" dirty="0">
                       <a:latin typeface="Arial" panose="020B0604020202020204" pitchFamily="34" charset="0"/>
                       <a:cs typeface="Arial" panose="020B0604020202020204" pitchFamily="34" charset="0"/>
                     </a:endParaRPr>
@@ -49317,7 +49487,7 @@
                 </p:txBody>
               </p:sp>
             </mc:Choice>
-            <mc:Fallback>
+            <mc:Fallback xmlns="">
               <p:sp>
                 <p:nvSpPr>
                   <p:cNvPr id="58" name="TextBox 57"/>
@@ -49475,8 +49645,8 @@
               </a:fontRef>
             </p:style>
           </p:cxnSp>
-          <mc:AlternateContent xmlns:mc="http://schemas.openxmlformats.org/markup-compatibility/2006">
-            <mc:Choice xmlns:a14="http://schemas.microsoft.com/office/drawing/2010/main" Requires="a14">
+          <mc:AlternateContent xmlns:mc="http://schemas.openxmlformats.org/markup-compatibility/2006" xmlns:a14="http://schemas.microsoft.com/office/drawing/2010/main">
+            <mc:Choice Requires="a14">
               <p:sp>
                 <p:nvSpPr>
                   <p:cNvPr id="71" name="TextBox 70"/>
@@ -49499,6 +49669,7 @@
                   </a:bodyPr>
                   <a:lstStyle/>
                   <a:p>
+                    <a:pPr/>
                     <a14:m>
                       <m:oMathPara xmlns:m="http://schemas.openxmlformats.org/officeDocument/2006/math">
                         <m:oMathParaPr>
@@ -49548,7 +49719,7 @@
                         </m:oMath>
                       </m:oMathPara>
                     </a14:m>
-                    <a:endParaRPr lang="en-US" sz="2000" dirty="0" smtClean="0">
+                    <a:endParaRPr lang="en-US" sz="2000" dirty="0">
                       <a:solidFill>
                         <a:srgbClr val="FF0000"/>
                       </a:solidFill>
@@ -49559,7 +49730,7 @@
                 </p:txBody>
               </p:sp>
             </mc:Choice>
-            <mc:Fallback>
+            <mc:Fallback xmlns="">
               <p:sp>
                 <p:nvSpPr>
                   <p:cNvPr id="71" name="TextBox 70"/>
@@ -49598,8 +49769,8 @@
               </p:sp>
             </mc:Fallback>
           </mc:AlternateContent>
-          <mc:AlternateContent xmlns:mc="http://schemas.openxmlformats.org/markup-compatibility/2006">
-            <mc:Choice xmlns:a14="http://schemas.microsoft.com/office/drawing/2010/main" Requires="a14">
+          <mc:AlternateContent xmlns:mc="http://schemas.openxmlformats.org/markup-compatibility/2006" xmlns:a14="http://schemas.microsoft.com/office/drawing/2010/main">
+            <mc:Choice Requires="a14">
               <p:sp>
                 <p:nvSpPr>
                   <p:cNvPr id="72" name="TextBox 71"/>
@@ -49622,6 +49793,7 @@
                   </a:bodyPr>
                   <a:lstStyle/>
                   <a:p>
+                    <a:pPr/>
                     <a14:m>
                       <m:oMathPara xmlns:m="http://schemas.openxmlformats.org/officeDocument/2006/math">
                         <m:oMathParaPr>
@@ -49671,7 +49843,7 @@
                         </m:oMath>
                       </m:oMathPara>
                     </a14:m>
-                    <a:endParaRPr lang="en-US" sz="2000" dirty="0" smtClean="0">
+                    <a:endParaRPr lang="en-US" sz="2000" dirty="0">
                       <a:solidFill>
                         <a:srgbClr val="FF0000"/>
                       </a:solidFill>
@@ -49682,7 +49854,7 @@
                 </p:txBody>
               </p:sp>
             </mc:Choice>
-            <mc:Fallback>
+            <mc:Fallback xmlns="">
               <p:sp>
                 <p:nvSpPr>
                   <p:cNvPr id="72" name="TextBox 71"/>
@@ -49722,8 +49894,8 @@
             </mc:Fallback>
           </mc:AlternateContent>
         </p:grpSp>
-        <mc:AlternateContent xmlns:mc="http://schemas.openxmlformats.org/markup-compatibility/2006">
-          <mc:Choice xmlns:a14="http://schemas.microsoft.com/office/drawing/2010/main" Requires="a14">
+        <mc:AlternateContent xmlns:mc="http://schemas.openxmlformats.org/markup-compatibility/2006" xmlns:a14="http://schemas.microsoft.com/office/drawing/2010/main">
+          <mc:Choice Requires="a14">
             <p:sp>
               <p:nvSpPr>
                 <p:cNvPr id="74" name="TextBox 73"/>
@@ -49746,6 +49918,7 @@
                 </a:bodyPr>
                 <a:lstStyle/>
                 <a:p>
+                  <a:pPr/>
                   <a14:m>
                     <m:oMathPara xmlns:m="http://schemas.openxmlformats.org/officeDocument/2006/math">
                       <m:oMathParaPr>
@@ -49776,7 +49949,7 @@
                       </m:oMath>
                     </m:oMathPara>
                   </a14:m>
-                  <a:endParaRPr lang="en-US" sz="2000" dirty="0" smtClean="0">
+                  <a:endParaRPr lang="en-US" sz="2000" dirty="0">
                     <a:latin typeface="Arial" panose="020B0604020202020204" pitchFamily="34" charset="0"/>
                     <a:cs typeface="Arial" panose="020B0604020202020204" pitchFamily="34" charset="0"/>
                   </a:endParaRPr>
@@ -49784,7 +49957,7 @@
               </p:txBody>
             </p:sp>
           </mc:Choice>
-          <mc:Fallback>
+          <mc:Fallback xmlns="">
             <p:sp>
               <p:nvSpPr>
                 <p:cNvPr id="74" name="TextBox 73"/>
@@ -50102,7 +50275,7 @@
                             </m:oMath>
                           </m:oMathPara>
                         </a14:m>
-                        <a:endParaRPr lang="en-US" dirty="0" smtClean="0">
+                        <a:endParaRPr lang="en-US" dirty="0">
                           <a:latin typeface="Arial" panose="020B0604020202020204" pitchFamily="34" charset="0"/>
                           <a:cs typeface="Arial" panose="020B0604020202020204" pitchFamily="34" charset="0"/>
                         </a:endParaRPr>
@@ -50190,7 +50363,7 @@
                             </m:oMath>
                           </m:oMathPara>
                         </a14:m>
-                        <a:endParaRPr lang="en-US" dirty="0" smtClean="0">
+                        <a:endParaRPr lang="en-US" dirty="0">
                           <a:latin typeface="Arial" panose="020B0604020202020204" pitchFamily="34" charset="0"/>
                           <a:cs typeface="Arial" panose="020B0604020202020204" pitchFamily="34" charset="0"/>
                         </a:endParaRPr>
@@ -50403,8 +50576,8 @@
               </a:fontRef>
             </p:style>
           </p:cxnSp>
-          <mc:AlternateContent xmlns:mc="http://schemas.openxmlformats.org/markup-compatibility/2006">
-            <mc:Choice xmlns:a14="http://schemas.microsoft.com/office/drawing/2010/main" Requires="a14">
+          <mc:AlternateContent xmlns:mc="http://schemas.openxmlformats.org/markup-compatibility/2006" xmlns:a14="http://schemas.microsoft.com/office/drawing/2010/main">
+            <mc:Choice Requires="a14">
               <p:sp>
                 <p:nvSpPr>
                   <p:cNvPr id="84" name="Rectangle 83"/>
@@ -50448,7 +50621,7 @@
                 </p:txBody>
               </p:sp>
             </mc:Choice>
-            <mc:Fallback>
+            <mc:Fallback xmlns="">
               <p:sp>
                 <p:nvSpPr>
                   <p:cNvPr id="84" name="Rectangle 83"/>
@@ -50487,8 +50660,8 @@
               </p:sp>
             </mc:Fallback>
           </mc:AlternateContent>
-          <mc:AlternateContent xmlns:mc="http://schemas.openxmlformats.org/markup-compatibility/2006">
-            <mc:Choice xmlns:a14="http://schemas.microsoft.com/office/drawing/2010/main" Requires="a14">
+          <mc:AlternateContent xmlns:mc="http://schemas.openxmlformats.org/markup-compatibility/2006" xmlns:a14="http://schemas.microsoft.com/office/drawing/2010/main">
+            <mc:Choice Requires="a14">
               <p:sp>
                 <p:nvSpPr>
                   <p:cNvPr id="85" name="Rectangle 84"/>
@@ -50532,7 +50705,7 @@
                 </p:txBody>
               </p:sp>
             </mc:Choice>
-            <mc:Fallback>
+            <mc:Fallback xmlns="">
               <p:sp>
                 <p:nvSpPr>
                   <p:cNvPr id="85" name="Rectangle 84"/>
@@ -50642,7 +50815,7 @@
             <a:lstStyle/>
             <a:p>
               <a:r>
-                <a:rPr lang="en-US" dirty="0" smtClean="0">
+                <a:rPr lang="en-US" dirty="0">
                   <a:latin typeface="Arial" panose="020B0604020202020204" pitchFamily="34" charset="0"/>
                   <a:cs typeface="Arial" panose="020B0604020202020204" pitchFamily="34" charset="0"/>
                 </a:rPr>
@@ -50656,6 +50829,702 @@
     <p:extLst>
       <p:ext uri="{BB962C8B-B14F-4D97-AF65-F5344CB8AC3E}">
         <p14:creationId xmlns:p14="http://schemas.microsoft.com/office/powerpoint/2010/main" val="4132219296"/>
+      </p:ext>
+    </p:extLst>
+  </p:cSld>
+  <p:clrMapOvr>
+    <a:masterClrMapping/>
+  </p:clrMapOvr>
+</p:sld>
+</file>
+
+<file path=ppt/slides/slide9.xml><?xml version="1.0" encoding="utf-8"?>
+<p:sld xmlns:a="http://schemas.openxmlformats.org/drawingml/2006/main" xmlns:r="http://schemas.openxmlformats.org/officeDocument/2006/relationships" xmlns:p="http://schemas.openxmlformats.org/presentationml/2006/main">
+  <p:cSld>
+    <p:spTree>
+      <p:nvGrpSpPr>
+        <p:cNvPr id="1" name=""/>
+        <p:cNvGrpSpPr/>
+        <p:nvPr/>
+      </p:nvGrpSpPr>
+      <p:grpSpPr>
+        <a:xfrm>
+          <a:off x="0" y="0"/>
+          <a:ext cx="0" cy="0"/>
+          <a:chOff x="0" y="0"/>
+          <a:chExt cx="0" cy="0"/>
+        </a:xfrm>
+      </p:grpSpPr>
+      <p:cxnSp>
+        <p:nvCxnSpPr>
+          <p:cNvPr id="5" name="Straight Arrow Connector 4">
+            <a:extLst>
+              <a:ext uri="{FF2B5EF4-FFF2-40B4-BE49-F238E27FC236}">
+                <a16:creationId xmlns:a16="http://schemas.microsoft.com/office/drawing/2014/main" id="{64BA7913-C29C-4CF9-8F76-7ED98DA997C9}"/>
+              </a:ext>
+            </a:extLst>
+          </p:cNvPr>
+          <p:cNvCxnSpPr/>
+          <p:nvPr/>
+        </p:nvCxnSpPr>
+        <p:spPr>
+          <a:xfrm>
+            <a:off x="1983608" y="606390"/>
+            <a:ext cx="962526" cy="4263991"/>
+          </a:xfrm>
+          <a:prstGeom prst="straightConnector1">
+            <a:avLst/>
+          </a:prstGeom>
+          <a:ln w="38100">
+            <a:solidFill>
+              <a:schemeClr val="bg1">
+                <a:lumMod val="85000"/>
+              </a:schemeClr>
+            </a:solidFill>
+            <a:tailEnd type="triangle"/>
+          </a:ln>
+        </p:spPr>
+        <p:style>
+          <a:lnRef idx="1">
+            <a:schemeClr val="accent1"/>
+          </a:lnRef>
+          <a:fillRef idx="0">
+            <a:schemeClr val="accent1"/>
+          </a:fillRef>
+          <a:effectRef idx="0">
+            <a:schemeClr val="accent1"/>
+          </a:effectRef>
+          <a:fontRef idx="minor">
+            <a:schemeClr val="tx1"/>
+          </a:fontRef>
+        </p:style>
+      </p:cxnSp>
+      <p:cxnSp>
+        <p:nvCxnSpPr>
+          <p:cNvPr id="6" name="Straight Arrow Connector 5">
+            <a:extLst>
+              <a:ext uri="{FF2B5EF4-FFF2-40B4-BE49-F238E27FC236}">
+                <a16:creationId xmlns:a16="http://schemas.microsoft.com/office/drawing/2014/main" id="{15775E8B-74CE-4CD8-A3D7-23BFDEDC9C36}"/>
+              </a:ext>
+            </a:extLst>
+          </p:cNvPr>
+          <p:cNvCxnSpPr/>
+          <p:nvPr/>
+        </p:nvCxnSpPr>
+        <p:spPr>
+          <a:xfrm>
+            <a:off x="2239881" y="606390"/>
+            <a:ext cx="962526" cy="4263991"/>
+          </a:xfrm>
+          <a:prstGeom prst="straightConnector1">
+            <a:avLst/>
+          </a:prstGeom>
+          <a:ln w="38100">
+            <a:solidFill>
+              <a:schemeClr val="bg1">
+                <a:lumMod val="85000"/>
+              </a:schemeClr>
+            </a:solidFill>
+            <a:tailEnd type="triangle"/>
+          </a:ln>
+        </p:spPr>
+        <p:style>
+          <a:lnRef idx="1">
+            <a:schemeClr val="accent1"/>
+          </a:lnRef>
+          <a:fillRef idx="0">
+            <a:schemeClr val="accent1"/>
+          </a:fillRef>
+          <a:effectRef idx="0">
+            <a:schemeClr val="accent1"/>
+          </a:effectRef>
+          <a:fontRef idx="minor">
+            <a:schemeClr val="tx1"/>
+          </a:fontRef>
+        </p:style>
+      </p:cxnSp>
+      <p:cxnSp>
+        <p:nvCxnSpPr>
+          <p:cNvPr id="7" name="Straight Arrow Connector 6">
+            <a:extLst>
+              <a:ext uri="{FF2B5EF4-FFF2-40B4-BE49-F238E27FC236}">
+                <a16:creationId xmlns:a16="http://schemas.microsoft.com/office/drawing/2014/main" id="{37741DA9-D572-4A4A-B143-8546364949C2}"/>
+              </a:ext>
+            </a:extLst>
+          </p:cNvPr>
+          <p:cNvCxnSpPr/>
+          <p:nvPr/>
+        </p:nvCxnSpPr>
+        <p:spPr>
+          <a:xfrm>
+            <a:off x="2493344" y="606390"/>
+            <a:ext cx="962526" cy="4263991"/>
+          </a:xfrm>
+          <a:prstGeom prst="straightConnector1">
+            <a:avLst/>
+          </a:prstGeom>
+          <a:ln w="38100">
+            <a:solidFill>
+              <a:schemeClr val="bg1">
+                <a:lumMod val="85000"/>
+              </a:schemeClr>
+            </a:solidFill>
+            <a:tailEnd type="triangle"/>
+          </a:ln>
+        </p:spPr>
+        <p:style>
+          <a:lnRef idx="1">
+            <a:schemeClr val="accent1"/>
+          </a:lnRef>
+          <a:fillRef idx="0">
+            <a:schemeClr val="accent1"/>
+          </a:fillRef>
+          <a:effectRef idx="0">
+            <a:schemeClr val="accent1"/>
+          </a:effectRef>
+          <a:fontRef idx="minor">
+            <a:schemeClr val="tx1"/>
+          </a:fontRef>
+        </p:style>
+      </p:cxnSp>
+      <p:cxnSp>
+        <p:nvCxnSpPr>
+          <p:cNvPr id="8" name="Straight Arrow Connector 7">
+            <a:extLst>
+              <a:ext uri="{FF2B5EF4-FFF2-40B4-BE49-F238E27FC236}">
+                <a16:creationId xmlns:a16="http://schemas.microsoft.com/office/drawing/2014/main" id="{8E6A6530-3762-4017-BE93-FBD7FA9A7D25}"/>
+              </a:ext>
+            </a:extLst>
+          </p:cNvPr>
+          <p:cNvCxnSpPr/>
+          <p:nvPr/>
+        </p:nvCxnSpPr>
+        <p:spPr>
+          <a:xfrm>
+            <a:off x="2760044" y="606391"/>
+            <a:ext cx="962526" cy="4263991"/>
+          </a:xfrm>
+          <a:prstGeom prst="straightConnector1">
+            <a:avLst/>
+          </a:prstGeom>
+          <a:ln w="38100">
+            <a:solidFill>
+              <a:schemeClr val="bg1">
+                <a:lumMod val="85000"/>
+              </a:schemeClr>
+            </a:solidFill>
+            <a:tailEnd type="triangle"/>
+          </a:ln>
+        </p:spPr>
+        <p:style>
+          <a:lnRef idx="1">
+            <a:schemeClr val="accent1"/>
+          </a:lnRef>
+          <a:fillRef idx="0">
+            <a:schemeClr val="accent1"/>
+          </a:fillRef>
+          <a:effectRef idx="0">
+            <a:schemeClr val="accent1"/>
+          </a:effectRef>
+          <a:fontRef idx="minor">
+            <a:schemeClr val="tx1"/>
+          </a:fontRef>
+        </p:style>
+      </p:cxnSp>
+      <p:cxnSp>
+        <p:nvCxnSpPr>
+          <p:cNvPr id="9" name="Straight Arrow Connector 8">
+            <a:extLst>
+              <a:ext uri="{FF2B5EF4-FFF2-40B4-BE49-F238E27FC236}">
+                <a16:creationId xmlns:a16="http://schemas.microsoft.com/office/drawing/2014/main" id="{2705339F-1326-4F55-A974-99C8D48E8C56}"/>
+              </a:ext>
+            </a:extLst>
+          </p:cNvPr>
+          <p:cNvCxnSpPr/>
+          <p:nvPr/>
+        </p:nvCxnSpPr>
+        <p:spPr>
+          <a:xfrm>
+            <a:off x="3039176" y="606391"/>
+            <a:ext cx="962526" cy="4263991"/>
+          </a:xfrm>
+          <a:prstGeom prst="straightConnector1">
+            <a:avLst/>
+          </a:prstGeom>
+          <a:ln w="38100">
+            <a:solidFill>
+              <a:schemeClr val="bg1">
+                <a:lumMod val="85000"/>
+              </a:schemeClr>
+            </a:solidFill>
+            <a:tailEnd type="triangle"/>
+          </a:ln>
+        </p:spPr>
+        <p:style>
+          <a:lnRef idx="1">
+            <a:schemeClr val="accent1"/>
+          </a:lnRef>
+          <a:fillRef idx="0">
+            <a:schemeClr val="accent1"/>
+          </a:fillRef>
+          <a:effectRef idx="0">
+            <a:schemeClr val="accent1"/>
+          </a:effectRef>
+          <a:fontRef idx="minor">
+            <a:schemeClr val="tx1"/>
+          </a:fontRef>
+        </p:style>
+      </p:cxnSp>
+      <p:cxnSp>
+        <p:nvCxnSpPr>
+          <p:cNvPr id="10" name="Straight Arrow Connector 9">
+            <a:extLst>
+              <a:ext uri="{FF2B5EF4-FFF2-40B4-BE49-F238E27FC236}">
+                <a16:creationId xmlns:a16="http://schemas.microsoft.com/office/drawing/2014/main" id="{5A6A1F3D-4115-477F-9B1D-DF5B6BFAAD77}"/>
+              </a:ext>
+            </a:extLst>
+          </p:cNvPr>
+          <p:cNvCxnSpPr/>
+          <p:nvPr/>
+        </p:nvCxnSpPr>
+        <p:spPr>
+          <a:xfrm>
+            <a:off x="3317507" y="606392"/>
+            <a:ext cx="962526" cy="4263991"/>
+          </a:xfrm>
+          <a:prstGeom prst="straightConnector1">
+            <a:avLst/>
+          </a:prstGeom>
+          <a:ln w="38100">
+            <a:solidFill>
+              <a:schemeClr val="bg1">
+                <a:lumMod val="85000"/>
+              </a:schemeClr>
+            </a:solidFill>
+            <a:tailEnd type="triangle"/>
+          </a:ln>
+        </p:spPr>
+        <p:style>
+          <a:lnRef idx="1">
+            <a:schemeClr val="accent1"/>
+          </a:lnRef>
+          <a:fillRef idx="0">
+            <a:schemeClr val="accent1"/>
+          </a:fillRef>
+          <a:effectRef idx="0">
+            <a:schemeClr val="accent1"/>
+          </a:effectRef>
+          <a:fontRef idx="minor">
+            <a:schemeClr val="tx1"/>
+          </a:fontRef>
+        </p:style>
+      </p:cxnSp>
+      <p:cxnSp>
+        <p:nvCxnSpPr>
+          <p:cNvPr id="11" name="Straight Arrow Connector 10">
+            <a:extLst>
+              <a:ext uri="{FF2B5EF4-FFF2-40B4-BE49-F238E27FC236}">
+                <a16:creationId xmlns:a16="http://schemas.microsoft.com/office/drawing/2014/main" id="{8AA562E3-F431-429C-B29B-977EF5113395}"/>
+              </a:ext>
+            </a:extLst>
+          </p:cNvPr>
+          <p:cNvCxnSpPr/>
+          <p:nvPr/>
+        </p:nvCxnSpPr>
+        <p:spPr>
+          <a:xfrm>
+            <a:off x="3599048" y="606388"/>
+            <a:ext cx="962526" cy="4263991"/>
+          </a:xfrm>
+          <a:prstGeom prst="straightConnector1">
+            <a:avLst/>
+          </a:prstGeom>
+          <a:ln w="38100">
+            <a:solidFill>
+              <a:schemeClr val="bg1">
+                <a:lumMod val="85000"/>
+              </a:schemeClr>
+            </a:solidFill>
+            <a:tailEnd type="triangle"/>
+          </a:ln>
+        </p:spPr>
+        <p:style>
+          <a:lnRef idx="1">
+            <a:schemeClr val="accent1"/>
+          </a:lnRef>
+          <a:fillRef idx="0">
+            <a:schemeClr val="accent1"/>
+          </a:fillRef>
+          <a:effectRef idx="0">
+            <a:schemeClr val="accent1"/>
+          </a:effectRef>
+          <a:fontRef idx="minor">
+            <a:schemeClr val="tx1"/>
+          </a:fontRef>
+        </p:style>
+      </p:cxnSp>
+      <p:cxnSp>
+        <p:nvCxnSpPr>
+          <p:cNvPr id="12" name="Straight Arrow Connector 11">
+            <a:extLst>
+              <a:ext uri="{FF2B5EF4-FFF2-40B4-BE49-F238E27FC236}">
+                <a16:creationId xmlns:a16="http://schemas.microsoft.com/office/drawing/2014/main" id="{85E65DEB-399C-4167-8E35-C856844D764E}"/>
+              </a:ext>
+            </a:extLst>
+          </p:cNvPr>
+          <p:cNvCxnSpPr/>
+          <p:nvPr/>
+        </p:nvCxnSpPr>
+        <p:spPr>
+          <a:xfrm>
+            <a:off x="3855321" y="606388"/>
+            <a:ext cx="962526" cy="4263991"/>
+          </a:xfrm>
+          <a:prstGeom prst="straightConnector1">
+            <a:avLst/>
+          </a:prstGeom>
+          <a:ln w="38100">
+            <a:solidFill>
+              <a:schemeClr val="bg1">
+                <a:lumMod val="85000"/>
+              </a:schemeClr>
+            </a:solidFill>
+            <a:tailEnd type="triangle"/>
+          </a:ln>
+        </p:spPr>
+        <p:style>
+          <a:lnRef idx="1">
+            <a:schemeClr val="accent1"/>
+          </a:lnRef>
+          <a:fillRef idx="0">
+            <a:schemeClr val="accent1"/>
+          </a:fillRef>
+          <a:effectRef idx="0">
+            <a:schemeClr val="accent1"/>
+          </a:effectRef>
+          <a:fontRef idx="minor">
+            <a:schemeClr val="tx1"/>
+          </a:fontRef>
+        </p:style>
+      </p:cxnSp>
+      <p:cxnSp>
+        <p:nvCxnSpPr>
+          <p:cNvPr id="13" name="Straight Arrow Connector 12">
+            <a:extLst>
+              <a:ext uri="{FF2B5EF4-FFF2-40B4-BE49-F238E27FC236}">
+                <a16:creationId xmlns:a16="http://schemas.microsoft.com/office/drawing/2014/main" id="{51B2032A-70FD-46E4-8330-5B43A55BC25A}"/>
+              </a:ext>
+            </a:extLst>
+          </p:cNvPr>
+          <p:cNvCxnSpPr/>
+          <p:nvPr/>
+        </p:nvCxnSpPr>
+        <p:spPr>
+          <a:xfrm>
+            <a:off x="4108784" y="606388"/>
+            <a:ext cx="962526" cy="4263991"/>
+          </a:xfrm>
+          <a:prstGeom prst="straightConnector1">
+            <a:avLst/>
+          </a:prstGeom>
+          <a:ln w="38100">
+            <a:solidFill>
+              <a:schemeClr val="bg1">
+                <a:lumMod val="85000"/>
+              </a:schemeClr>
+            </a:solidFill>
+            <a:tailEnd type="triangle"/>
+          </a:ln>
+        </p:spPr>
+        <p:style>
+          <a:lnRef idx="1">
+            <a:schemeClr val="accent1"/>
+          </a:lnRef>
+          <a:fillRef idx="0">
+            <a:schemeClr val="accent1"/>
+          </a:fillRef>
+          <a:effectRef idx="0">
+            <a:schemeClr val="accent1"/>
+          </a:effectRef>
+          <a:fontRef idx="minor">
+            <a:schemeClr val="tx1"/>
+          </a:fontRef>
+        </p:style>
+      </p:cxnSp>
+      <p:cxnSp>
+        <p:nvCxnSpPr>
+          <p:cNvPr id="14" name="Straight Arrow Connector 13">
+            <a:extLst>
+              <a:ext uri="{FF2B5EF4-FFF2-40B4-BE49-F238E27FC236}">
+                <a16:creationId xmlns:a16="http://schemas.microsoft.com/office/drawing/2014/main" id="{87273663-E154-45C6-A532-C9F2203A2DC9}"/>
+              </a:ext>
+            </a:extLst>
+          </p:cNvPr>
+          <p:cNvCxnSpPr/>
+          <p:nvPr/>
+        </p:nvCxnSpPr>
+        <p:spPr>
+          <a:xfrm>
+            <a:off x="4375484" y="606389"/>
+            <a:ext cx="962526" cy="4263991"/>
+          </a:xfrm>
+          <a:prstGeom prst="straightConnector1">
+            <a:avLst/>
+          </a:prstGeom>
+          <a:ln w="38100">
+            <a:solidFill>
+              <a:schemeClr val="bg1">
+                <a:lumMod val="85000"/>
+              </a:schemeClr>
+            </a:solidFill>
+            <a:tailEnd type="triangle"/>
+          </a:ln>
+        </p:spPr>
+        <p:style>
+          <a:lnRef idx="1">
+            <a:schemeClr val="accent1"/>
+          </a:lnRef>
+          <a:fillRef idx="0">
+            <a:schemeClr val="accent1"/>
+          </a:fillRef>
+          <a:effectRef idx="0">
+            <a:schemeClr val="accent1"/>
+          </a:effectRef>
+          <a:fontRef idx="minor">
+            <a:schemeClr val="tx1"/>
+          </a:fontRef>
+        </p:style>
+      </p:cxnSp>
+      <p:cxnSp>
+        <p:nvCxnSpPr>
+          <p:cNvPr id="15" name="Straight Arrow Connector 14">
+            <a:extLst>
+              <a:ext uri="{FF2B5EF4-FFF2-40B4-BE49-F238E27FC236}">
+                <a16:creationId xmlns:a16="http://schemas.microsoft.com/office/drawing/2014/main" id="{8267661D-A991-40E5-919F-D37DE784A8D2}"/>
+              </a:ext>
+            </a:extLst>
+          </p:cNvPr>
+          <p:cNvCxnSpPr/>
+          <p:nvPr/>
+        </p:nvCxnSpPr>
+        <p:spPr>
+          <a:xfrm>
+            <a:off x="4654616" y="606389"/>
+            <a:ext cx="962526" cy="4263991"/>
+          </a:xfrm>
+          <a:prstGeom prst="straightConnector1">
+            <a:avLst/>
+          </a:prstGeom>
+          <a:ln w="38100">
+            <a:solidFill>
+              <a:schemeClr val="bg1">
+                <a:lumMod val="85000"/>
+              </a:schemeClr>
+            </a:solidFill>
+            <a:tailEnd type="triangle"/>
+          </a:ln>
+        </p:spPr>
+        <p:style>
+          <a:lnRef idx="1">
+            <a:schemeClr val="accent1"/>
+          </a:lnRef>
+          <a:fillRef idx="0">
+            <a:schemeClr val="accent1"/>
+          </a:fillRef>
+          <a:effectRef idx="0">
+            <a:schemeClr val="accent1"/>
+          </a:effectRef>
+          <a:fontRef idx="minor">
+            <a:schemeClr val="tx1"/>
+          </a:fontRef>
+        </p:style>
+      </p:cxnSp>
+      <p:cxnSp>
+        <p:nvCxnSpPr>
+          <p:cNvPr id="16" name="Straight Arrow Connector 15">
+            <a:extLst>
+              <a:ext uri="{FF2B5EF4-FFF2-40B4-BE49-F238E27FC236}">
+                <a16:creationId xmlns:a16="http://schemas.microsoft.com/office/drawing/2014/main" id="{EDC19D22-0E0B-48F9-9A83-2263FFD3A594}"/>
+              </a:ext>
+            </a:extLst>
+          </p:cNvPr>
+          <p:cNvCxnSpPr/>
+          <p:nvPr/>
+        </p:nvCxnSpPr>
+        <p:spPr>
+          <a:xfrm>
+            <a:off x="4932947" y="606390"/>
+            <a:ext cx="962526" cy="4263991"/>
+          </a:xfrm>
+          <a:prstGeom prst="straightConnector1">
+            <a:avLst/>
+          </a:prstGeom>
+          <a:ln w="38100">
+            <a:solidFill>
+              <a:schemeClr val="bg1">
+                <a:lumMod val="85000"/>
+              </a:schemeClr>
+            </a:solidFill>
+            <a:tailEnd type="triangle"/>
+          </a:ln>
+        </p:spPr>
+        <p:style>
+          <a:lnRef idx="1">
+            <a:schemeClr val="accent1"/>
+          </a:lnRef>
+          <a:fillRef idx="0">
+            <a:schemeClr val="accent1"/>
+          </a:fillRef>
+          <a:effectRef idx="0">
+            <a:schemeClr val="accent1"/>
+          </a:effectRef>
+          <a:fontRef idx="minor">
+            <a:schemeClr val="tx1"/>
+          </a:fontRef>
+        </p:style>
+      </p:cxnSp>
+      <p:cxnSp>
+        <p:nvCxnSpPr>
+          <p:cNvPr id="18" name="Straight Arrow Connector 17">
+            <a:extLst>
+              <a:ext uri="{FF2B5EF4-FFF2-40B4-BE49-F238E27FC236}">
+                <a16:creationId xmlns:a16="http://schemas.microsoft.com/office/drawing/2014/main" id="{F3EAE365-63ED-4CAC-8405-41D971818B49}"/>
+              </a:ext>
+            </a:extLst>
+          </p:cNvPr>
+          <p:cNvCxnSpPr/>
+          <p:nvPr/>
+        </p:nvCxnSpPr>
+        <p:spPr>
+          <a:xfrm>
+            <a:off x="3797165" y="2666198"/>
+            <a:ext cx="2203385" cy="0"/>
+          </a:xfrm>
+          <a:prstGeom prst="straightConnector1">
+            <a:avLst/>
+          </a:prstGeom>
+          <a:ln w="38100">
+            <a:solidFill>
+              <a:schemeClr val="tx1"/>
+            </a:solidFill>
+            <a:tailEnd type="triangle"/>
+          </a:ln>
+        </p:spPr>
+        <p:style>
+          <a:lnRef idx="1">
+            <a:schemeClr val="accent1"/>
+          </a:lnRef>
+          <a:fillRef idx="0">
+            <a:schemeClr val="accent1"/>
+          </a:fillRef>
+          <a:effectRef idx="0">
+            <a:schemeClr val="accent1"/>
+          </a:effectRef>
+          <a:fontRef idx="minor">
+            <a:schemeClr val="tx1"/>
+          </a:fontRef>
+        </p:style>
+      </p:cxnSp>
+      <p:sp>
+        <p:nvSpPr>
+          <p:cNvPr id="19" name="Oval 18">
+            <a:extLst>
+              <a:ext uri="{FF2B5EF4-FFF2-40B4-BE49-F238E27FC236}">
+                <a16:creationId xmlns:a16="http://schemas.microsoft.com/office/drawing/2014/main" id="{8F5578CA-58FF-4076-B30F-9B3E4591A002}"/>
+              </a:ext>
+            </a:extLst>
+          </p:cNvPr>
+          <p:cNvSpPr/>
+          <p:nvPr/>
+        </p:nvSpPr>
+        <p:spPr>
+          <a:xfrm>
+            <a:off x="3608269" y="2503771"/>
+            <a:ext cx="324853" cy="324853"/>
+          </a:xfrm>
+          <a:prstGeom prst="ellipse">
+            <a:avLst/>
+          </a:prstGeom>
+          <a:solidFill>
+            <a:schemeClr val="tx1"/>
+          </a:solidFill>
+          <a:ln w="38100">
+            <a:solidFill>
+              <a:schemeClr val="tx1"/>
+            </a:solidFill>
+          </a:ln>
+        </p:spPr>
+        <p:style>
+          <a:lnRef idx="2">
+            <a:schemeClr val="accent1">
+              <a:shade val="50000"/>
+            </a:schemeClr>
+          </a:lnRef>
+          <a:fillRef idx="1">
+            <a:schemeClr val="accent1"/>
+          </a:fillRef>
+          <a:effectRef idx="0">
+            <a:schemeClr val="accent1"/>
+          </a:effectRef>
+          <a:fontRef idx="minor">
+            <a:schemeClr val="lt1"/>
+          </a:fontRef>
+        </p:style>
+        <p:txBody>
+          <a:bodyPr rtlCol="0" anchor="ctr"/>
+          <a:lstStyle/>
+          <a:p>
+            <a:pPr algn="ctr"/>
+            <a:endParaRPr lang="en-CA"/>
+          </a:p>
+        </p:txBody>
+      </p:sp>
+      <p:cxnSp>
+        <p:nvCxnSpPr>
+          <p:cNvPr id="21" name="Straight Connector 20">
+            <a:extLst>
+              <a:ext uri="{FF2B5EF4-FFF2-40B4-BE49-F238E27FC236}">
+                <a16:creationId xmlns:a16="http://schemas.microsoft.com/office/drawing/2014/main" id="{DD91B55B-1D32-44C6-AB61-8E03A37FE835}"/>
+              </a:ext>
+            </a:extLst>
+          </p:cNvPr>
+          <p:cNvCxnSpPr/>
+          <p:nvPr/>
+        </p:nvCxnSpPr>
+        <p:spPr>
+          <a:xfrm flipH="1" flipV="1">
+            <a:off x="3722570" y="433137"/>
+            <a:ext cx="48125" cy="2233060"/>
+          </a:xfrm>
+          <a:prstGeom prst="line">
+            <a:avLst/>
+          </a:prstGeom>
+          <a:ln w="38100">
+            <a:solidFill>
+              <a:schemeClr val="tx1"/>
+            </a:solidFill>
+            <a:prstDash val="dash"/>
+          </a:ln>
+        </p:spPr>
+        <p:style>
+          <a:lnRef idx="1">
+            <a:schemeClr val="accent1"/>
+          </a:lnRef>
+          <a:fillRef idx="0">
+            <a:schemeClr val="accent1"/>
+          </a:fillRef>
+          <a:effectRef idx="0">
+            <a:schemeClr val="accent1"/>
+          </a:effectRef>
+          <a:fontRef idx="minor">
+            <a:schemeClr val="tx1"/>
+          </a:fontRef>
+        </p:style>
+      </p:cxnSp>
+    </p:spTree>
+    <p:extLst>
+      <p:ext uri="{BB962C8B-B14F-4D97-AF65-F5344CB8AC3E}">
+        <p14:creationId xmlns:p14="http://schemas.microsoft.com/office/powerpoint/2010/main" val="2804202308"/>
       </p:ext>
     </p:extLst>
   </p:cSld>

</xml_diff>

<commit_message>
Revert "Revert "Induction edits""
This reverts commit 6ef5954cc077f297831fb44dd29adf7008b9dbd5.
</commit_message>
<xml_diff>
--- a/tex/figures/Induction/Figures.pptx
+++ b/tex/figures/Induction/Figures.pptx
@@ -9,8 +9,8 @@
   </p:notesMasterIdLst>
   <p:sldIdLst>
     <p:sldId id="271" r:id="rId2"/>
-    <p:sldId id="304" r:id="rId3"/>
-    <p:sldId id="299" r:id="rId4"/>
+    <p:sldId id="299" r:id="rId3"/>
+    <p:sldId id="304" r:id="rId4"/>
     <p:sldId id="300" r:id="rId5"/>
     <p:sldId id="301" r:id="rId6"/>
     <p:sldId id="302" r:id="rId7"/>
@@ -832,7 +832,7 @@
           <a:p>
             <a:fld id="{FA15A6B2-55AC-CD4B-A1E6-BB01091FE9DC}" type="datetimeFigureOut">
               <a:rPr lang="en-US" smtClean="0"/>
-              <a:t>8/21/2019</a:t>
+              <a:t>8/2/20</a:t>
             </a:fld>
             <a:endParaRPr lang="en-US"/>
           </a:p>
@@ -1361,7 +1361,7 @@
           <a:p>
             <a:fld id="{F7249F8D-641B-4CAF-BAE5-10524742F6F1}" type="datetimeFigureOut">
               <a:rPr lang="en-CA" smtClean="0"/>
-              <a:t>2019-08-21</a:t>
+              <a:t>2020-08-02</a:t>
             </a:fld>
             <a:endParaRPr lang="en-CA"/>
           </a:p>
@@ -1531,7 +1531,7 @@
           <a:p>
             <a:fld id="{F7249F8D-641B-4CAF-BAE5-10524742F6F1}" type="datetimeFigureOut">
               <a:rPr lang="en-CA" smtClean="0"/>
-              <a:t>2019-08-21</a:t>
+              <a:t>2020-08-02</a:t>
             </a:fld>
             <a:endParaRPr lang="en-CA"/>
           </a:p>
@@ -1711,7 +1711,7 @@
           <a:p>
             <a:fld id="{F7249F8D-641B-4CAF-BAE5-10524742F6F1}" type="datetimeFigureOut">
               <a:rPr lang="en-CA" smtClean="0"/>
-              <a:t>2019-08-21</a:t>
+              <a:t>2020-08-02</a:t>
             </a:fld>
             <a:endParaRPr lang="en-CA"/>
           </a:p>
@@ -1881,7 +1881,7 @@
           <a:p>
             <a:fld id="{F7249F8D-641B-4CAF-BAE5-10524742F6F1}" type="datetimeFigureOut">
               <a:rPr lang="en-CA" smtClean="0"/>
-              <a:t>2019-08-21</a:t>
+              <a:t>2020-08-02</a:t>
             </a:fld>
             <a:endParaRPr lang="en-CA"/>
           </a:p>
@@ -2127,7 +2127,7 @@
           <a:p>
             <a:fld id="{F7249F8D-641B-4CAF-BAE5-10524742F6F1}" type="datetimeFigureOut">
               <a:rPr lang="en-CA" smtClean="0"/>
-              <a:t>2019-08-21</a:t>
+              <a:t>2020-08-02</a:t>
             </a:fld>
             <a:endParaRPr lang="en-CA"/>
           </a:p>
@@ -2359,7 +2359,7 @@
           <a:p>
             <a:fld id="{F7249F8D-641B-4CAF-BAE5-10524742F6F1}" type="datetimeFigureOut">
               <a:rPr lang="en-CA" smtClean="0"/>
-              <a:t>2019-08-21</a:t>
+              <a:t>2020-08-02</a:t>
             </a:fld>
             <a:endParaRPr lang="en-CA"/>
           </a:p>
@@ -2726,7 +2726,7 @@
           <a:p>
             <a:fld id="{F7249F8D-641B-4CAF-BAE5-10524742F6F1}" type="datetimeFigureOut">
               <a:rPr lang="en-CA" smtClean="0"/>
-              <a:t>2019-08-21</a:t>
+              <a:t>2020-08-02</a:t>
             </a:fld>
             <a:endParaRPr lang="en-CA"/>
           </a:p>
@@ -2844,7 +2844,7 @@
           <a:p>
             <a:fld id="{F7249F8D-641B-4CAF-BAE5-10524742F6F1}" type="datetimeFigureOut">
               <a:rPr lang="en-CA" smtClean="0"/>
-              <a:t>2019-08-21</a:t>
+              <a:t>2020-08-02</a:t>
             </a:fld>
             <a:endParaRPr lang="en-CA"/>
           </a:p>
@@ -2939,7 +2939,7 @@
           <a:p>
             <a:fld id="{F7249F8D-641B-4CAF-BAE5-10524742F6F1}" type="datetimeFigureOut">
               <a:rPr lang="en-CA" smtClean="0"/>
-              <a:t>2019-08-21</a:t>
+              <a:t>2020-08-02</a:t>
             </a:fld>
             <a:endParaRPr lang="en-CA"/>
           </a:p>
@@ -3216,7 +3216,7 @@
           <a:p>
             <a:fld id="{F7249F8D-641B-4CAF-BAE5-10524742F6F1}" type="datetimeFigureOut">
               <a:rPr lang="en-CA" smtClean="0"/>
-              <a:t>2019-08-21</a:t>
+              <a:t>2020-08-02</a:t>
             </a:fld>
             <a:endParaRPr lang="en-CA"/>
           </a:p>
@@ -3469,7 +3469,7 @@
           <a:p>
             <a:fld id="{F7249F8D-641B-4CAF-BAE5-10524742F6F1}" type="datetimeFigureOut">
               <a:rPr lang="en-CA" smtClean="0"/>
-              <a:t>2019-08-21</a:t>
+              <a:t>2020-08-02</a:t>
             </a:fld>
             <a:endParaRPr lang="en-CA"/>
           </a:p>
@@ -3682,7 +3682,7 @@
           <a:p>
             <a:fld id="{F7249F8D-641B-4CAF-BAE5-10524742F6F1}" type="datetimeFigureOut">
               <a:rPr lang="en-CA" smtClean="0"/>
-              <a:t>2019-08-21</a:t>
+              <a:t>2020-08-02</a:t>
             </a:fld>
             <a:endParaRPr lang="en-CA"/>
           </a:p>
@@ -12737,430 +12737,13 @@
       </p:grpSpPr>
       <p:grpSp>
         <p:nvGrpSpPr>
-          <p:cNvPr id="4" name="Group 3"/>
-          <p:cNvGrpSpPr/>
-          <p:nvPr/>
-        </p:nvGrpSpPr>
-        <p:grpSpPr>
-          <a:xfrm>
-            <a:off x="8493145" y="120878"/>
-            <a:ext cx="3592693" cy="3712027"/>
-            <a:chOff x="6322609" y="696686"/>
-            <a:chExt cx="3592693" cy="3712027"/>
-          </a:xfrm>
-        </p:grpSpPr>
-        <p:cxnSp>
-          <p:nvCxnSpPr>
-            <p:cNvPr id="5" name="Straight Arrow Connector 4"/>
-            <p:cNvCxnSpPr/>
-            <p:nvPr/>
-          </p:nvCxnSpPr>
-          <p:spPr>
-            <a:xfrm flipV="1">
-              <a:off x="7010400" y="696686"/>
-              <a:ext cx="0" cy="2797914"/>
-            </a:xfrm>
-            <a:prstGeom prst="straightConnector1">
-              <a:avLst/>
-            </a:prstGeom>
-            <a:ln w="38100">
-              <a:solidFill>
-                <a:schemeClr val="tx1"/>
-              </a:solidFill>
-              <a:tailEnd type="triangle"/>
-            </a:ln>
-          </p:spPr>
-          <p:style>
-            <a:lnRef idx="1">
-              <a:schemeClr val="accent1"/>
-            </a:lnRef>
-            <a:fillRef idx="0">
-              <a:schemeClr val="accent1"/>
-            </a:fillRef>
-            <a:effectRef idx="0">
-              <a:schemeClr val="accent1"/>
-            </a:effectRef>
-            <a:fontRef idx="minor">
-              <a:schemeClr val="tx1"/>
-            </a:fontRef>
-          </p:style>
-        </p:cxnSp>
-        <p:cxnSp>
-          <p:nvCxnSpPr>
-            <p:cNvPr id="6" name="Straight Arrow Connector 5"/>
-            <p:cNvCxnSpPr/>
-            <p:nvPr/>
-          </p:nvCxnSpPr>
-          <p:spPr>
-            <a:xfrm flipV="1">
-              <a:off x="7010400" y="3507379"/>
-              <a:ext cx="2797629" cy="1"/>
-            </a:xfrm>
-            <a:prstGeom prst="straightConnector1">
-              <a:avLst/>
-            </a:prstGeom>
-            <a:ln w="38100">
-              <a:solidFill>
-                <a:schemeClr val="tx1"/>
-              </a:solidFill>
-              <a:tailEnd type="triangle"/>
-            </a:ln>
-          </p:spPr>
-          <p:style>
-            <a:lnRef idx="1">
-              <a:schemeClr val="accent1"/>
-            </a:lnRef>
-            <a:fillRef idx="0">
-              <a:schemeClr val="accent1"/>
-            </a:fillRef>
-            <a:effectRef idx="0">
-              <a:schemeClr val="accent1"/>
-            </a:effectRef>
-            <a:fontRef idx="minor">
-              <a:schemeClr val="tx1"/>
-            </a:fontRef>
-          </p:style>
-        </p:cxnSp>
-        <p:cxnSp>
-          <p:nvCxnSpPr>
-            <p:cNvPr id="7" name="Straight Arrow Connector 6"/>
-            <p:cNvCxnSpPr/>
-            <p:nvPr/>
-          </p:nvCxnSpPr>
-          <p:spPr>
-            <a:xfrm flipH="1">
-              <a:off x="6455228" y="3507379"/>
-              <a:ext cx="555171" cy="901334"/>
-            </a:xfrm>
-            <a:prstGeom prst="straightConnector1">
-              <a:avLst/>
-            </a:prstGeom>
-            <a:ln w="38100">
-              <a:solidFill>
-                <a:schemeClr val="tx1"/>
-              </a:solidFill>
-              <a:tailEnd type="triangle"/>
-            </a:ln>
-          </p:spPr>
-          <p:style>
-            <a:lnRef idx="1">
-              <a:schemeClr val="accent1"/>
-            </a:lnRef>
-            <a:fillRef idx="0">
-              <a:schemeClr val="accent1"/>
-            </a:fillRef>
-            <a:effectRef idx="0">
-              <a:schemeClr val="accent1"/>
-            </a:effectRef>
-            <a:fontRef idx="minor">
-              <a:schemeClr val="tx1"/>
-            </a:fontRef>
-          </p:style>
-        </p:cxnSp>
-        <mc:AlternateContent xmlns:mc="http://schemas.openxmlformats.org/markup-compatibility/2006" xmlns:a14="http://schemas.microsoft.com/office/drawing/2010/main">
-          <mc:Choice Requires="a14">
-            <p:sp>
-              <p:nvSpPr>
-                <p:cNvPr id="8" name="TextBox 7"/>
-                <p:cNvSpPr txBox="1"/>
-                <p:nvPr/>
-              </p:nvSpPr>
-              <p:spPr>
-                <a:xfrm>
-                  <a:off x="9700756" y="3494600"/>
-                  <a:ext cx="214546" cy="307777"/>
-                </a:xfrm>
-                <a:prstGeom prst="rect">
-                  <a:avLst/>
-                </a:prstGeom>
-                <a:noFill/>
-              </p:spPr>
-              <p:txBody>
-                <a:bodyPr wrap="none" lIns="0" tIns="0" rIns="0" bIns="0" rtlCol="0">
-                  <a:spAutoFit/>
-                </a:bodyPr>
-                <a:lstStyle/>
-                <a:p>
-                  <a:pPr/>
-                  <a14:m>
-                    <m:oMathPara xmlns:m="http://schemas.openxmlformats.org/officeDocument/2006/math">
-                      <m:oMathParaPr>
-                        <m:jc m:val="centerGroup"/>
-                      </m:oMathParaPr>
-                      <m:oMath xmlns:m="http://schemas.openxmlformats.org/officeDocument/2006/math">
-                        <m:r>
-                          <a:rPr lang="en-US" sz="2000" b="0" i="1" smtClean="0">
-                            <a:latin typeface="Cambria Math" panose="02040503050406030204" pitchFamily="18" charset="0"/>
-                            <a:cs typeface="Arial" panose="020B0604020202020204" pitchFamily="34" charset="0"/>
-                          </a:rPr>
-                          <m:t>𝑥</m:t>
-                        </m:r>
-                      </m:oMath>
-                    </m:oMathPara>
-                  </a14:m>
-                  <a:endParaRPr lang="en-US" sz="2000" dirty="0">
-                    <a:latin typeface="Arial" panose="020B0604020202020204" pitchFamily="34" charset="0"/>
-                    <a:cs typeface="Arial" panose="020B0604020202020204" pitchFamily="34" charset="0"/>
-                  </a:endParaRPr>
-                </a:p>
-              </p:txBody>
-            </p:sp>
-          </mc:Choice>
-          <mc:Fallback xmlns="">
-            <p:sp>
-              <p:nvSpPr>
-                <p:cNvPr id="8" name="TextBox 7"/>
-                <p:cNvSpPr txBox="1">
-                  <a:spLocks noRot="1" noChangeAspect="1" noMove="1" noResize="1" noEditPoints="1" noAdjustHandles="1" noChangeArrowheads="1" noChangeShapeType="1" noTextEdit="1"/>
-                </p:cNvSpPr>
-                <p:nvPr/>
-              </p:nvSpPr>
-              <p:spPr>
-                <a:xfrm>
-                  <a:off x="9700756" y="3494600"/>
-                  <a:ext cx="214546" cy="307777"/>
-                </a:xfrm>
-                <a:prstGeom prst="rect">
-                  <a:avLst/>
-                </a:prstGeom>
-                <a:blipFill>
-                  <a:blip r:embed="rId2"/>
-                  <a:stretch>
-                    <a:fillRect l="-11111" r="-8333" b="-2000"/>
-                  </a:stretch>
-                </a:blipFill>
-              </p:spPr>
-              <p:txBody>
-                <a:bodyPr/>
-                <a:lstStyle/>
-                <a:p>
-                  <a:r>
-                    <a:rPr lang="en-US">
-                      <a:noFill/>
-                    </a:rPr>
-                    <a:t> </a:t>
-                  </a:r>
-                </a:p>
-              </p:txBody>
-            </p:sp>
-          </mc:Fallback>
-        </mc:AlternateContent>
-        <mc:AlternateContent xmlns:mc="http://schemas.openxmlformats.org/markup-compatibility/2006" xmlns:a14="http://schemas.microsoft.com/office/drawing/2010/main">
-          <mc:Choice Requires="a14">
-            <p:sp>
-              <p:nvSpPr>
-                <p:cNvPr id="9" name="TextBox 8"/>
-                <p:cNvSpPr txBox="1"/>
-                <p:nvPr/>
-              </p:nvSpPr>
-              <p:spPr>
-                <a:xfrm>
-                  <a:off x="6762917" y="699452"/>
-                  <a:ext cx="219163" cy="307777"/>
-                </a:xfrm>
-                <a:prstGeom prst="rect">
-                  <a:avLst/>
-                </a:prstGeom>
-                <a:noFill/>
-              </p:spPr>
-              <p:txBody>
-                <a:bodyPr wrap="none" lIns="0" tIns="0" rIns="0" bIns="0" rtlCol="0">
-                  <a:spAutoFit/>
-                </a:bodyPr>
-                <a:lstStyle/>
-                <a:p>
-                  <a:pPr/>
-                  <a14:m>
-                    <m:oMathPara xmlns:m="http://schemas.openxmlformats.org/officeDocument/2006/math">
-                      <m:oMathParaPr>
-                        <m:jc m:val="centerGroup"/>
-                      </m:oMathParaPr>
-                      <m:oMath xmlns:m="http://schemas.openxmlformats.org/officeDocument/2006/math">
-                        <m:r>
-                          <a:rPr lang="en-US" sz="2000" b="0" i="1" smtClean="0">
-                            <a:latin typeface="Cambria Math" panose="02040503050406030204" pitchFamily="18" charset="0"/>
-                            <a:cs typeface="Arial" panose="020B0604020202020204" pitchFamily="34" charset="0"/>
-                          </a:rPr>
-                          <m:t>𝑦</m:t>
-                        </m:r>
-                      </m:oMath>
-                    </m:oMathPara>
-                  </a14:m>
-                  <a:endParaRPr lang="en-US" sz="2000" dirty="0">
-                    <a:latin typeface="Arial" panose="020B0604020202020204" pitchFamily="34" charset="0"/>
-                    <a:cs typeface="Arial" panose="020B0604020202020204" pitchFamily="34" charset="0"/>
-                  </a:endParaRPr>
-                </a:p>
-              </p:txBody>
-            </p:sp>
-          </mc:Choice>
-          <mc:Fallback xmlns="">
-            <p:sp>
-              <p:nvSpPr>
-                <p:cNvPr id="9" name="TextBox 8"/>
-                <p:cNvSpPr txBox="1">
-                  <a:spLocks noRot="1" noChangeAspect="1" noMove="1" noResize="1" noEditPoints="1" noAdjustHandles="1" noChangeArrowheads="1" noChangeShapeType="1" noTextEdit="1"/>
-                </p:cNvSpPr>
-                <p:nvPr/>
-              </p:nvSpPr>
-              <p:spPr>
-                <a:xfrm>
-                  <a:off x="6762917" y="699452"/>
-                  <a:ext cx="219163" cy="307777"/>
-                </a:xfrm>
-                <a:prstGeom prst="rect">
-                  <a:avLst/>
-                </a:prstGeom>
-                <a:blipFill>
-                  <a:blip r:embed="rId3"/>
-                  <a:stretch>
-                    <a:fillRect l="-25000" r="-25000" b="-27451"/>
-                  </a:stretch>
-                </a:blipFill>
-              </p:spPr>
-              <p:txBody>
-                <a:bodyPr/>
-                <a:lstStyle/>
-                <a:p>
-                  <a:r>
-                    <a:rPr lang="en-US">
-                      <a:noFill/>
-                    </a:rPr>
-                    <a:t> </a:t>
-                  </a:r>
-                </a:p>
-              </p:txBody>
-            </p:sp>
-          </mc:Fallback>
-        </mc:AlternateContent>
-        <mc:AlternateContent xmlns:mc="http://schemas.openxmlformats.org/markup-compatibility/2006" xmlns:a14="http://schemas.microsoft.com/office/drawing/2010/main">
-          <mc:Choice Requires="a14">
-            <p:sp>
-              <p:nvSpPr>
-                <p:cNvPr id="10" name="TextBox 9"/>
-                <p:cNvSpPr txBox="1"/>
-                <p:nvPr/>
-              </p:nvSpPr>
-              <p:spPr>
-                <a:xfrm>
-                  <a:off x="6322609" y="4003221"/>
-                  <a:ext cx="198324" cy="307777"/>
-                </a:xfrm>
-                <a:prstGeom prst="rect">
-                  <a:avLst/>
-                </a:prstGeom>
-                <a:noFill/>
-              </p:spPr>
-              <p:txBody>
-                <a:bodyPr wrap="none" lIns="0" tIns="0" rIns="0" bIns="0" rtlCol="0">
-                  <a:spAutoFit/>
-                </a:bodyPr>
-                <a:lstStyle/>
-                <a:p>
-                  <a:pPr/>
-                  <a14:m>
-                    <m:oMathPara xmlns:m="http://schemas.openxmlformats.org/officeDocument/2006/math">
-                      <m:oMathParaPr>
-                        <m:jc m:val="centerGroup"/>
-                      </m:oMathParaPr>
-                      <m:oMath xmlns:m="http://schemas.openxmlformats.org/officeDocument/2006/math">
-                        <m:r>
-                          <a:rPr lang="en-US" sz="2000" b="0" i="1" smtClean="0">
-                            <a:latin typeface="Cambria Math" panose="02040503050406030204" pitchFamily="18" charset="0"/>
-                            <a:cs typeface="Arial" panose="020B0604020202020204" pitchFamily="34" charset="0"/>
-                          </a:rPr>
-                          <m:t>𝑧</m:t>
-                        </m:r>
-                      </m:oMath>
-                    </m:oMathPara>
-                  </a14:m>
-                  <a:endParaRPr lang="en-US" sz="2000" dirty="0">
-                    <a:latin typeface="Arial" panose="020B0604020202020204" pitchFamily="34" charset="0"/>
-                    <a:cs typeface="Arial" panose="020B0604020202020204" pitchFamily="34" charset="0"/>
-                  </a:endParaRPr>
-                </a:p>
-              </p:txBody>
-            </p:sp>
-          </mc:Choice>
-          <mc:Fallback xmlns="">
-            <p:sp>
-              <p:nvSpPr>
-                <p:cNvPr id="10" name="TextBox 9"/>
-                <p:cNvSpPr txBox="1">
-                  <a:spLocks noRot="1" noChangeAspect="1" noMove="1" noResize="1" noEditPoints="1" noAdjustHandles="1" noChangeArrowheads="1" noChangeShapeType="1" noTextEdit="1"/>
-                </p:cNvSpPr>
-                <p:nvPr/>
-              </p:nvSpPr>
-              <p:spPr>
-                <a:xfrm>
-                  <a:off x="6322609" y="4003221"/>
-                  <a:ext cx="198324" cy="307777"/>
-                </a:xfrm>
-                <a:prstGeom prst="rect">
-                  <a:avLst/>
-                </a:prstGeom>
-                <a:blipFill>
-                  <a:blip r:embed="rId4"/>
-                  <a:stretch>
-                    <a:fillRect l="-12121" r="-12121" b="-1961"/>
-                  </a:stretch>
-                </a:blipFill>
-              </p:spPr>
-              <p:txBody>
-                <a:bodyPr/>
-                <a:lstStyle/>
-                <a:p>
-                  <a:r>
-                    <a:rPr lang="en-US">
-                      <a:noFill/>
-                    </a:rPr>
-                    <a:t> </a:t>
-                  </a:r>
-                </a:p>
-              </p:txBody>
-            </p:sp>
-          </mc:Fallback>
-        </mc:AlternateContent>
-      </p:grpSp>
-    </p:spTree>
-    <p:extLst>
-      <p:ext uri="{BB962C8B-B14F-4D97-AF65-F5344CB8AC3E}">
-        <p14:creationId xmlns:p14="http://schemas.microsoft.com/office/powerpoint/2010/main" val="1135091936"/>
-      </p:ext>
-    </p:extLst>
-  </p:cSld>
-  <p:clrMapOvr>
-    <a:masterClrMapping/>
-  </p:clrMapOvr>
-</p:sld>
-</file>
-
-<file path=ppt/slides/slide3.xml><?xml version="1.0" encoding="utf-8"?>
-<p:sld xmlns:a="http://schemas.openxmlformats.org/drawingml/2006/main" xmlns:r="http://schemas.openxmlformats.org/officeDocument/2006/relationships" xmlns:p="http://schemas.openxmlformats.org/presentationml/2006/main">
-  <p:cSld>
-    <p:spTree>
-      <p:nvGrpSpPr>
-        <p:cNvPr id="1" name=""/>
-        <p:cNvGrpSpPr/>
-        <p:nvPr/>
-      </p:nvGrpSpPr>
-      <p:grpSpPr>
-        <a:xfrm>
-          <a:off x="0" y="0"/>
-          <a:ext cx="0" cy="0"/>
-          <a:chOff x="0" y="0"/>
-          <a:chExt cx="0" cy="0"/>
-        </a:xfrm>
-      </p:grpSpPr>
-      <p:grpSp>
-        <p:nvGrpSpPr>
           <p:cNvPr id="166" name="Group 165"/>
           <p:cNvGrpSpPr/>
           <p:nvPr/>
         </p:nvGrpSpPr>
         <p:grpSpPr>
           <a:xfrm>
-            <a:off x="937654" y="441194"/>
+            <a:off x="402077" y="323628"/>
             <a:ext cx="6428374" cy="3582166"/>
             <a:chOff x="937654" y="441194"/>
             <a:chExt cx="6428374" cy="3582166"/>
@@ -16332,10 +15915,4062 @@
           </mc:Fallback>
         </mc:AlternateContent>
       </p:grpSp>
+      <p:grpSp>
+        <p:nvGrpSpPr>
+          <p:cNvPr id="155" name="Group 154">
+            <a:extLst>
+              <a:ext uri="{FF2B5EF4-FFF2-40B4-BE49-F238E27FC236}">
+                <a16:creationId xmlns:a16="http://schemas.microsoft.com/office/drawing/2014/main" id="{B080555A-1868-4646-90FD-B0BD0027C1E9}"/>
+              </a:ext>
+            </a:extLst>
+          </p:cNvPr>
+          <p:cNvGrpSpPr/>
+          <p:nvPr/>
+        </p:nvGrpSpPr>
+        <p:grpSpPr>
+          <a:xfrm>
+            <a:off x="8493145" y="120878"/>
+            <a:ext cx="3592693" cy="3712027"/>
+            <a:chOff x="6322609" y="696686"/>
+            <a:chExt cx="3592693" cy="3712027"/>
+          </a:xfrm>
+        </p:grpSpPr>
+        <p:cxnSp>
+          <p:nvCxnSpPr>
+            <p:cNvPr id="157" name="Straight Arrow Connector 156">
+              <a:extLst>
+                <a:ext uri="{FF2B5EF4-FFF2-40B4-BE49-F238E27FC236}">
+                  <a16:creationId xmlns:a16="http://schemas.microsoft.com/office/drawing/2014/main" id="{61539533-A454-504F-9894-E87FD7FB7636}"/>
+                </a:ext>
+              </a:extLst>
+            </p:cNvPr>
+            <p:cNvCxnSpPr/>
+            <p:nvPr/>
+          </p:nvCxnSpPr>
+          <p:spPr>
+            <a:xfrm flipV="1">
+              <a:off x="7010400" y="696686"/>
+              <a:ext cx="0" cy="2797914"/>
+            </a:xfrm>
+            <a:prstGeom prst="straightConnector1">
+              <a:avLst/>
+            </a:prstGeom>
+            <a:ln w="38100">
+              <a:solidFill>
+                <a:schemeClr val="tx1"/>
+              </a:solidFill>
+              <a:tailEnd type="triangle"/>
+            </a:ln>
+          </p:spPr>
+          <p:style>
+            <a:lnRef idx="1">
+              <a:schemeClr val="accent1"/>
+            </a:lnRef>
+            <a:fillRef idx="0">
+              <a:schemeClr val="accent1"/>
+            </a:fillRef>
+            <a:effectRef idx="0">
+              <a:schemeClr val="accent1"/>
+            </a:effectRef>
+            <a:fontRef idx="minor">
+              <a:schemeClr val="tx1"/>
+            </a:fontRef>
+          </p:style>
+        </p:cxnSp>
+        <p:cxnSp>
+          <p:nvCxnSpPr>
+            <p:cNvPr id="160" name="Straight Arrow Connector 159">
+              <a:extLst>
+                <a:ext uri="{FF2B5EF4-FFF2-40B4-BE49-F238E27FC236}">
+                  <a16:creationId xmlns:a16="http://schemas.microsoft.com/office/drawing/2014/main" id="{9139FD97-B401-8D4F-A464-FBB5D837A92E}"/>
+                </a:ext>
+              </a:extLst>
+            </p:cNvPr>
+            <p:cNvCxnSpPr/>
+            <p:nvPr/>
+          </p:nvCxnSpPr>
+          <p:spPr>
+            <a:xfrm flipV="1">
+              <a:off x="7010400" y="3507379"/>
+              <a:ext cx="2797629" cy="1"/>
+            </a:xfrm>
+            <a:prstGeom prst="straightConnector1">
+              <a:avLst/>
+            </a:prstGeom>
+            <a:ln w="38100">
+              <a:solidFill>
+                <a:schemeClr val="tx1"/>
+              </a:solidFill>
+              <a:tailEnd type="triangle"/>
+            </a:ln>
+          </p:spPr>
+          <p:style>
+            <a:lnRef idx="1">
+              <a:schemeClr val="accent1"/>
+            </a:lnRef>
+            <a:fillRef idx="0">
+              <a:schemeClr val="accent1"/>
+            </a:fillRef>
+            <a:effectRef idx="0">
+              <a:schemeClr val="accent1"/>
+            </a:effectRef>
+            <a:fontRef idx="minor">
+              <a:schemeClr val="tx1"/>
+            </a:fontRef>
+          </p:style>
+        </p:cxnSp>
+        <p:cxnSp>
+          <p:nvCxnSpPr>
+            <p:cNvPr id="162" name="Straight Arrow Connector 161">
+              <a:extLst>
+                <a:ext uri="{FF2B5EF4-FFF2-40B4-BE49-F238E27FC236}">
+                  <a16:creationId xmlns:a16="http://schemas.microsoft.com/office/drawing/2014/main" id="{83DB720C-417D-494D-BDA5-AA44C84BB20B}"/>
+                </a:ext>
+              </a:extLst>
+            </p:cNvPr>
+            <p:cNvCxnSpPr/>
+            <p:nvPr/>
+          </p:nvCxnSpPr>
+          <p:spPr>
+            <a:xfrm flipH="1">
+              <a:off x="6455228" y="3507379"/>
+              <a:ext cx="555171" cy="901334"/>
+            </a:xfrm>
+            <a:prstGeom prst="straightConnector1">
+              <a:avLst/>
+            </a:prstGeom>
+            <a:ln w="38100">
+              <a:solidFill>
+                <a:schemeClr val="tx1"/>
+              </a:solidFill>
+              <a:tailEnd type="triangle"/>
+            </a:ln>
+          </p:spPr>
+          <p:style>
+            <a:lnRef idx="1">
+              <a:schemeClr val="accent1"/>
+            </a:lnRef>
+            <a:fillRef idx="0">
+              <a:schemeClr val="accent1"/>
+            </a:fillRef>
+            <a:effectRef idx="0">
+              <a:schemeClr val="accent1"/>
+            </a:effectRef>
+            <a:fontRef idx="minor">
+              <a:schemeClr val="tx1"/>
+            </a:fontRef>
+          </p:style>
+        </p:cxnSp>
+        <mc:AlternateContent xmlns:mc="http://schemas.openxmlformats.org/markup-compatibility/2006" xmlns:a14="http://schemas.microsoft.com/office/drawing/2010/main">
+          <mc:Choice Requires="a14">
+            <p:sp>
+              <p:nvSpPr>
+                <p:cNvPr id="163" name="TextBox 162">
+                  <a:extLst>
+                    <a:ext uri="{FF2B5EF4-FFF2-40B4-BE49-F238E27FC236}">
+                      <a16:creationId xmlns:a16="http://schemas.microsoft.com/office/drawing/2014/main" id="{9967F923-C412-6540-A951-5F2926DD6C32}"/>
+                    </a:ext>
+                  </a:extLst>
+                </p:cNvPr>
+                <p:cNvSpPr txBox="1"/>
+                <p:nvPr/>
+              </p:nvSpPr>
+              <p:spPr>
+                <a:xfrm>
+                  <a:off x="9700756" y="3494600"/>
+                  <a:ext cx="214546" cy="307777"/>
+                </a:xfrm>
+                <a:prstGeom prst="rect">
+                  <a:avLst/>
+                </a:prstGeom>
+                <a:noFill/>
+              </p:spPr>
+              <p:txBody>
+                <a:bodyPr wrap="none" lIns="0" tIns="0" rIns="0" bIns="0" rtlCol="0">
+                  <a:spAutoFit/>
+                </a:bodyPr>
+                <a:lstStyle/>
+                <a:p>
+                  <a:pPr/>
+                  <a14:m>
+                    <m:oMathPara xmlns:m="http://schemas.openxmlformats.org/officeDocument/2006/math">
+                      <m:oMathParaPr>
+                        <m:jc m:val="centerGroup"/>
+                      </m:oMathParaPr>
+                      <m:oMath xmlns:m="http://schemas.openxmlformats.org/officeDocument/2006/math">
+                        <m:r>
+                          <a:rPr lang="en-US" sz="2000" b="0" i="1" smtClean="0">
+                            <a:latin typeface="Cambria Math" panose="02040503050406030204" pitchFamily="18" charset="0"/>
+                            <a:cs typeface="Arial" panose="020B0604020202020204" pitchFamily="34" charset="0"/>
+                          </a:rPr>
+                          <m:t>𝑥</m:t>
+                        </m:r>
+                      </m:oMath>
+                    </m:oMathPara>
+                  </a14:m>
+                  <a:endParaRPr lang="en-US" sz="2000" dirty="0">
+                    <a:latin typeface="Arial" panose="020B0604020202020204" pitchFamily="34" charset="0"/>
+                    <a:cs typeface="Arial" panose="020B0604020202020204" pitchFamily="34" charset="0"/>
+                  </a:endParaRPr>
+                </a:p>
+              </p:txBody>
+            </p:sp>
+          </mc:Choice>
+          <mc:Fallback xmlns="">
+            <p:sp>
+              <p:nvSpPr>
+                <p:cNvPr id="8" name="TextBox 7"/>
+                <p:cNvSpPr txBox="1">
+                  <a:spLocks noRot="1" noChangeAspect="1" noMove="1" noResize="1" noEditPoints="1" noAdjustHandles="1" noChangeArrowheads="1" noChangeShapeType="1" noTextEdit="1"/>
+                </p:cNvSpPr>
+                <p:nvPr/>
+              </p:nvSpPr>
+              <p:spPr>
+                <a:xfrm>
+                  <a:off x="9700756" y="3494600"/>
+                  <a:ext cx="214546" cy="307777"/>
+                </a:xfrm>
+                <a:prstGeom prst="rect">
+                  <a:avLst/>
+                </a:prstGeom>
+                <a:blipFill>
+                  <a:blip r:embed="rId13"/>
+                  <a:stretch>
+                    <a:fillRect l="-11111" r="-8333" b="-2000"/>
+                  </a:stretch>
+                </a:blipFill>
+              </p:spPr>
+              <p:txBody>
+                <a:bodyPr/>
+                <a:lstStyle/>
+                <a:p>
+                  <a:r>
+                    <a:rPr lang="en-US">
+                      <a:noFill/>
+                    </a:rPr>
+                    <a:t> </a:t>
+                  </a:r>
+                </a:p>
+              </p:txBody>
+            </p:sp>
+          </mc:Fallback>
+        </mc:AlternateContent>
+        <mc:AlternateContent xmlns:mc="http://schemas.openxmlformats.org/markup-compatibility/2006" xmlns:a14="http://schemas.microsoft.com/office/drawing/2010/main">
+          <mc:Choice Requires="a14">
+            <p:sp>
+              <p:nvSpPr>
+                <p:cNvPr id="167" name="TextBox 166">
+                  <a:extLst>
+                    <a:ext uri="{FF2B5EF4-FFF2-40B4-BE49-F238E27FC236}">
+                      <a16:creationId xmlns:a16="http://schemas.microsoft.com/office/drawing/2014/main" id="{AC690EEB-BC2A-4148-80F7-7DA8F322D193}"/>
+                    </a:ext>
+                  </a:extLst>
+                </p:cNvPr>
+                <p:cNvSpPr txBox="1"/>
+                <p:nvPr/>
+              </p:nvSpPr>
+              <p:spPr>
+                <a:xfrm>
+                  <a:off x="6762917" y="699452"/>
+                  <a:ext cx="219163" cy="307777"/>
+                </a:xfrm>
+                <a:prstGeom prst="rect">
+                  <a:avLst/>
+                </a:prstGeom>
+                <a:noFill/>
+              </p:spPr>
+              <p:txBody>
+                <a:bodyPr wrap="none" lIns="0" tIns="0" rIns="0" bIns="0" rtlCol="0">
+                  <a:spAutoFit/>
+                </a:bodyPr>
+                <a:lstStyle/>
+                <a:p>
+                  <a:pPr/>
+                  <a14:m>
+                    <m:oMathPara xmlns:m="http://schemas.openxmlformats.org/officeDocument/2006/math">
+                      <m:oMathParaPr>
+                        <m:jc m:val="centerGroup"/>
+                      </m:oMathParaPr>
+                      <m:oMath xmlns:m="http://schemas.openxmlformats.org/officeDocument/2006/math">
+                        <m:r>
+                          <a:rPr lang="en-US" sz="2000" b="0" i="1" smtClean="0">
+                            <a:latin typeface="Cambria Math" panose="02040503050406030204" pitchFamily="18" charset="0"/>
+                            <a:cs typeface="Arial" panose="020B0604020202020204" pitchFamily="34" charset="0"/>
+                          </a:rPr>
+                          <m:t>𝑦</m:t>
+                        </m:r>
+                      </m:oMath>
+                    </m:oMathPara>
+                  </a14:m>
+                  <a:endParaRPr lang="en-US" sz="2000" dirty="0">
+                    <a:latin typeface="Arial" panose="020B0604020202020204" pitchFamily="34" charset="0"/>
+                    <a:cs typeface="Arial" panose="020B0604020202020204" pitchFamily="34" charset="0"/>
+                  </a:endParaRPr>
+                </a:p>
+              </p:txBody>
+            </p:sp>
+          </mc:Choice>
+          <mc:Fallback xmlns="">
+            <p:sp>
+              <p:nvSpPr>
+                <p:cNvPr id="9" name="TextBox 8"/>
+                <p:cNvSpPr txBox="1">
+                  <a:spLocks noRot="1" noChangeAspect="1" noMove="1" noResize="1" noEditPoints="1" noAdjustHandles="1" noChangeArrowheads="1" noChangeShapeType="1" noTextEdit="1"/>
+                </p:cNvSpPr>
+                <p:nvPr/>
+              </p:nvSpPr>
+              <p:spPr>
+                <a:xfrm>
+                  <a:off x="6762917" y="699452"/>
+                  <a:ext cx="219163" cy="307777"/>
+                </a:xfrm>
+                <a:prstGeom prst="rect">
+                  <a:avLst/>
+                </a:prstGeom>
+                <a:blipFill>
+                  <a:blip r:embed="rId14"/>
+                  <a:stretch>
+                    <a:fillRect l="-25000" r="-25000" b="-27451"/>
+                  </a:stretch>
+                </a:blipFill>
+              </p:spPr>
+              <p:txBody>
+                <a:bodyPr/>
+                <a:lstStyle/>
+                <a:p>
+                  <a:r>
+                    <a:rPr lang="en-US">
+                      <a:noFill/>
+                    </a:rPr>
+                    <a:t> </a:t>
+                  </a:r>
+                </a:p>
+              </p:txBody>
+            </p:sp>
+          </mc:Fallback>
+        </mc:AlternateContent>
+        <mc:AlternateContent xmlns:mc="http://schemas.openxmlformats.org/markup-compatibility/2006" xmlns:a14="http://schemas.microsoft.com/office/drawing/2010/main">
+          <mc:Choice Requires="a14">
+            <p:sp>
+              <p:nvSpPr>
+                <p:cNvPr id="168" name="TextBox 167">
+                  <a:extLst>
+                    <a:ext uri="{FF2B5EF4-FFF2-40B4-BE49-F238E27FC236}">
+                      <a16:creationId xmlns:a16="http://schemas.microsoft.com/office/drawing/2014/main" id="{F1DF1C1A-23F7-DE44-BC00-99D97266013A}"/>
+                    </a:ext>
+                  </a:extLst>
+                </p:cNvPr>
+                <p:cNvSpPr txBox="1"/>
+                <p:nvPr/>
+              </p:nvSpPr>
+              <p:spPr>
+                <a:xfrm>
+                  <a:off x="6322609" y="4003221"/>
+                  <a:ext cx="198324" cy="307777"/>
+                </a:xfrm>
+                <a:prstGeom prst="rect">
+                  <a:avLst/>
+                </a:prstGeom>
+                <a:noFill/>
+              </p:spPr>
+              <p:txBody>
+                <a:bodyPr wrap="none" lIns="0" tIns="0" rIns="0" bIns="0" rtlCol="0">
+                  <a:spAutoFit/>
+                </a:bodyPr>
+                <a:lstStyle/>
+                <a:p>
+                  <a:pPr/>
+                  <a14:m>
+                    <m:oMathPara xmlns:m="http://schemas.openxmlformats.org/officeDocument/2006/math">
+                      <m:oMathParaPr>
+                        <m:jc m:val="centerGroup"/>
+                      </m:oMathParaPr>
+                      <m:oMath xmlns:m="http://schemas.openxmlformats.org/officeDocument/2006/math">
+                        <m:r>
+                          <a:rPr lang="en-US" sz="2000" b="0" i="1" smtClean="0">
+                            <a:latin typeface="Cambria Math" panose="02040503050406030204" pitchFamily="18" charset="0"/>
+                            <a:cs typeface="Arial" panose="020B0604020202020204" pitchFamily="34" charset="0"/>
+                          </a:rPr>
+                          <m:t>𝑧</m:t>
+                        </m:r>
+                      </m:oMath>
+                    </m:oMathPara>
+                  </a14:m>
+                  <a:endParaRPr lang="en-US" sz="2000" dirty="0">
+                    <a:latin typeface="Arial" panose="020B0604020202020204" pitchFamily="34" charset="0"/>
+                    <a:cs typeface="Arial" panose="020B0604020202020204" pitchFamily="34" charset="0"/>
+                  </a:endParaRPr>
+                </a:p>
+              </p:txBody>
+            </p:sp>
+          </mc:Choice>
+          <mc:Fallback xmlns="">
+            <p:sp>
+              <p:nvSpPr>
+                <p:cNvPr id="10" name="TextBox 9"/>
+                <p:cNvSpPr txBox="1">
+                  <a:spLocks noRot="1" noChangeAspect="1" noMove="1" noResize="1" noEditPoints="1" noAdjustHandles="1" noChangeArrowheads="1" noChangeShapeType="1" noTextEdit="1"/>
+                </p:cNvSpPr>
+                <p:nvPr/>
+              </p:nvSpPr>
+              <p:spPr>
+                <a:xfrm>
+                  <a:off x="6322609" y="4003221"/>
+                  <a:ext cx="198324" cy="307777"/>
+                </a:xfrm>
+                <a:prstGeom prst="rect">
+                  <a:avLst/>
+                </a:prstGeom>
+                <a:blipFill>
+                  <a:blip r:embed="rId15"/>
+                  <a:stretch>
+                    <a:fillRect l="-12121" r="-12121" b="-1961"/>
+                  </a:stretch>
+                </a:blipFill>
+              </p:spPr>
+              <p:txBody>
+                <a:bodyPr/>
+                <a:lstStyle/>
+                <a:p>
+                  <a:r>
+                    <a:rPr lang="en-US">
+                      <a:noFill/>
+                    </a:rPr>
+                    <a:t> </a:t>
+                  </a:r>
+                </a:p>
+              </p:txBody>
+            </p:sp>
+          </mc:Fallback>
+        </mc:AlternateContent>
+      </p:grpSp>
     </p:spTree>
     <p:extLst>
       <p:ext uri="{BB962C8B-B14F-4D97-AF65-F5344CB8AC3E}">
         <p14:creationId xmlns:p14="http://schemas.microsoft.com/office/powerpoint/2010/main" val="2217555735"/>
+      </p:ext>
+    </p:extLst>
+  </p:cSld>
+  <p:clrMapOvr>
+    <a:masterClrMapping/>
+  </p:clrMapOvr>
+</p:sld>
+</file>
+
+<file path=ppt/slides/slide3.xml><?xml version="1.0" encoding="utf-8"?>
+<p:sld xmlns:a="http://schemas.openxmlformats.org/drawingml/2006/main" xmlns:r="http://schemas.openxmlformats.org/officeDocument/2006/relationships" xmlns:p="http://schemas.openxmlformats.org/presentationml/2006/main">
+  <p:cSld>
+    <p:spTree>
+      <p:nvGrpSpPr>
+        <p:cNvPr id="1" name=""/>
+        <p:cNvGrpSpPr/>
+        <p:nvPr/>
+      </p:nvGrpSpPr>
+      <p:grpSpPr>
+        <a:xfrm>
+          <a:off x="0" y="0"/>
+          <a:ext cx="0" cy="0"/>
+          <a:chOff x="0" y="0"/>
+          <a:chExt cx="0" cy="0"/>
+        </a:xfrm>
+      </p:grpSpPr>
+      <p:grpSp>
+        <p:nvGrpSpPr>
+          <p:cNvPr id="60" name="Group 59">
+            <a:extLst>
+              <a:ext uri="{FF2B5EF4-FFF2-40B4-BE49-F238E27FC236}">
+                <a16:creationId xmlns:a16="http://schemas.microsoft.com/office/drawing/2014/main" id="{4BA66DBA-B702-CF47-AD6A-362C27DE5119}"/>
+              </a:ext>
+            </a:extLst>
+          </p:cNvPr>
+          <p:cNvGrpSpPr/>
+          <p:nvPr/>
+        </p:nvGrpSpPr>
+        <p:grpSpPr>
+          <a:xfrm>
+            <a:off x="-247235" y="335390"/>
+            <a:ext cx="2014485" cy="1911208"/>
+            <a:chOff x="6432979" y="2435006"/>
+            <a:chExt cx="2014485" cy="1911208"/>
+          </a:xfrm>
+        </p:grpSpPr>
+        <p:cxnSp>
+          <p:nvCxnSpPr>
+            <p:cNvPr id="61" name="Straight Arrow Connector 60">
+              <a:extLst>
+                <a:ext uri="{FF2B5EF4-FFF2-40B4-BE49-F238E27FC236}">
+                  <a16:creationId xmlns:a16="http://schemas.microsoft.com/office/drawing/2014/main" id="{FD3EE3F3-F827-AA47-94DB-4757D8211796}"/>
+                </a:ext>
+              </a:extLst>
+            </p:cNvPr>
+            <p:cNvCxnSpPr/>
+            <p:nvPr/>
+          </p:nvCxnSpPr>
+          <p:spPr>
+            <a:xfrm flipV="1">
+              <a:off x="7009017" y="2435006"/>
+              <a:ext cx="0" cy="1080000"/>
+            </a:xfrm>
+            <a:prstGeom prst="straightConnector1">
+              <a:avLst/>
+            </a:prstGeom>
+            <a:ln w="38100">
+              <a:solidFill>
+                <a:schemeClr val="tx1"/>
+              </a:solidFill>
+              <a:tailEnd type="triangle"/>
+            </a:ln>
+          </p:spPr>
+          <p:style>
+            <a:lnRef idx="1">
+              <a:schemeClr val="accent1"/>
+            </a:lnRef>
+            <a:fillRef idx="0">
+              <a:schemeClr val="accent1"/>
+            </a:fillRef>
+            <a:effectRef idx="0">
+              <a:schemeClr val="accent1"/>
+            </a:effectRef>
+            <a:fontRef idx="minor">
+              <a:schemeClr val="tx1"/>
+            </a:fontRef>
+          </p:style>
+        </p:cxnSp>
+        <p:cxnSp>
+          <p:nvCxnSpPr>
+            <p:cNvPr id="62" name="Straight Arrow Connector 61">
+              <a:extLst>
+                <a:ext uri="{FF2B5EF4-FFF2-40B4-BE49-F238E27FC236}">
+                  <a16:creationId xmlns:a16="http://schemas.microsoft.com/office/drawing/2014/main" id="{03CA7B6F-9BD7-FC4B-9CE7-451FCFE28493}"/>
+                </a:ext>
+              </a:extLst>
+            </p:cNvPr>
+            <p:cNvCxnSpPr/>
+            <p:nvPr/>
+          </p:nvCxnSpPr>
+          <p:spPr>
+            <a:xfrm flipV="1">
+              <a:off x="7010400" y="3507379"/>
+              <a:ext cx="1080000" cy="1"/>
+            </a:xfrm>
+            <a:prstGeom prst="straightConnector1">
+              <a:avLst/>
+            </a:prstGeom>
+            <a:ln w="38100">
+              <a:solidFill>
+                <a:schemeClr val="tx1"/>
+              </a:solidFill>
+              <a:tailEnd type="triangle"/>
+            </a:ln>
+          </p:spPr>
+          <p:style>
+            <a:lnRef idx="1">
+              <a:schemeClr val="accent1"/>
+            </a:lnRef>
+            <a:fillRef idx="0">
+              <a:schemeClr val="accent1"/>
+            </a:fillRef>
+            <a:effectRef idx="0">
+              <a:schemeClr val="accent1"/>
+            </a:effectRef>
+            <a:fontRef idx="minor">
+              <a:schemeClr val="tx1"/>
+            </a:fontRef>
+          </p:style>
+        </p:cxnSp>
+        <p:cxnSp>
+          <p:nvCxnSpPr>
+            <p:cNvPr id="63" name="Straight Arrow Connector 62">
+              <a:extLst>
+                <a:ext uri="{FF2B5EF4-FFF2-40B4-BE49-F238E27FC236}">
+                  <a16:creationId xmlns:a16="http://schemas.microsoft.com/office/drawing/2014/main" id="{0C34C53B-004E-6348-B63D-E1E1BA8032F6}"/>
+                </a:ext>
+              </a:extLst>
+            </p:cNvPr>
+            <p:cNvCxnSpPr>
+              <a:cxnSpLocks/>
+            </p:cNvCxnSpPr>
+            <p:nvPr/>
+          </p:nvCxnSpPr>
+          <p:spPr>
+            <a:xfrm flipH="1">
+              <a:off x="6647525" y="3507379"/>
+              <a:ext cx="362876" cy="531058"/>
+            </a:xfrm>
+            <a:prstGeom prst="straightConnector1">
+              <a:avLst/>
+            </a:prstGeom>
+            <a:ln w="38100">
+              <a:solidFill>
+                <a:schemeClr val="tx1"/>
+              </a:solidFill>
+              <a:tailEnd type="triangle"/>
+            </a:ln>
+          </p:spPr>
+          <p:style>
+            <a:lnRef idx="1">
+              <a:schemeClr val="accent1"/>
+            </a:lnRef>
+            <a:fillRef idx="0">
+              <a:schemeClr val="accent1"/>
+            </a:fillRef>
+            <a:effectRef idx="0">
+              <a:schemeClr val="accent1"/>
+            </a:effectRef>
+            <a:fontRef idx="minor">
+              <a:schemeClr val="tx1"/>
+            </a:fontRef>
+          </p:style>
+        </p:cxnSp>
+        <mc:AlternateContent xmlns:mc="http://schemas.openxmlformats.org/markup-compatibility/2006">
+          <mc:Choice xmlns:a14="http://schemas.microsoft.com/office/drawing/2010/main" Requires="a14">
+            <p:sp>
+              <p:nvSpPr>
+                <p:cNvPr id="64" name="TextBox 63">
+                  <a:extLst>
+                    <a:ext uri="{FF2B5EF4-FFF2-40B4-BE49-F238E27FC236}">
+                      <a16:creationId xmlns:a16="http://schemas.microsoft.com/office/drawing/2014/main" id="{14564ACD-7E2E-2C40-B8DE-C7D2A1076136}"/>
+                    </a:ext>
+                  </a:extLst>
+                </p:cNvPr>
+                <p:cNvSpPr txBox="1"/>
+                <p:nvPr/>
+              </p:nvSpPr>
+              <p:spPr>
+                <a:xfrm>
+                  <a:off x="8228301" y="3360226"/>
+                  <a:ext cx="219163" cy="307777"/>
+                </a:xfrm>
+                <a:prstGeom prst="rect">
+                  <a:avLst/>
+                </a:prstGeom>
+                <a:noFill/>
+              </p:spPr>
+              <p:txBody>
+                <a:bodyPr wrap="none" lIns="0" tIns="0" rIns="0" bIns="0" rtlCol="0">
+                  <a:spAutoFit/>
+                </a:bodyPr>
+                <a:lstStyle/>
+                <a:p>
+                  <a:pPr/>
+                  <a14:m>
+                    <m:oMathPara xmlns:m="http://schemas.openxmlformats.org/officeDocument/2006/math">
+                      <m:oMathParaPr>
+                        <m:jc m:val="centerGroup"/>
+                      </m:oMathParaPr>
+                      <m:oMath xmlns:m="http://schemas.openxmlformats.org/officeDocument/2006/math">
+                        <m:r>
+                          <a:rPr lang="en-CA" sz="2000" b="0" i="1" smtClean="0">
+                            <a:latin typeface="Cambria Math" panose="02040503050406030204" pitchFamily="18" charset="0"/>
+                            <a:cs typeface="Arial" panose="020B0604020202020204" pitchFamily="34" charset="0"/>
+                          </a:rPr>
+                          <m:t>𝑦</m:t>
+                        </m:r>
+                      </m:oMath>
+                    </m:oMathPara>
+                  </a14:m>
+                  <a:endParaRPr lang="en-US" sz="2000" dirty="0">
+                    <a:latin typeface="Arial" panose="020B0604020202020204" pitchFamily="34" charset="0"/>
+                    <a:cs typeface="Arial" panose="020B0604020202020204" pitchFamily="34" charset="0"/>
+                  </a:endParaRPr>
+                </a:p>
+              </p:txBody>
+            </p:sp>
+          </mc:Choice>
+          <mc:Fallback>
+            <p:sp>
+              <p:nvSpPr>
+                <p:cNvPr id="64" name="TextBox 63">
+                  <a:extLst>
+                    <a:ext uri="{FF2B5EF4-FFF2-40B4-BE49-F238E27FC236}">
+                      <a16:creationId xmlns:a16="http://schemas.microsoft.com/office/drawing/2014/main" id="{14564ACD-7E2E-2C40-B8DE-C7D2A1076136}"/>
+                    </a:ext>
+                  </a:extLst>
+                </p:cNvPr>
+                <p:cNvSpPr txBox="1">
+                  <a:spLocks noRot="1" noChangeAspect="1" noMove="1" noResize="1" noEditPoints="1" noAdjustHandles="1" noChangeArrowheads="1" noChangeShapeType="1" noTextEdit="1"/>
+                </p:cNvSpPr>
+                <p:nvPr/>
+              </p:nvSpPr>
+              <p:spPr>
+                <a:xfrm>
+                  <a:off x="8228301" y="3360226"/>
+                  <a:ext cx="219163" cy="307777"/>
+                </a:xfrm>
+                <a:prstGeom prst="rect">
+                  <a:avLst/>
+                </a:prstGeom>
+                <a:blipFill>
+                  <a:blip r:embed="rId2"/>
+                  <a:stretch>
+                    <a:fillRect l="-16667" r="-16667" b="-24000"/>
+                  </a:stretch>
+                </a:blipFill>
+              </p:spPr>
+              <p:txBody>
+                <a:bodyPr/>
+                <a:lstStyle/>
+                <a:p>
+                  <a:r>
+                    <a:rPr lang="en-US">
+                      <a:noFill/>
+                    </a:rPr>
+                    <a:t> </a:t>
+                  </a:r>
+                </a:p>
+              </p:txBody>
+            </p:sp>
+          </mc:Fallback>
+        </mc:AlternateContent>
+        <mc:AlternateContent xmlns:mc="http://schemas.openxmlformats.org/markup-compatibility/2006">
+          <mc:Choice xmlns:a14="http://schemas.microsoft.com/office/drawing/2010/main" Requires="a14">
+            <p:sp>
+              <p:nvSpPr>
+                <p:cNvPr id="65" name="TextBox 64">
+                  <a:extLst>
+                    <a:ext uri="{FF2B5EF4-FFF2-40B4-BE49-F238E27FC236}">
+                      <a16:creationId xmlns:a16="http://schemas.microsoft.com/office/drawing/2014/main" id="{2B5BBF8A-E71F-3A46-BE51-879D0C54F646}"/>
+                    </a:ext>
+                  </a:extLst>
+                </p:cNvPr>
+                <p:cNvSpPr txBox="1"/>
+                <p:nvPr/>
+              </p:nvSpPr>
+              <p:spPr>
+                <a:xfrm>
+                  <a:off x="6761534" y="2437772"/>
+                  <a:ext cx="198324" cy="307777"/>
+                </a:xfrm>
+                <a:prstGeom prst="rect">
+                  <a:avLst/>
+                </a:prstGeom>
+                <a:noFill/>
+              </p:spPr>
+              <p:txBody>
+                <a:bodyPr wrap="none" lIns="0" tIns="0" rIns="0" bIns="0" rtlCol="0">
+                  <a:spAutoFit/>
+                </a:bodyPr>
+                <a:lstStyle/>
+                <a:p>
+                  <a:pPr/>
+                  <a14:m>
+                    <m:oMathPara xmlns:m="http://schemas.openxmlformats.org/officeDocument/2006/math">
+                      <m:oMathParaPr>
+                        <m:jc m:val="centerGroup"/>
+                      </m:oMathParaPr>
+                      <m:oMath xmlns:m="http://schemas.openxmlformats.org/officeDocument/2006/math">
+                        <m:r>
+                          <a:rPr lang="en-CA" sz="2000" b="0" i="1" smtClean="0">
+                            <a:latin typeface="Cambria Math" panose="02040503050406030204" pitchFamily="18" charset="0"/>
+                            <a:cs typeface="Arial" panose="020B0604020202020204" pitchFamily="34" charset="0"/>
+                          </a:rPr>
+                          <m:t>𝑧</m:t>
+                        </m:r>
+                      </m:oMath>
+                    </m:oMathPara>
+                  </a14:m>
+                  <a:endParaRPr lang="en-US" sz="2000" dirty="0">
+                    <a:latin typeface="Arial" panose="020B0604020202020204" pitchFamily="34" charset="0"/>
+                    <a:cs typeface="Arial" panose="020B0604020202020204" pitchFamily="34" charset="0"/>
+                  </a:endParaRPr>
+                </a:p>
+              </p:txBody>
+            </p:sp>
+          </mc:Choice>
+          <mc:Fallback>
+            <p:sp>
+              <p:nvSpPr>
+                <p:cNvPr id="65" name="TextBox 64">
+                  <a:extLst>
+                    <a:ext uri="{FF2B5EF4-FFF2-40B4-BE49-F238E27FC236}">
+                      <a16:creationId xmlns:a16="http://schemas.microsoft.com/office/drawing/2014/main" id="{2B5BBF8A-E71F-3A46-BE51-879D0C54F646}"/>
+                    </a:ext>
+                  </a:extLst>
+                </p:cNvPr>
+                <p:cNvSpPr txBox="1">
+                  <a:spLocks noRot="1" noChangeAspect="1" noMove="1" noResize="1" noEditPoints="1" noAdjustHandles="1" noChangeArrowheads="1" noChangeShapeType="1" noTextEdit="1"/>
+                </p:cNvSpPr>
+                <p:nvPr/>
+              </p:nvSpPr>
+              <p:spPr>
+                <a:xfrm>
+                  <a:off x="6761534" y="2437772"/>
+                  <a:ext cx="198324" cy="307777"/>
+                </a:xfrm>
+                <a:prstGeom prst="rect">
+                  <a:avLst/>
+                </a:prstGeom>
+                <a:blipFill>
+                  <a:blip r:embed="rId3"/>
+                  <a:stretch>
+                    <a:fillRect l="-5882" r="-5882"/>
+                  </a:stretch>
+                </a:blipFill>
+              </p:spPr>
+              <p:txBody>
+                <a:bodyPr/>
+                <a:lstStyle/>
+                <a:p>
+                  <a:r>
+                    <a:rPr lang="en-US">
+                      <a:noFill/>
+                    </a:rPr>
+                    <a:t> </a:t>
+                  </a:r>
+                </a:p>
+              </p:txBody>
+            </p:sp>
+          </mc:Fallback>
+        </mc:AlternateContent>
+        <mc:AlternateContent xmlns:mc="http://schemas.openxmlformats.org/markup-compatibility/2006">
+          <mc:Choice xmlns:a14="http://schemas.microsoft.com/office/drawing/2010/main" Requires="a14">
+            <p:sp>
+              <p:nvSpPr>
+                <p:cNvPr id="66" name="TextBox 65">
+                  <a:extLst>
+                    <a:ext uri="{FF2B5EF4-FFF2-40B4-BE49-F238E27FC236}">
+                      <a16:creationId xmlns:a16="http://schemas.microsoft.com/office/drawing/2014/main" id="{1A23FEF6-4084-AF42-BF6F-CFBBDC71AFE5}"/>
+                    </a:ext>
+                  </a:extLst>
+                </p:cNvPr>
+                <p:cNvSpPr txBox="1"/>
+                <p:nvPr/>
+              </p:nvSpPr>
+              <p:spPr>
+                <a:xfrm>
+                  <a:off x="6432979" y="4038437"/>
+                  <a:ext cx="214546" cy="307777"/>
+                </a:xfrm>
+                <a:prstGeom prst="rect">
+                  <a:avLst/>
+                </a:prstGeom>
+                <a:noFill/>
+              </p:spPr>
+              <p:txBody>
+                <a:bodyPr wrap="none" lIns="0" tIns="0" rIns="0" bIns="0" rtlCol="0">
+                  <a:spAutoFit/>
+                </a:bodyPr>
+                <a:lstStyle/>
+                <a:p>
+                  <a:pPr/>
+                  <a14:m>
+                    <m:oMathPara xmlns:m="http://schemas.openxmlformats.org/officeDocument/2006/math">
+                      <m:oMathParaPr>
+                        <m:jc m:val="centerGroup"/>
+                      </m:oMathParaPr>
+                      <m:oMath xmlns:m="http://schemas.openxmlformats.org/officeDocument/2006/math">
+                        <m:r>
+                          <a:rPr lang="en-CA" sz="2000" b="0" i="1" smtClean="0">
+                            <a:latin typeface="Cambria Math" panose="02040503050406030204" pitchFamily="18" charset="0"/>
+                            <a:cs typeface="Arial" panose="020B0604020202020204" pitchFamily="34" charset="0"/>
+                          </a:rPr>
+                          <m:t>𝑥</m:t>
+                        </m:r>
+                      </m:oMath>
+                    </m:oMathPara>
+                  </a14:m>
+                  <a:endParaRPr lang="en-US" sz="2000" dirty="0">
+                    <a:latin typeface="Arial" panose="020B0604020202020204" pitchFamily="34" charset="0"/>
+                    <a:cs typeface="Arial" panose="020B0604020202020204" pitchFamily="34" charset="0"/>
+                  </a:endParaRPr>
+                </a:p>
+              </p:txBody>
+            </p:sp>
+          </mc:Choice>
+          <mc:Fallback>
+            <p:sp>
+              <p:nvSpPr>
+                <p:cNvPr id="66" name="TextBox 65">
+                  <a:extLst>
+                    <a:ext uri="{FF2B5EF4-FFF2-40B4-BE49-F238E27FC236}">
+                      <a16:creationId xmlns:a16="http://schemas.microsoft.com/office/drawing/2014/main" id="{1A23FEF6-4084-AF42-BF6F-CFBBDC71AFE5}"/>
+                    </a:ext>
+                  </a:extLst>
+                </p:cNvPr>
+                <p:cNvSpPr txBox="1">
+                  <a:spLocks noRot="1" noChangeAspect="1" noMove="1" noResize="1" noEditPoints="1" noAdjustHandles="1" noChangeArrowheads="1" noChangeShapeType="1" noTextEdit="1"/>
+                </p:cNvSpPr>
+                <p:nvPr/>
+              </p:nvSpPr>
+              <p:spPr>
+                <a:xfrm>
+                  <a:off x="6432979" y="4038437"/>
+                  <a:ext cx="214546" cy="307777"/>
+                </a:xfrm>
+                <a:prstGeom prst="rect">
+                  <a:avLst/>
+                </a:prstGeom>
+                <a:blipFill>
+                  <a:blip r:embed="rId4"/>
+                  <a:stretch>
+                    <a:fillRect l="-17647" r="-11765"/>
+                  </a:stretch>
+                </a:blipFill>
+              </p:spPr>
+              <p:txBody>
+                <a:bodyPr/>
+                <a:lstStyle/>
+                <a:p>
+                  <a:r>
+                    <a:rPr lang="en-US">
+                      <a:noFill/>
+                    </a:rPr>
+                    <a:t> </a:t>
+                  </a:r>
+                </a:p>
+              </p:txBody>
+            </p:sp>
+          </mc:Fallback>
+        </mc:AlternateContent>
+      </p:grpSp>
+      <p:grpSp>
+        <p:nvGrpSpPr>
+          <p:cNvPr id="140" name="Group 139">
+            <a:extLst>
+              <a:ext uri="{FF2B5EF4-FFF2-40B4-BE49-F238E27FC236}">
+                <a16:creationId xmlns:a16="http://schemas.microsoft.com/office/drawing/2014/main" id="{E450CB55-5DB9-3D4C-9988-04B6B18D38FB}"/>
+              </a:ext>
+            </a:extLst>
+          </p:cNvPr>
+          <p:cNvGrpSpPr/>
+          <p:nvPr/>
+        </p:nvGrpSpPr>
+        <p:grpSpPr>
+          <a:xfrm>
+            <a:off x="1403117" y="640245"/>
+            <a:ext cx="3048221" cy="3628828"/>
+            <a:chOff x="1369463" y="1690042"/>
+            <a:chExt cx="3048221" cy="3628828"/>
+          </a:xfrm>
+        </p:grpSpPr>
+        <p:grpSp>
+          <p:nvGrpSpPr>
+            <p:cNvPr id="11" name="Group 10">
+              <a:extLst>
+                <a:ext uri="{FF2B5EF4-FFF2-40B4-BE49-F238E27FC236}">
+                  <a16:creationId xmlns:a16="http://schemas.microsoft.com/office/drawing/2014/main" id="{BFF55E62-F116-C94C-8B46-3BFC1BBB8924}"/>
+                </a:ext>
+              </a:extLst>
+            </p:cNvPr>
+            <p:cNvGrpSpPr/>
+            <p:nvPr/>
+          </p:nvGrpSpPr>
+          <p:grpSpPr>
+            <a:xfrm>
+              <a:off x="1369463" y="2610141"/>
+              <a:ext cx="3048221" cy="2708729"/>
+              <a:chOff x="937654" y="1016126"/>
+              <a:chExt cx="3048221" cy="2708729"/>
+            </a:xfrm>
+          </p:grpSpPr>
+          <p:grpSp>
+            <p:nvGrpSpPr>
+              <p:cNvPr id="12" name="Group 11">
+                <a:extLst>
+                  <a:ext uri="{FF2B5EF4-FFF2-40B4-BE49-F238E27FC236}">
+                    <a16:creationId xmlns:a16="http://schemas.microsoft.com/office/drawing/2014/main" id="{A8C856E9-32CF-C740-895F-48F96C5394A0}"/>
+                  </a:ext>
+                </a:extLst>
+              </p:cNvPr>
+              <p:cNvGrpSpPr/>
+              <p:nvPr/>
+            </p:nvGrpSpPr>
+            <p:grpSpPr>
+              <a:xfrm>
+                <a:off x="1024960" y="1016126"/>
+                <a:ext cx="2960915" cy="2708729"/>
+                <a:chOff x="1088571" y="1596571"/>
+                <a:chExt cx="2960915" cy="2708729"/>
+              </a:xfrm>
+            </p:grpSpPr>
+            <p:cxnSp>
+              <p:nvCxnSpPr>
+                <p:cNvPr id="43" name="Straight Connector 42">
+                  <a:extLst>
+                    <a:ext uri="{FF2B5EF4-FFF2-40B4-BE49-F238E27FC236}">
+                      <a16:creationId xmlns:a16="http://schemas.microsoft.com/office/drawing/2014/main" id="{26B2BBB8-F89F-9942-A954-4DAC3D41DC76}"/>
+                    </a:ext>
+                  </a:extLst>
+                </p:cNvPr>
+                <p:cNvCxnSpPr/>
+                <p:nvPr/>
+              </p:nvCxnSpPr>
+              <p:spPr>
+                <a:xfrm>
+                  <a:off x="1309470" y="3048000"/>
+                  <a:ext cx="0" cy="967015"/>
+                </a:xfrm>
+                <a:prstGeom prst="line">
+                  <a:avLst/>
+                </a:prstGeom>
+                <a:ln w="25400">
+                  <a:solidFill>
+                    <a:srgbClr val="FF0000"/>
+                  </a:solidFill>
+                </a:ln>
+              </p:spPr>
+              <p:style>
+                <a:lnRef idx="1">
+                  <a:schemeClr val="accent1"/>
+                </a:lnRef>
+                <a:fillRef idx="0">
+                  <a:schemeClr val="accent1"/>
+                </a:fillRef>
+                <a:effectRef idx="0">
+                  <a:schemeClr val="accent1"/>
+                </a:effectRef>
+                <a:fontRef idx="minor">
+                  <a:schemeClr val="tx1"/>
+                </a:fontRef>
+              </p:style>
+            </p:cxnSp>
+            <p:cxnSp>
+              <p:nvCxnSpPr>
+                <p:cNvPr id="44" name="Straight Connector 43">
+                  <a:extLst>
+                    <a:ext uri="{FF2B5EF4-FFF2-40B4-BE49-F238E27FC236}">
+                      <a16:creationId xmlns:a16="http://schemas.microsoft.com/office/drawing/2014/main" id="{B709B01A-5719-6047-B1DE-E33B8FCC31EC}"/>
+                    </a:ext>
+                  </a:extLst>
+                </p:cNvPr>
+                <p:cNvCxnSpPr/>
+                <p:nvPr/>
+              </p:nvCxnSpPr>
+              <p:spPr>
+                <a:xfrm>
+                  <a:off x="1688648" y="3251200"/>
+                  <a:ext cx="0" cy="967015"/>
+                </a:xfrm>
+                <a:prstGeom prst="line">
+                  <a:avLst/>
+                </a:prstGeom>
+                <a:ln w="25400">
+                  <a:solidFill>
+                    <a:srgbClr val="FF0000"/>
+                  </a:solidFill>
+                </a:ln>
+              </p:spPr>
+              <p:style>
+                <a:lnRef idx="1">
+                  <a:schemeClr val="accent1"/>
+                </a:lnRef>
+                <a:fillRef idx="0">
+                  <a:schemeClr val="accent1"/>
+                </a:fillRef>
+                <a:effectRef idx="0">
+                  <a:schemeClr val="accent1"/>
+                </a:effectRef>
+                <a:fontRef idx="minor">
+                  <a:schemeClr val="tx1"/>
+                </a:fontRef>
+              </p:style>
+            </p:cxnSp>
+            <p:cxnSp>
+              <p:nvCxnSpPr>
+                <p:cNvPr id="45" name="Straight Connector 44">
+                  <a:extLst>
+                    <a:ext uri="{FF2B5EF4-FFF2-40B4-BE49-F238E27FC236}">
+                      <a16:creationId xmlns:a16="http://schemas.microsoft.com/office/drawing/2014/main" id="{AAF43074-DC39-694C-B034-B92A1EF53C26}"/>
+                    </a:ext>
+                  </a:extLst>
+                </p:cNvPr>
+                <p:cNvCxnSpPr/>
+                <p:nvPr/>
+              </p:nvCxnSpPr>
+              <p:spPr>
+                <a:xfrm>
+                  <a:off x="1954202" y="2854778"/>
+                  <a:ext cx="0" cy="967015"/>
+                </a:xfrm>
+                <a:prstGeom prst="line">
+                  <a:avLst/>
+                </a:prstGeom>
+                <a:ln w="25400">
+                  <a:solidFill>
+                    <a:srgbClr val="FF0000"/>
+                  </a:solidFill>
+                </a:ln>
+              </p:spPr>
+              <p:style>
+                <a:lnRef idx="1">
+                  <a:schemeClr val="accent1"/>
+                </a:lnRef>
+                <a:fillRef idx="0">
+                  <a:schemeClr val="accent1"/>
+                </a:fillRef>
+                <a:effectRef idx="0">
+                  <a:schemeClr val="accent1"/>
+                </a:effectRef>
+                <a:fontRef idx="minor">
+                  <a:schemeClr val="tx1"/>
+                </a:fontRef>
+              </p:style>
+            </p:cxnSp>
+            <p:cxnSp>
+              <p:nvCxnSpPr>
+                <p:cNvPr id="46" name="Straight Connector 45">
+                  <a:extLst>
+                    <a:ext uri="{FF2B5EF4-FFF2-40B4-BE49-F238E27FC236}">
+                      <a16:creationId xmlns:a16="http://schemas.microsoft.com/office/drawing/2014/main" id="{50FB93CE-5B9F-5D4D-AB40-34B5C905B7A5}"/>
+                    </a:ext>
+                  </a:extLst>
+                </p:cNvPr>
+                <p:cNvCxnSpPr/>
+                <p:nvPr/>
+              </p:nvCxnSpPr>
+              <p:spPr>
+                <a:xfrm>
+                  <a:off x="2322166" y="3067957"/>
+                  <a:ext cx="0" cy="967015"/>
+                </a:xfrm>
+                <a:prstGeom prst="line">
+                  <a:avLst/>
+                </a:prstGeom>
+                <a:ln w="25400">
+                  <a:solidFill>
+                    <a:srgbClr val="FF0000"/>
+                  </a:solidFill>
+                </a:ln>
+              </p:spPr>
+              <p:style>
+                <a:lnRef idx="1">
+                  <a:schemeClr val="accent1"/>
+                </a:lnRef>
+                <a:fillRef idx="0">
+                  <a:schemeClr val="accent1"/>
+                </a:fillRef>
+                <a:effectRef idx="0">
+                  <a:schemeClr val="accent1"/>
+                </a:effectRef>
+                <a:fontRef idx="minor">
+                  <a:schemeClr val="tx1"/>
+                </a:fontRef>
+              </p:style>
+            </p:cxnSp>
+            <p:cxnSp>
+              <p:nvCxnSpPr>
+                <p:cNvPr id="47" name="Straight Connector 46">
+                  <a:extLst>
+                    <a:ext uri="{FF2B5EF4-FFF2-40B4-BE49-F238E27FC236}">
+                      <a16:creationId xmlns:a16="http://schemas.microsoft.com/office/drawing/2014/main" id="{00A905B7-9DD2-7F42-A95B-FD72C2A55A9A}"/>
+                    </a:ext>
+                  </a:extLst>
+                </p:cNvPr>
+                <p:cNvCxnSpPr/>
+                <p:nvPr/>
+              </p:nvCxnSpPr>
+              <p:spPr>
+                <a:xfrm>
+                  <a:off x="2675622" y="3338285"/>
+                  <a:ext cx="0" cy="967015"/>
+                </a:xfrm>
+                <a:prstGeom prst="line">
+                  <a:avLst/>
+                </a:prstGeom>
+                <a:ln w="25400">
+                  <a:solidFill>
+                    <a:srgbClr val="FF0000"/>
+                  </a:solidFill>
+                </a:ln>
+              </p:spPr>
+              <p:style>
+                <a:lnRef idx="1">
+                  <a:schemeClr val="accent1"/>
+                </a:lnRef>
+                <a:fillRef idx="0">
+                  <a:schemeClr val="accent1"/>
+                </a:fillRef>
+                <a:effectRef idx="0">
+                  <a:schemeClr val="accent1"/>
+                </a:effectRef>
+                <a:fontRef idx="minor">
+                  <a:schemeClr val="tx1"/>
+                </a:fontRef>
+              </p:style>
+            </p:cxnSp>
+            <p:cxnSp>
+              <p:nvCxnSpPr>
+                <p:cNvPr id="48" name="Straight Connector 47">
+                  <a:extLst>
+                    <a:ext uri="{FF2B5EF4-FFF2-40B4-BE49-F238E27FC236}">
+                      <a16:creationId xmlns:a16="http://schemas.microsoft.com/office/drawing/2014/main" id="{1F11713C-ACA0-7747-BDF3-103593CFCB4D}"/>
+                    </a:ext>
+                  </a:extLst>
+                </p:cNvPr>
+                <p:cNvCxnSpPr/>
+                <p:nvPr/>
+              </p:nvCxnSpPr>
+              <p:spPr>
+                <a:xfrm>
+                  <a:off x="2921239" y="2969079"/>
+                  <a:ext cx="0" cy="967015"/>
+                </a:xfrm>
+                <a:prstGeom prst="line">
+                  <a:avLst/>
+                </a:prstGeom>
+                <a:ln w="25400">
+                  <a:solidFill>
+                    <a:srgbClr val="FF0000"/>
+                  </a:solidFill>
+                </a:ln>
+              </p:spPr>
+              <p:style>
+                <a:lnRef idx="1">
+                  <a:schemeClr val="accent1"/>
+                </a:lnRef>
+                <a:fillRef idx="0">
+                  <a:schemeClr val="accent1"/>
+                </a:fillRef>
+                <a:effectRef idx="0">
+                  <a:schemeClr val="accent1"/>
+                </a:effectRef>
+                <a:fontRef idx="minor">
+                  <a:schemeClr val="tx1"/>
+                </a:fontRef>
+              </p:style>
+            </p:cxnSp>
+            <p:cxnSp>
+              <p:nvCxnSpPr>
+                <p:cNvPr id="49" name="Straight Connector 48">
+                  <a:extLst>
+                    <a:ext uri="{FF2B5EF4-FFF2-40B4-BE49-F238E27FC236}">
+                      <a16:creationId xmlns:a16="http://schemas.microsoft.com/office/drawing/2014/main" id="{FD37A343-9B7F-CD4D-B900-73BA78F7B3BC}"/>
+                    </a:ext>
+                  </a:extLst>
+                </p:cNvPr>
+                <p:cNvCxnSpPr/>
+                <p:nvPr/>
+              </p:nvCxnSpPr>
+              <p:spPr>
+                <a:xfrm>
+                  <a:off x="3270943" y="3143250"/>
+                  <a:ext cx="0" cy="967015"/>
+                </a:xfrm>
+                <a:prstGeom prst="line">
+                  <a:avLst/>
+                </a:prstGeom>
+                <a:ln w="25400">
+                  <a:solidFill>
+                    <a:srgbClr val="FF0000"/>
+                  </a:solidFill>
+                </a:ln>
+              </p:spPr>
+              <p:style>
+                <a:lnRef idx="1">
+                  <a:schemeClr val="accent1"/>
+                </a:lnRef>
+                <a:fillRef idx="0">
+                  <a:schemeClr val="accent1"/>
+                </a:fillRef>
+                <a:effectRef idx="0">
+                  <a:schemeClr val="accent1"/>
+                </a:effectRef>
+                <a:fontRef idx="minor">
+                  <a:schemeClr val="tx1"/>
+                </a:fontRef>
+              </p:style>
+            </p:cxnSp>
+            <p:cxnSp>
+              <p:nvCxnSpPr>
+                <p:cNvPr id="50" name="Straight Connector 49">
+                  <a:extLst>
+                    <a:ext uri="{FF2B5EF4-FFF2-40B4-BE49-F238E27FC236}">
+                      <a16:creationId xmlns:a16="http://schemas.microsoft.com/office/drawing/2014/main" id="{231F9E18-F1F4-0A41-A42F-643C5C6BD46C}"/>
+                    </a:ext>
+                  </a:extLst>
+                </p:cNvPr>
+                <p:cNvCxnSpPr/>
+                <p:nvPr/>
+              </p:nvCxnSpPr>
+              <p:spPr>
+                <a:xfrm>
+                  <a:off x="3792320" y="3067957"/>
+                  <a:ext cx="0" cy="967015"/>
+                </a:xfrm>
+                <a:prstGeom prst="line">
+                  <a:avLst/>
+                </a:prstGeom>
+                <a:ln w="25400">
+                  <a:solidFill>
+                    <a:srgbClr val="FF0000"/>
+                  </a:solidFill>
+                </a:ln>
+              </p:spPr>
+              <p:style>
+                <a:lnRef idx="1">
+                  <a:schemeClr val="accent1"/>
+                </a:lnRef>
+                <a:fillRef idx="0">
+                  <a:schemeClr val="accent1"/>
+                </a:fillRef>
+                <a:effectRef idx="0">
+                  <a:schemeClr val="accent1"/>
+                </a:effectRef>
+                <a:fontRef idx="minor">
+                  <a:schemeClr val="tx1"/>
+                </a:fontRef>
+              </p:style>
+            </p:cxnSp>
+            <p:sp>
+              <p:nvSpPr>
+                <p:cNvPr id="51" name="Oval 50">
+                  <a:extLst>
+                    <a:ext uri="{FF2B5EF4-FFF2-40B4-BE49-F238E27FC236}">
+                      <a16:creationId xmlns:a16="http://schemas.microsoft.com/office/drawing/2014/main" id="{06EAD075-61BF-3E49-A544-942744BE3CEC}"/>
+                    </a:ext>
+                  </a:extLst>
+                </p:cNvPr>
+                <p:cNvSpPr/>
+                <p:nvPr/>
+              </p:nvSpPr>
+              <p:spPr>
+                <a:xfrm>
+                  <a:off x="1088571" y="2699657"/>
+                  <a:ext cx="2960915" cy="696686"/>
+                </a:xfrm>
+                <a:prstGeom prst="ellipse">
+                  <a:avLst/>
+                </a:prstGeom>
+                <a:solidFill>
+                  <a:schemeClr val="bg2">
+                    <a:lumMod val="90000"/>
+                    <a:alpha val="79000"/>
+                  </a:schemeClr>
+                </a:solidFill>
+                <a:ln w="38100">
+                  <a:solidFill>
+                    <a:schemeClr val="tx1"/>
+                  </a:solidFill>
+                </a:ln>
+              </p:spPr>
+              <p:style>
+                <a:lnRef idx="2">
+                  <a:schemeClr val="accent1">
+                    <a:shade val="50000"/>
+                  </a:schemeClr>
+                </a:lnRef>
+                <a:fillRef idx="1">
+                  <a:schemeClr val="accent1"/>
+                </a:fillRef>
+                <a:effectRef idx="0">
+                  <a:schemeClr val="accent1"/>
+                </a:effectRef>
+                <a:fontRef idx="minor">
+                  <a:schemeClr val="lt1"/>
+                </a:fontRef>
+              </p:style>
+              <p:txBody>
+                <a:bodyPr rtlCol="0" anchor="ctr"/>
+                <a:lstStyle/>
+                <a:p>
+                  <a:pPr algn="ctr"/>
+                  <a:endParaRPr lang="en-US"/>
+                </a:p>
+              </p:txBody>
+            </p:sp>
+            <p:cxnSp>
+              <p:nvCxnSpPr>
+                <p:cNvPr id="52" name="Straight Arrow Connector 51">
+                  <a:extLst>
+                    <a:ext uri="{FF2B5EF4-FFF2-40B4-BE49-F238E27FC236}">
+                      <a16:creationId xmlns:a16="http://schemas.microsoft.com/office/drawing/2014/main" id="{F40A4096-41D2-6440-AF51-D8DEFF37A6F1}"/>
+                    </a:ext>
+                  </a:extLst>
+                </p:cNvPr>
+                <p:cNvCxnSpPr/>
+                <p:nvPr/>
+              </p:nvCxnSpPr>
+              <p:spPr>
+                <a:xfrm flipV="1">
+                  <a:off x="1308100" y="1770742"/>
+                  <a:ext cx="1362" cy="1277258"/>
+                </a:xfrm>
+                <a:prstGeom prst="straightConnector1">
+                  <a:avLst/>
+                </a:prstGeom>
+                <a:ln w="25400">
+                  <a:solidFill>
+                    <a:srgbClr val="FF0000"/>
+                  </a:solidFill>
+                  <a:tailEnd type="triangle"/>
+                </a:ln>
+              </p:spPr>
+              <p:style>
+                <a:lnRef idx="1">
+                  <a:schemeClr val="accent1"/>
+                </a:lnRef>
+                <a:fillRef idx="0">
+                  <a:schemeClr val="accent1"/>
+                </a:fillRef>
+                <a:effectRef idx="0">
+                  <a:schemeClr val="accent1"/>
+                </a:effectRef>
+                <a:fontRef idx="minor">
+                  <a:schemeClr val="tx1"/>
+                </a:fontRef>
+              </p:style>
+            </p:cxnSp>
+            <p:cxnSp>
+              <p:nvCxnSpPr>
+                <p:cNvPr id="53" name="Straight Arrow Connector 52">
+                  <a:extLst>
+                    <a:ext uri="{FF2B5EF4-FFF2-40B4-BE49-F238E27FC236}">
+                      <a16:creationId xmlns:a16="http://schemas.microsoft.com/office/drawing/2014/main" id="{292D7D17-12ED-F94C-8050-526CE6BCE3F1}"/>
+                    </a:ext>
+                  </a:extLst>
+                </p:cNvPr>
+                <p:cNvCxnSpPr/>
+                <p:nvPr/>
+              </p:nvCxnSpPr>
+              <p:spPr>
+                <a:xfrm flipV="1">
+                  <a:off x="1954202" y="1596571"/>
+                  <a:ext cx="1362" cy="1277258"/>
+                </a:xfrm>
+                <a:prstGeom prst="straightConnector1">
+                  <a:avLst/>
+                </a:prstGeom>
+                <a:ln w="25400">
+                  <a:solidFill>
+                    <a:srgbClr val="FF0000"/>
+                  </a:solidFill>
+                  <a:tailEnd type="triangle"/>
+                </a:ln>
+              </p:spPr>
+              <p:style>
+                <a:lnRef idx="1">
+                  <a:schemeClr val="accent1"/>
+                </a:lnRef>
+                <a:fillRef idx="0">
+                  <a:schemeClr val="accent1"/>
+                </a:fillRef>
+                <a:effectRef idx="0">
+                  <a:schemeClr val="accent1"/>
+                </a:effectRef>
+                <a:fontRef idx="minor">
+                  <a:schemeClr val="tx1"/>
+                </a:fontRef>
+              </p:style>
+            </p:cxnSp>
+            <p:cxnSp>
+              <p:nvCxnSpPr>
+                <p:cNvPr id="54" name="Straight Arrow Connector 53">
+                  <a:extLst>
+                    <a:ext uri="{FF2B5EF4-FFF2-40B4-BE49-F238E27FC236}">
+                      <a16:creationId xmlns:a16="http://schemas.microsoft.com/office/drawing/2014/main" id="{F6114A41-419E-834B-A19F-E61653F40FD7}"/>
+                    </a:ext>
+                  </a:extLst>
+                </p:cNvPr>
+                <p:cNvCxnSpPr/>
+                <p:nvPr/>
+              </p:nvCxnSpPr>
+              <p:spPr>
+                <a:xfrm flipV="1">
+                  <a:off x="1688648" y="1973942"/>
+                  <a:ext cx="1362" cy="1277258"/>
+                </a:xfrm>
+                <a:prstGeom prst="straightConnector1">
+                  <a:avLst/>
+                </a:prstGeom>
+                <a:ln w="25400">
+                  <a:solidFill>
+                    <a:srgbClr val="FF0000"/>
+                  </a:solidFill>
+                  <a:tailEnd type="triangle"/>
+                </a:ln>
+              </p:spPr>
+              <p:style>
+                <a:lnRef idx="1">
+                  <a:schemeClr val="accent1"/>
+                </a:lnRef>
+                <a:fillRef idx="0">
+                  <a:schemeClr val="accent1"/>
+                </a:fillRef>
+                <a:effectRef idx="0">
+                  <a:schemeClr val="accent1"/>
+                </a:effectRef>
+                <a:fontRef idx="minor">
+                  <a:schemeClr val="tx1"/>
+                </a:fontRef>
+              </p:style>
+            </p:cxnSp>
+            <p:cxnSp>
+              <p:nvCxnSpPr>
+                <p:cNvPr id="55" name="Straight Arrow Connector 54">
+                  <a:extLst>
+                    <a:ext uri="{FF2B5EF4-FFF2-40B4-BE49-F238E27FC236}">
+                      <a16:creationId xmlns:a16="http://schemas.microsoft.com/office/drawing/2014/main" id="{0DEEB38A-C0A0-454D-9B60-B9CAADA9068C}"/>
+                    </a:ext>
+                  </a:extLst>
+                </p:cNvPr>
+                <p:cNvCxnSpPr/>
+                <p:nvPr/>
+              </p:nvCxnSpPr>
+              <p:spPr>
+                <a:xfrm flipV="1">
+                  <a:off x="2322166" y="1806121"/>
+                  <a:ext cx="1362" cy="1277258"/>
+                </a:xfrm>
+                <a:prstGeom prst="straightConnector1">
+                  <a:avLst/>
+                </a:prstGeom>
+                <a:ln w="25400">
+                  <a:solidFill>
+                    <a:srgbClr val="FF0000"/>
+                  </a:solidFill>
+                  <a:tailEnd type="triangle"/>
+                </a:ln>
+              </p:spPr>
+              <p:style>
+                <a:lnRef idx="1">
+                  <a:schemeClr val="accent1"/>
+                </a:lnRef>
+                <a:fillRef idx="0">
+                  <a:schemeClr val="accent1"/>
+                </a:fillRef>
+                <a:effectRef idx="0">
+                  <a:schemeClr val="accent1"/>
+                </a:effectRef>
+                <a:fontRef idx="minor">
+                  <a:schemeClr val="tx1"/>
+                </a:fontRef>
+              </p:style>
+            </p:cxnSp>
+            <p:cxnSp>
+              <p:nvCxnSpPr>
+                <p:cNvPr id="56" name="Straight Arrow Connector 55">
+                  <a:extLst>
+                    <a:ext uri="{FF2B5EF4-FFF2-40B4-BE49-F238E27FC236}">
+                      <a16:creationId xmlns:a16="http://schemas.microsoft.com/office/drawing/2014/main" id="{4EBEC721-5E93-3045-8819-5AC5E0BC7DDD}"/>
+                    </a:ext>
+                  </a:extLst>
+                </p:cNvPr>
+                <p:cNvCxnSpPr/>
+                <p:nvPr/>
+              </p:nvCxnSpPr>
+              <p:spPr>
+                <a:xfrm flipV="1">
+                  <a:off x="2675622" y="2061028"/>
+                  <a:ext cx="1362" cy="1277258"/>
+                </a:xfrm>
+                <a:prstGeom prst="straightConnector1">
+                  <a:avLst/>
+                </a:prstGeom>
+                <a:ln w="25400">
+                  <a:solidFill>
+                    <a:srgbClr val="FF0000"/>
+                  </a:solidFill>
+                  <a:tailEnd type="triangle"/>
+                </a:ln>
+              </p:spPr>
+              <p:style>
+                <a:lnRef idx="1">
+                  <a:schemeClr val="accent1"/>
+                </a:lnRef>
+                <a:fillRef idx="0">
+                  <a:schemeClr val="accent1"/>
+                </a:fillRef>
+                <a:effectRef idx="0">
+                  <a:schemeClr val="accent1"/>
+                </a:effectRef>
+                <a:fontRef idx="minor">
+                  <a:schemeClr val="tx1"/>
+                </a:fontRef>
+              </p:style>
+            </p:cxnSp>
+            <p:cxnSp>
+              <p:nvCxnSpPr>
+                <p:cNvPr id="57" name="Straight Arrow Connector 56">
+                  <a:extLst>
+                    <a:ext uri="{FF2B5EF4-FFF2-40B4-BE49-F238E27FC236}">
+                      <a16:creationId xmlns:a16="http://schemas.microsoft.com/office/drawing/2014/main" id="{46CE6BC2-DB89-AB43-9CC8-B316317E66D3}"/>
+                    </a:ext>
+                  </a:extLst>
+                </p:cNvPr>
+                <p:cNvCxnSpPr/>
+                <p:nvPr/>
+              </p:nvCxnSpPr>
+              <p:spPr>
+                <a:xfrm flipV="1">
+                  <a:off x="2919869" y="1698171"/>
+                  <a:ext cx="1362" cy="1277258"/>
+                </a:xfrm>
+                <a:prstGeom prst="straightConnector1">
+                  <a:avLst/>
+                </a:prstGeom>
+                <a:ln w="25400">
+                  <a:solidFill>
+                    <a:srgbClr val="FF0000"/>
+                  </a:solidFill>
+                  <a:tailEnd type="triangle"/>
+                </a:ln>
+              </p:spPr>
+              <p:style>
+                <a:lnRef idx="1">
+                  <a:schemeClr val="accent1"/>
+                </a:lnRef>
+                <a:fillRef idx="0">
+                  <a:schemeClr val="accent1"/>
+                </a:fillRef>
+                <a:effectRef idx="0">
+                  <a:schemeClr val="accent1"/>
+                </a:effectRef>
+                <a:fontRef idx="minor">
+                  <a:schemeClr val="tx1"/>
+                </a:fontRef>
+              </p:style>
+            </p:cxnSp>
+            <p:cxnSp>
+              <p:nvCxnSpPr>
+                <p:cNvPr id="58" name="Straight Arrow Connector 57">
+                  <a:extLst>
+                    <a:ext uri="{FF2B5EF4-FFF2-40B4-BE49-F238E27FC236}">
+                      <a16:creationId xmlns:a16="http://schemas.microsoft.com/office/drawing/2014/main" id="{8D9B3A21-C69E-B640-95FD-E2D32BA4E3C7}"/>
+                    </a:ext>
+                  </a:extLst>
+                </p:cNvPr>
+                <p:cNvCxnSpPr/>
+                <p:nvPr/>
+              </p:nvCxnSpPr>
+              <p:spPr>
+                <a:xfrm flipV="1">
+                  <a:off x="3790950" y="1790699"/>
+                  <a:ext cx="1362" cy="1277258"/>
+                </a:xfrm>
+                <a:prstGeom prst="straightConnector1">
+                  <a:avLst/>
+                </a:prstGeom>
+                <a:ln w="25400">
+                  <a:solidFill>
+                    <a:srgbClr val="FF0000"/>
+                  </a:solidFill>
+                  <a:tailEnd type="triangle"/>
+                </a:ln>
+              </p:spPr>
+              <p:style>
+                <a:lnRef idx="1">
+                  <a:schemeClr val="accent1"/>
+                </a:lnRef>
+                <a:fillRef idx="0">
+                  <a:schemeClr val="accent1"/>
+                </a:fillRef>
+                <a:effectRef idx="0">
+                  <a:schemeClr val="accent1"/>
+                </a:effectRef>
+                <a:fontRef idx="minor">
+                  <a:schemeClr val="tx1"/>
+                </a:fontRef>
+              </p:style>
+            </p:cxnSp>
+            <p:cxnSp>
+              <p:nvCxnSpPr>
+                <p:cNvPr id="59" name="Straight Arrow Connector 58">
+                  <a:extLst>
+                    <a:ext uri="{FF2B5EF4-FFF2-40B4-BE49-F238E27FC236}">
+                      <a16:creationId xmlns:a16="http://schemas.microsoft.com/office/drawing/2014/main" id="{D16FBC19-9346-AF41-B21B-83BFD7800356}"/>
+                    </a:ext>
+                  </a:extLst>
+                </p:cNvPr>
+                <p:cNvCxnSpPr/>
+                <p:nvPr/>
+              </p:nvCxnSpPr>
+              <p:spPr>
+                <a:xfrm flipV="1">
+                  <a:off x="3270943" y="1865992"/>
+                  <a:ext cx="1362" cy="1277258"/>
+                </a:xfrm>
+                <a:prstGeom prst="straightConnector1">
+                  <a:avLst/>
+                </a:prstGeom>
+                <a:ln w="25400">
+                  <a:solidFill>
+                    <a:srgbClr val="FF0000"/>
+                  </a:solidFill>
+                  <a:tailEnd type="triangle"/>
+                </a:ln>
+              </p:spPr>
+              <p:style>
+                <a:lnRef idx="1">
+                  <a:schemeClr val="accent1"/>
+                </a:lnRef>
+                <a:fillRef idx="0">
+                  <a:schemeClr val="accent1"/>
+                </a:fillRef>
+                <a:effectRef idx="0">
+                  <a:schemeClr val="accent1"/>
+                </a:effectRef>
+                <a:fontRef idx="minor">
+                  <a:schemeClr val="tx1"/>
+                </a:fontRef>
+              </p:style>
+            </p:cxnSp>
+          </p:grpSp>
+          <mc:AlternateContent xmlns:mc="http://schemas.openxmlformats.org/markup-compatibility/2006" xmlns:a14="http://schemas.microsoft.com/office/drawing/2010/main">
+            <mc:Choice Requires="a14">
+              <p:sp>
+                <p:nvSpPr>
+                  <p:cNvPr id="14" name="TextBox 13">
+                    <a:extLst>
+                      <a:ext uri="{FF2B5EF4-FFF2-40B4-BE49-F238E27FC236}">
+                        <a16:creationId xmlns:a16="http://schemas.microsoft.com/office/drawing/2014/main" id="{5223ED87-A0CC-EE4C-83BA-C93ED22C4146}"/>
+                      </a:ext>
+                    </a:extLst>
+                  </p:cNvPr>
+                  <p:cNvSpPr txBox="1"/>
+                  <p:nvPr/>
+                </p:nvSpPr>
+                <p:spPr>
+                  <a:xfrm>
+                    <a:off x="937654" y="1348603"/>
+                    <a:ext cx="245708" cy="345159"/>
+                  </a:xfrm>
+                  <a:prstGeom prst="rect">
+                    <a:avLst/>
+                  </a:prstGeom>
+                  <a:noFill/>
+                </p:spPr>
+                <p:txBody>
+                  <a:bodyPr wrap="none" lIns="0" tIns="0" rIns="0" bIns="0" rtlCol="0">
+                    <a:spAutoFit/>
+                  </a:bodyPr>
+                  <a:lstStyle/>
+                  <a:p>
+                    <a:pPr/>
+                    <a14:m>
+                      <m:oMathPara xmlns:m="http://schemas.openxmlformats.org/officeDocument/2006/math">
+                        <m:oMathParaPr>
+                          <m:jc m:val="centerGroup"/>
+                        </m:oMathParaPr>
+                        <m:oMath xmlns:m="http://schemas.openxmlformats.org/officeDocument/2006/math">
+                          <m:acc>
+                            <m:accPr>
+                              <m:chr m:val="⃗"/>
+                              <m:ctrlPr>
+                                <a:rPr lang="en-US" sz="2000" b="0" i="1" smtClean="0">
+                                  <a:solidFill>
+                                    <a:srgbClr val="FF0000"/>
+                                  </a:solidFill>
+                                  <a:latin typeface="Cambria Math" panose="02040503050406030204" pitchFamily="18" charset="0"/>
+                                  <a:cs typeface="Arial" panose="020B0604020202020204" pitchFamily="34" charset="0"/>
+                                </a:rPr>
+                              </m:ctrlPr>
+                            </m:accPr>
+                            <m:e>
+                              <m:r>
+                                <a:rPr lang="en-US" sz="2000" b="0" i="1" smtClean="0">
+                                  <a:solidFill>
+                                    <a:srgbClr val="FF0000"/>
+                                  </a:solidFill>
+                                  <a:latin typeface="Cambria Math" panose="02040503050406030204" pitchFamily="18" charset="0"/>
+                                  <a:cs typeface="Arial" panose="020B0604020202020204" pitchFamily="34" charset="0"/>
+                                </a:rPr>
+                                <m:t>𝐵</m:t>
+                              </m:r>
+                            </m:e>
+                          </m:acc>
+                        </m:oMath>
+                      </m:oMathPara>
+                    </a14:m>
+                    <a:endParaRPr lang="en-US" sz="2000" dirty="0">
+                      <a:solidFill>
+                        <a:srgbClr val="FF0000"/>
+                      </a:solidFill>
+                      <a:latin typeface="Arial" panose="020B0604020202020204" pitchFamily="34" charset="0"/>
+                      <a:cs typeface="Arial" panose="020B0604020202020204" pitchFamily="34" charset="0"/>
+                    </a:endParaRPr>
+                  </a:p>
+                </p:txBody>
+              </p:sp>
+            </mc:Choice>
+            <mc:Fallback xmlns="">
+              <p:sp>
+                <p:nvSpPr>
+                  <p:cNvPr id="142" name="TextBox 141"/>
+                  <p:cNvSpPr txBox="1">
+                    <a:spLocks noRot="1" noChangeAspect="1" noMove="1" noResize="1" noEditPoints="1" noAdjustHandles="1" noChangeArrowheads="1" noChangeShapeType="1" noTextEdit="1"/>
+                  </p:cNvSpPr>
+                  <p:nvPr/>
+                </p:nvSpPr>
+                <p:spPr>
+                  <a:xfrm>
+                    <a:off x="937654" y="1348603"/>
+                    <a:ext cx="245708" cy="345159"/>
+                  </a:xfrm>
+                  <a:prstGeom prst="rect">
+                    <a:avLst/>
+                  </a:prstGeom>
+                  <a:blipFill>
+                    <a:blip r:embed="rId5"/>
+                    <a:stretch>
+                      <a:fillRect l="-22500" r="-20000" b="-8772"/>
+                    </a:stretch>
+                  </a:blipFill>
+                </p:spPr>
+                <p:txBody>
+                  <a:bodyPr/>
+                  <a:lstStyle/>
+                  <a:p>
+                    <a:r>
+                      <a:rPr lang="en-US">
+                        <a:noFill/>
+                      </a:rPr>
+                      <a:t> </a:t>
+                    </a:r>
+                  </a:p>
+                </p:txBody>
+              </p:sp>
+            </mc:Fallback>
+          </mc:AlternateContent>
+        </p:grpSp>
+        <p:sp>
+          <p:nvSpPr>
+            <p:cNvPr id="68" name="Up Arrow 67">
+              <a:extLst>
+                <a:ext uri="{FF2B5EF4-FFF2-40B4-BE49-F238E27FC236}">
+                  <a16:creationId xmlns:a16="http://schemas.microsoft.com/office/drawing/2014/main" id="{353EB879-9D21-6E48-82EB-3C7939530AA5}"/>
+                </a:ext>
+              </a:extLst>
+            </p:cNvPr>
+            <p:cNvSpPr/>
+            <p:nvPr/>
+          </p:nvSpPr>
+          <p:spPr>
+            <a:xfrm>
+              <a:off x="2611537" y="2085819"/>
+              <a:ext cx="599440" cy="662510"/>
+            </a:xfrm>
+            <a:prstGeom prst="upArrow">
+              <a:avLst/>
+            </a:prstGeom>
+            <a:solidFill>
+              <a:srgbClr val="FF0000"/>
+            </a:solidFill>
+            <a:ln w="38100">
+              <a:noFill/>
+            </a:ln>
+          </p:spPr>
+          <p:style>
+            <a:lnRef idx="2">
+              <a:schemeClr val="accent1">
+                <a:shade val="50000"/>
+              </a:schemeClr>
+            </a:lnRef>
+            <a:fillRef idx="1">
+              <a:schemeClr val="accent1"/>
+            </a:fillRef>
+            <a:effectRef idx="0">
+              <a:schemeClr val="accent1"/>
+            </a:effectRef>
+            <a:fontRef idx="minor">
+              <a:schemeClr val="lt1"/>
+            </a:fontRef>
+          </p:style>
+          <p:txBody>
+            <a:bodyPr rtlCol="0" anchor="ctr"/>
+            <a:lstStyle/>
+            <a:p>
+              <a:pPr algn="ctr"/>
+              <a:endParaRPr lang="en-US"/>
+            </a:p>
+          </p:txBody>
+        </p:sp>
+        <mc:AlternateContent xmlns:mc="http://schemas.openxmlformats.org/markup-compatibility/2006">
+          <mc:Choice xmlns:a14="http://schemas.microsoft.com/office/drawing/2010/main" Requires="a14">
+            <p:sp>
+              <p:nvSpPr>
+                <p:cNvPr id="69" name="TextBox 68">
+                  <a:extLst>
+                    <a:ext uri="{FF2B5EF4-FFF2-40B4-BE49-F238E27FC236}">
+                      <a16:creationId xmlns:a16="http://schemas.microsoft.com/office/drawing/2014/main" id="{0E301794-617A-3F4A-88AB-6CB637F0DF85}"/>
+                    </a:ext>
+                  </a:extLst>
+                </p:cNvPr>
+                <p:cNvSpPr txBox="1"/>
+                <p:nvPr/>
+              </p:nvSpPr>
+              <p:spPr>
+                <a:xfrm>
+                  <a:off x="1986172" y="1690042"/>
+                  <a:ext cx="1905265" cy="307777"/>
+                </a:xfrm>
+                <a:prstGeom prst="rect">
+                  <a:avLst/>
+                </a:prstGeom>
+                <a:noFill/>
+              </p:spPr>
+              <p:txBody>
+                <a:bodyPr wrap="none" lIns="0" tIns="0" rIns="0" bIns="0" rtlCol="0">
+                  <a:spAutoFit/>
+                </a:bodyPr>
+                <a:lstStyle/>
+                <a:p>
+                  <a14:m>
+                    <m:oMathPara xmlns:m="http://schemas.openxmlformats.org/officeDocument/2006/math">
+                      <m:oMathParaPr>
+                        <m:jc m:val="centerGroup"/>
+                      </m:oMathParaPr>
+                      <m:oMath xmlns:m="http://schemas.openxmlformats.org/officeDocument/2006/math">
+                        <m:r>
+                          <a:rPr lang="en-CA" sz="2000" b="0" i="1" smtClean="0">
+                            <a:solidFill>
+                              <a:srgbClr val="FF0000"/>
+                            </a:solidFill>
+                            <a:latin typeface="Cambria Math" panose="02040503050406030204" pitchFamily="18" charset="0"/>
+                            <a:cs typeface="Arial" panose="020B0604020202020204" pitchFamily="34" charset="0"/>
+                          </a:rPr>
+                          <m:t>𝐼𝑛𝑐𝑟𝑒𝑎𝑠𝑖𝑛𝑔</m:t>
+                        </m:r>
+                        <m:r>
+                          <a:rPr lang="en-CA" sz="2000" b="0" i="1" smtClean="0">
+                            <a:solidFill>
+                              <a:srgbClr val="FF0000"/>
+                            </a:solidFill>
+                            <a:latin typeface="Cambria Math" panose="02040503050406030204" pitchFamily="18" charset="0"/>
+                            <a:cs typeface="Arial" panose="020B0604020202020204" pitchFamily="34" charset="0"/>
+                          </a:rPr>
+                          <m:t> </m:t>
+                        </m:r>
+                        <m:r>
+                          <a:rPr lang="en-CA" sz="2000" b="0" i="1" smtClean="0">
+                            <a:solidFill>
+                              <a:srgbClr val="FF0000"/>
+                            </a:solidFill>
+                            <a:latin typeface="Cambria Math" panose="02040503050406030204" pitchFamily="18" charset="0"/>
+                            <a:cs typeface="Arial" panose="020B0604020202020204" pitchFamily="34" charset="0"/>
+                          </a:rPr>
+                          <m:t>𝑓𝑙𝑢𝑥</m:t>
+                        </m:r>
+                      </m:oMath>
+                    </m:oMathPara>
+                  </a14:m>
+                  <a:endParaRPr lang="en-US" sz="2000" dirty="0">
+                    <a:solidFill>
+                      <a:srgbClr val="FF0000"/>
+                    </a:solidFill>
+                    <a:latin typeface="Arial" panose="020B0604020202020204" pitchFamily="34" charset="0"/>
+                    <a:cs typeface="Arial" panose="020B0604020202020204" pitchFamily="34" charset="0"/>
+                  </a:endParaRPr>
+                </a:p>
+              </p:txBody>
+            </p:sp>
+          </mc:Choice>
+          <mc:Fallback>
+            <p:sp>
+              <p:nvSpPr>
+                <p:cNvPr id="69" name="TextBox 68">
+                  <a:extLst>
+                    <a:ext uri="{FF2B5EF4-FFF2-40B4-BE49-F238E27FC236}">
+                      <a16:creationId xmlns:a16="http://schemas.microsoft.com/office/drawing/2014/main" id="{0E301794-617A-3F4A-88AB-6CB637F0DF85}"/>
+                    </a:ext>
+                  </a:extLst>
+                </p:cNvPr>
+                <p:cNvSpPr txBox="1">
+                  <a:spLocks noRot="1" noChangeAspect="1" noMove="1" noResize="1" noEditPoints="1" noAdjustHandles="1" noChangeArrowheads="1" noChangeShapeType="1" noTextEdit="1"/>
+                </p:cNvSpPr>
+                <p:nvPr/>
+              </p:nvSpPr>
+              <p:spPr>
+                <a:xfrm>
+                  <a:off x="1986172" y="1690042"/>
+                  <a:ext cx="1905265" cy="307777"/>
+                </a:xfrm>
+                <a:prstGeom prst="rect">
+                  <a:avLst/>
+                </a:prstGeom>
+                <a:blipFill>
+                  <a:blip r:embed="rId6"/>
+                  <a:stretch>
+                    <a:fillRect l="-3311" t="-3846" r="-3311" b="-34615"/>
+                  </a:stretch>
+                </a:blipFill>
+              </p:spPr>
+              <p:txBody>
+                <a:bodyPr/>
+                <a:lstStyle/>
+                <a:p>
+                  <a:r>
+                    <a:rPr lang="en-US">
+                      <a:noFill/>
+                    </a:rPr>
+                    <a:t> </a:t>
+                  </a:r>
+                </a:p>
+              </p:txBody>
+            </p:sp>
+          </mc:Fallback>
+        </mc:AlternateContent>
+      </p:grpSp>
+      <p:grpSp>
+        <p:nvGrpSpPr>
+          <p:cNvPr id="138" name="Group 137">
+            <a:extLst>
+              <a:ext uri="{FF2B5EF4-FFF2-40B4-BE49-F238E27FC236}">
+                <a16:creationId xmlns:a16="http://schemas.microsoft.com/office/drawing/2014/main" id="{2DA70E1E-4CE7-E849-985D-3CEC7A430142}"/>
+              </a:ext>
+            </a:extLst>
+          </p:cNvPr>
+          <p:cNvGrpSpPr/>
+          <p:nvPr/>
+        </p:nvGrpSpPr>
+        <p:grpSpPr>
+          <a:xfrm>
+            <a:off x="4576931" y="1465927"/>
+            <a:ext cx="4040587" cy="2743349"/>
+            <a:chOff x="4452794" y="185198"/>
+            <a:chExt cx="4040587" cy="2743349"/>
+          </a:xfrm>
+        </p:grpSpPr>
+        <p:grpSp>
+          <p:nvGrpSpPr>
+            <p:cNvPr id="134" name="Group 133">
+              <a:extLst>
+                <a:ext uri="{FF2B5EF4-FFF2-40B4-BE49-F238E27FC236}">
+                  <a16:creationId xmlns:a16="http://schemas.microsoft.com/office/drawing/2014/main" id="{1313C01B-E50E-6F4A-951F-7E89F392006F}"/>
+                </a:ext>
+              </a:extLst>
+            </p:cNvPr>
+            <p:cNvGrpSpPr/>
+            <p:nvPr/>
+          </p:nvGrpSpPr>
+          <p:grpSpPr>
+            <a:xfrm>
+              <a:off x="4452794" y="185198"/>
+              <a:ext cx="3333758" cy="2743349"/>
+              <a:chOff x="4452794" y="185198"/>
+              <a:chExt cx="3333758" cy="2743349"/>
+            </a:xfrm>
+          </p:grpSpPr>
+          <p:grpSp>
+            <p:nvGrpSpPr>
+              <p:cNvPr id="106" name="Group 105">
+                <a:extLst>
+                  <a:ext uri="{FF2B5EF4-FFF2-40B4-BE49-F238E27FC236}">
+                    <a16:creationId xmlns:a16="http://schemas.microsoft.com/office/drawing/2014/main" id="{70EE1630-8119-5E48-8BDB-EF7B96F5BD59}"/>
+                  </a:ext>
+                </a:extLst>
+              </p:cNvPr>
+              <p:cNvGrpSpPr/>
+              <p:nvPr/>
+            </p:nvGrpSpPr>
+            <p:grpSpPr>
+              <a:xfrm>
+                <a:off x="4452794" y="185198"/>
+                <a:ext cx="3333758" cy="2743349"/>
+                <a:chOff x="5458771" y="1795223"/>
+                <a:chExt cx="3333758" cy="2743349"/>
+              </a:xfrm>
+            </p:grpSpPr>
+            <p:grpSp>
+              <p:nvGrpSpPr>
+                <p:cNvPr id="98" name="Group 97">
+                  <a:extLst>
+                    <a:ext uri="{FF2B5EF4-FFF2-40B4-BE49-F238E27FC236}">
+                      <a16:creationId xmlns:a16="http://schemas.microsoft.com/office/drawing/2014/main" id="{D3DCBA1D-FBAA-1B4D-8D04-EAC416843277}"/>
+                    </a:ext>
+                  </a:extLst>
+                </p:cNvPr>
+                <p:cNvGrpSpPr/>
+                <p:nvPr/>
+              </p:nvGrpSpPr>
+              <p:grpSpPr>
+                <a:xfrm>
+                  <a:off x="5458771" y="1795223"/>
+                  <a:ext cx="3333758" cy="2743349"/>
+                  <a:chOff x="5458771" y="1795223"/>
+                  <a:chExt cx="3333758" cy="2743349"/>
+                </a:xfrm>
+              </p:grpSpPr>
+              <p:cxnSp>
+                <p:nvCxnSpPr>
+                  <p:cNvPr id="94" name="Straight Connector 93">
+                    <a:extLst>
+                      <a:ext uri="{FF2B5EF4-FFF2-40B4-BE49-F238E27FC236}">
+                        <a16:creationId xmlns:a16="http://schemas.microsoft.com/office/drawing/2014/main" id="{BC22C8A4-C2D1-3444-8FD0-56C54C67BEAE}"/>
+                      </a:ext>
+                    </a:extLst>
+                  </p:cNvPr>
+                  <p:cNvCxnSpPr/>
+                  <p:nvPr/>
+                </p:nvCxnSpPr>
+                <p:spPr>
+                  <a:xfrm>
+                    <a:off x="7629940" y="3571557"/>
+                    <a:ext cx="0" cy="967015"/>
+                  </a:xfrm>
+                  <a:prstGeom prst="line">
+                    <a:avLst/>
+                  </a:prstGeom>
+                  <a:ln w="25400">
+                    <a:solidFill>
+                      <a:srgbClr val="00B0F0"/>
+                    </a:solidFill>
+                    <a:tailEnd type="triangle"/>
+                  </a:ln>
+                </p:spPr>
+                <p:style>
+                  <a:lnRef idx="1">
+                    <a:schemeClr val="accent1"/>
+                  </a:lnRef>
+                  <a:fillRef idx="0">
+                    <a:schemeClr val="accent1"/>
+                  </a:fillRef>
+                  <a:effectRef idx="0">
+                    <a:schemeClr val="accent1"/>
+                  </a:effectRef>
+                  <a:fontRef idx="minor">
+                    <a:schemeClr val="tx1"/>
+                  </a:fontRef>
+                </p:style>
+              </p:cxnSp>
+              <p:cxnSp>
+                <p:nvCxnSpPr>
+                  <p:cNvPr id="95" name="Straight Connector 94">
+                    <a:extLst>
+                      <a:ext uri="{FF2B5EF4-FFF2-40B4-BE49-F238E27FC236}">
+                        <a16:creationId xmlns:a16="http://schemas.microsoft.com/office/drawing/2014/main" id="{51DB3648-0F5B-7948-965B-50533DC86073}"/>
+                      </a:ext>
+                    </a:extLst>
+                  </p:cNvPr>
+                  <p:cNvCxnSpPr/>
+                  <p:nvPr/>
+                </p:nvCxnSpPr>
+                <p:spPr>
+                  <a:xfrm>
+                    <a:off x="8263458" y="3388314"/>
+                    <a:ext cx="0" cy="967015"/>
+                  </a:xfrm>
+                  <a:prstGeom prst="line">
+                    <a:avLst/>
+                  </a:prstGeom>
+                  <a:ln w="25400">
+                    <a:solidFill>
+                      <a:srgbClr val="00B0F0"/>
+                    </a:solidFill>
+                    <a:tailEnd type="triangle"/>
+                  </a:ln>
+                </p:spPr>
+                <p:style>
+                  <a:lnRef idx="1">
+                    <a:schemeClr val="accent1"/>
+                  </a:lnRef>
+                  <a:fillRef idx="0">
+                    <a:schemeClr val="accent1"/>
+                  </a:fillRef>
+                  <a:effectRef idx="0">
+                    <a:schemeClr val="accent1"/>
+                  </a:effectRef>
+                  <a:fontRef idx="minor">
+                    <a:schemeClr val="tx1"/>
+                  </a:fontRef>
+                </p:style>
+              </p:cxnSp>
+              <p:grpSp>
+                <p:nvGrpSpPr>
+                  <p:cNvPr id="70" name="Group 69">
+                    <a:extLst>
+                      <a:ext uri="{FF2B5EF4-FFF2-40B4-BE49-F238E27FC236}">
+                        <a16:creationId xmlns:a16="http://schemas.microsoft.com/office/drawing/2014/main" id="{8661BE8B-AA25-034B-BD50-CBEC86B4AB53}"/>
+                      </a:ext>
+                    </a:extLst>
+                  </p:cNvPr>
+                  <p:cNvGrpSpPr/>
+                  <p:nvPr/>
+                </p:nvGrpSpPr>
+                <p:grpSpPr>
+                  <a:xfrm>
+                    <a:off x="5458771" y="1795223"/>
+                    <a:ext cx="3333758" cy="2718553"/>
+                    <a:chOff x="652117" y="919217"/>
+                    <a:chExt cx="3333758" cy="2718553"/>
+                  </a:xfrm>
+                </p:grpSpPr>
+                <p:grpSp>
+                  <p:nvGrpSpPr>
+                    <p:cNvPr id="71" name="Group 70">
+                      <a:extLst>
+                        <a:ext uri="{FF2B5EF4-FFF2-40B4-BE49-F238E27FC236}">
+                          <a16:creationId xmlns:a16="http://schemas.microsoft.com/office/drawing/2014/main" id="{B7FBC06A-0C34-2F46-B99B-5B333168BD80}"/>
+                        </a:ext>
+                      </a:extLst>
+                    </p:cNvPr>
+                    <p:cNvGrpSpPr/>
+                    <p:nvPr/>
+                  </p:nvGrpSpPr>
+                  <p:grpSpPr>
+                    <a:xfrm>
+                      <a:off x="1024960" y="1225676"/>
+                      <a:ext cx="2960915" cy="2412094"/>
+                      <a:chOff x="1088571" y="1806121"/>
+                      <a:chExt cx="2960915" cy="2412094"/>
+                    </a:xfrm>
+                  </p:grpSpPr>
+                  <p:cxnSp>
+                    <p:nvCxnSpPr>
+                      <p:cNvPr id="74" name="Straight Connector 73">
+                        <a:extLst>
+                          <a:ext uri="{FF2B5EF4-FFF2-40B4-BE49-F238E27FC236}">
+                            <a16:creationId xmlns:a16="http://schemas.microsoft.com/office/drawing/2014/main" id="{9B15B02D-678A-2C4D-8867-CCEEAE188CF3}"/>
+                          </a:ext>
+                        </a:extLst>
+                      </p:cNvPr>
+                      <p:cNvCxnSpPr/>
+                      <p:nvPr/>
+                    </p:nvCxnSpPr>
+                    <p:spPr>
+                      <a:xfrm>
+                        <a:off x="1688648" y="3251200"/>
+                        <a:ext cx="0" cy="967015"/>
+                      </a:xfrm>
+                      <a:prstGeom prst="line">
+                        <a:avLst/>
+                      </a:prstGeom>
+                      <a:ln w="25400">
+                        <a:solidFill>
+                          <a:srgbClr val="00B0F0"/>
+                        </a:solidFill>
+                        <a:tailEnd type="triangle"/>
+                      </a:ln>
+                    </p:spPr>
+                    <p:style>
+                      <a:lnRef idx="1">
+                        <a:schemeClr val="accent1"/>
+                      </a:lnRef>
+                      <a:fillRef idx="0">
+                        <a:schemeClr val="accent1"/>
+                      </a:fillRef>
+                      <a:effectRef idx="0">
+                        <a:schemeClr val="accent1"/>
+                      </a:effectRef>
+                      <a:fontRef idx="minor">
+                        <a:schemeClr val="tx1"/>
+                      </a:fontRef>
+                    </p:style>
+                  </p:cxnSp>
+                  <p:cxnSp>
+                    <p:nvCxnSpPr>
+                      <p:cNvPr id="76" name="Straight Connector 75">
+                        <a:extLst>
+                          <a:ext uri="{FF2B5EF4-FFF2-40B4-BE49-F238E27FC236}">
+                            <a16:creationId xmlns:a16="http://schemas.microsoft.com/office/drawing/2014/main" id="{AD33AB78-5AF6-CB45-A083-02230D187DCE}"/>
+                          </a:ext>
+                        </a:extLst>
+                      </p:cNvPr>
+                      <p:cNvCxnSpPr/>
+                      <p:nvPr/>
+                    </p:nvCxnSpPr>
+                    <p:spPr>
+                      <a:xfrm>
+                        <a:off x="2322166" y="3067957"/>
+                        <a:ext cx="0" cy="967015"/>
+                      </a:xfrm>
+                      <a:prstGeom prst="line">
+                        <a:avLst/>
+                      </a:prstGeom>
+                      <a:ln w="25400">
+                        <a:solidFill>
+                          <a:srgbClr val="00B0F0"/>
+                        </a:solidFill>
+                        <a:tailEnd type="triangle"/>
+                      </a:ln>
+                    </p:spPr>
+                    <p:style>
+                      <a:lnRef idx="1">
+                        <a:schemeClr val="accent1"/>
+                      </a:lnRef>
+                      <a:fillRef idx="0">
+                        <a:schemeClr val="accent1"/>
+                      </a:fillRef>
+                      <a:effectRef idx="0">
+                        <a:schemeClr val="accent1"/>
+                      </a:effectRef>
+                      <a:fontRef idx="minor">
+                        <a:schemeClr val="tx1"/>
+                      </a:fontRef>
+                    </p:style>
+                  </p:cxnSp>
+                  <p:sp>
+                    <p:nvSpPr>
+                      <p:cNvPr id="81" name="Oval 80">
+                        <a:extLst>
+                          <a:ext uri="{FF2B5EF4-FFF2-40B4-BE49-F238E27FC236}">
+                            <a16:creationId xmlns:a16="http://schemas.microsoft.com/office/drawing/2014/main" id="{7B5070F3-9CF1-DF4C-80CC-DF318B2F237A}"/>
+                          </a:ext>
+                        </a:extLst>
+                      </p:cNvPr>
+                      <p:cNvSpPr/>
+                      <p:nvPr/>
+                    </p:nvSpPr>
+                    <p:spPr>
+                      <a:xfrm>
+                        <a:off x="1088571" y="2699657"/>
+                        <a:ext cx="2960915" cy="696686"/>
+                      </a:xfrm>
+                      <a:prstGeom prst="ellipse">
+                        <a:avLst/>
+                      </a:prstGeom>
+                      <a:solidFill>
+                        <a:schemeClr val="bg2">
+                          <a:lumMod val="90000"/>
+                          <a:alpha val="79000"/>
+                        </a:schemeClr>
+                      </a:solidFill>
+                      <a:ln w="38100">
+                        <a:solidFill>
+                          <a:schemeClr val="tx1"/>
+                        </a:solidFill>
+                      </a:ln>
+                    </p:spPr>
+                    <p:style>
+                      <a:lnRef idx="2">
+                        <a:schemeClr val="accent1">
+                          <a:shade val="50000"/>
+                        </a:schemeClr>
+                      </a:lnRef>
+                      <a:fillRef idx="1">
+                        <a:schemeClr val="accent1"/>
+                      </a:fillRef>
+                      <a:effectRef idx="0">
+                        <a:schemeClr val="accent1"/>
+                      </a:effectRef>
+                      <a:fontRef idx="minor">
+                        <a:schemeClr val="lt1"/>
+                      </a:fontRef>
+                    </p:style>
+                    <p:txBody>
+                      <a:bodyPr rtlCol="0" anchor="ctr"/>
+                      <a:lstStyle/>
+                      <a:p>
+                        <a:pPr algn="ctr"/>
+                        <a:endParaRPr lang="en-US"/>
+                      </a:p>
+                    </p:txBody>
+                  </p:sp>
+                  <p:cxnSp>
+                    <p:nvCxnSpPr>
+                      <p:cNvPr id="84" name="Straight Arrow Connector 83">
+                        <a:extLst>
+                          <a:ext uri="{FF2B5EF4-FFF2-40B4-BE49-F238E27FC236}">
+                            <a16:creationId xmlns:a16="http://schemas.microsoft.com/office/drawing/2014/main" id="{0BB22153-24CB-064F-ABEC-81F05ED76CFF}"/>
+                          </a:ext>
+                        </a:extLst>
+                      </p:cNvPr>
+                      <p:cNvCxnSpPr/>
+                      <p:nvPr/>
+                    </p:nvCxnSpPr>
+                    <p:spPr>
+                      <a:xfrm flipV="1">
+                        <a:off x="1688648" y="1973942"/>
+                        <a:ext cx="1362" cy="1277258"/>
+                      </a:xfrm>
+                      <a:prstGeom prst="straightConnector1">
+                        <a:avLst/>
+                      </a:prstGeom>
+                      <a:ln w="25400">
+                        <a:solidFill>
+                          <a:srgbClr val="00B0F0"/>
+                        </a:solidFill>
+                        <a:tailEnd type="none"/>
+                      </a:ln>
+                    </p:spPr>
+                    <p:style>
+                      <a:lnRef idx="1">
+                        <a:schemeClr val="accent1"/>
+                      </a:lnRef>
+                      <a:fillRef idx="0">
+                        <a:schemeClr val="accent1"/>
+                      </a:fillRef>
+                      <a:effectRef idx="0">
+                        <a:schemeClr val="accent1"/>
+                      </a:effectRef>
+                      <a:fontRef idx="minor">
+                        <a:schemeClr val="tx1"/>
+                      </a:fontRef>
+                    </p:style>
+                  </p:cxnSp>
+                  <p:cxnSp>
+                    <p:nvCxnSpPr>
+                      <p:cNvPr id="85" name="Straight Arrow Connector 84">
+                        <a:extLst>
+                          <a:ext uri="{FF2B5EF4-FFF2-40B4-BE49-F238E27FC236}">
+                            <a16:creationId xmlns:a16="http://schemas.microsoft.com/office/drawing/2014/main" id="{63E28ADF-B8B0-BA4B-9B3F-9C8CBFF569E5}"/>
+                          </a:ext>
+                        </a:extLst>
+                      </p:cNvPr>
+                      <p:cNvCxnSpPr/>
+                      <p:nvPr/>
+                    </p:nvCxnSpPr>
+                    <p:spPr>
+                      <a:xfrm flipV="1">
+                        <a:off x="2322166" y="1806121"/>
+                        <a:ext cx="1362" cy="1277258"/>
+                      </a:xfrm>
+                      <a:prstGeom prst="straightConnector1">
+                        <a:avLst/>
+                      </a:prstGeom>
+                      <a:ln w="25400">
+                        <a:solidFill>
+                          <a:srgbClr val="00B0F0"/>
+                        </a:solidFill>
+                        <a:tailEnd type="none"/>
+                      </a:ln>
+                    </p:spPr>
+                    <p:style>
+                      <a:lnRef idx="1">
+                        <a:schemeClr val="accent1"/>
+                      </a:lnRef>
+                      <a:fillRef idx="0">
+                        <a:schemeClr val="accent1"/>
+                      </a:fillRef>
+                      <a:effectRef idx="0">
+                        <a:schemeClr val="accent1"/>
+                      </a:effectRef>
+                      <a:fontRef idx="minor">
+                        <a:schemeClr val="tx1"/>
+                      </a:fontRef>
+                    </p:style>
+                  </p:cxnSp>
+                </p:grpSp>
+                <mc:AlternateContent xmlns:mc="http://schemas.openxmlformats.org/markup-compatibility/2006">
+                  <mc:Choice xmlns:a14="http://schemas.microsoft.com/office/drawing/2010/main" Requires="a14">
+                    <p:sp>
+                      <p:nvSpPr>
+                        <p:cNvPr id="72" name="TextBox 71">
+                          <a:extLst>
+                            <a:ext uri="{FF2B5EF4-FFF2-40B4-BE49-F238E27FC236}">
+                              <a16:creationId xmlns:a16="http://schemas.microsoft.com/office/drawing/2014/main" id="{DDBE520F-36EC-7F41-8696-19A23AD46783}"/>
+                            </a:ext>
+                          </a:extLst>
+                        </p:cNvPr>
+                        <p:cNvSpPr txBox="1"/>
+                        <p:nvPr/>
+                      </p:nvSpPr>
+                      <p:spPr>
+                        <a:xfrm>
+                          <a:off x="652117" y="919217"/>
+                          <a:ext cx="1246110" cy="345159"/>
+                        </a:xfrm>
+                        <a:prstGeom prst="rect">
+                          <a:avLst/>
+                        </a:prstGeom>
+                        <a:noFill/>
+                      </p:spPr>
+                      <p:txBody>
+                        <a:bodyPr wrap="none" lIns="0" tIns="0" rIns="0" bIns="0" rtlCol="0">
+                          <a:spAutoFit/>
+                        </a:bodyPr>
+                        <a:lstStyle/>
+                        <a:p>
+                          <a:pPr/>
+                          <a14:m>
+                            <m:oMathPara xmlns:m="http://schemas.openxmlformats.org/officeDocument/2006/math">
+                              <m:oMathParaPr>
+                                <m:jc m:val="centerGroup"/>
+                              </m:oMathParaPr>
+                              <m:oMath xmlns:m="http://schemas.openxmlformats.org/officeDocument/2006/math">
+                                <m:r>
+                                  <a:rPr lang="en-CA" sz="2000" b="0" i="1" smtClean="0">
+                                    <a:solidFill>
+                                      <a:srgbClr val="00B0F0"/>
+                                    </a:solidFill>
+                                    <a:latin typeface="Cambria Math" panose="02040503050406030204" pitchFamily="18" charset="0"/>
+                                    <a:cs typeface="Arial" panose="020B0604020202020204" pitchFamily="34" charset="0"/>
+                                  </a:rPr>
+                                  <m:t>𝐼𝑛𝑑𝑢𝑐𝑒𝑑</m:t>
+                                </m:r>
+                                <m:r>
+                                  <a:rPr lang="en-CA" sz="2000" b="0" i="1" smtClean="0">
+                                    <a:solidFill>
+                                      <a:srgbClr val="00B0F0"/>
+                                    </a:solidFill>
+                                    <a:latin typeface="Cambria Math" panose="02040503050406030204" pitchFamily="18" charset="0"/>
+                                    <a:cs typeface="Arial" panose="020B0604020202020204" pitchFamily="34" charset="0"/>
+                                  </a:rPr>
+                                  <m:t> </m:t>
+                                </m:r>
+                                <m:acc>
+                                  <m:accPr>
+                                    <m:chr m:val="⃗"/>
+                                    <m:ctrlPr>
+                                      <a:rPr lang="en-US" sz="2000" b="0" i="1" smtClean="0">
+                                        <a:solidFill>
+                                          <a:srgbClr val="00B0F0"/>
+                                        </a:solidFill>
+                                        <a:latin typeface="Cambria Math" panose="02040503050406030204" pitchFamily="18" charset="0"/>
+                                        <a:cs typeface="Arial" panose="020B0604020202020204" pitchFamily="34" charset="0"/>
+                                      </a:rPr>
+                                    </m:ctrlPr>
+                                  </m:accPr>
+                                  <m:e>
+                                    <m:r>
+                                      <a:rPr lang="en-US" sz="2000" b="0" i="1" smtClean="0">
+                                        <a:solidFill>
+                                          <a:srgbClr val="00B0F0"/>
+                                        </a:solidFill>
+                                        <a:latin typeface="Cambria Math" panose="02040503050406030204" pitchFamily="18" charset="0"/>
+                                        <a:cs typeface="Arial" panose="020B0604020202020204" pitchFamily="34" charset="0"/>
+                                      </a:rPr>
+                                      <m:t>𝐵</m:t>
+                                    </m:r>
+                                  </m:e>
+                                </m:acc>
+                              </m:oMath>
+                            </m:oMathPara>
+                          </a14:m>
+                          <a:endParaRPr lang="en-US" sz="2000" dirty="0">
+                            <a:solidFill>
+                              <a:srgbClr val="00B0F0"/>
+                            </a:solidFill>
+                            <a:latin typeface="Arial" panose="020B0604020202020204" pitchFamily="34" charset="0"/>
+                            <a:cs typeface="Arial" panose="020B0604020202020204" pitchFamily="34" charset="0"/>
+                          </a:endParaRPr>
+                        </a:p>
+                      </p:txBody>
+                    </p:sp>
+                  </mc:Choice>
+                  <mc:Fallback>
+                    <p:sp>
+                      <p:nvSpPr>
+                        <p:cNvPr id="72" name="TextBox 71">
+                          <a:extLst>
+                            <a:ext uri="{FF2B5EF4-FFF2-40B4-BE49-F238E27FC236}">
+                              <a16:creationId xmlns:a16="http://schemas.microsoft.com/office/drawing/2014/main" id="{DDBE520F-36EC-7F41-8696-19A23AD46783}"/>
+                            </a:ext>
+                          </a:extLst>
+                        </p:cNvPr>
+                        <p:cNvSpPr txBox="1">
+                          <a:spLocks noRot="1" noChangeAspect="1" noMove="1" noResize="1" noEditPoints="1" noAdjustHandles="1" noChangeArrowheads="1" noChangeShapeType="1" noTextEdit="1"/>
+                        </p:cNvSpPr>
+                        <p:nvPr/>
+                      </p:nvSpPr>
+                      <p:spPr>
+                        <a:xfrm>
+                          <a:off x="652117" y="919217"/>
+                          <a:ext cx="1246110" cy="345159"/>
+                        </a:xfrm>
+                        <a:prstGeom prst="rect">
+                          <a:avLst/>
+                        </a:prstGeom>
+                        <a:blipFill>
+                          <a:blip r:embed="rId7"/>
+                          <a:stretch>
+                            <a:fillRect l="-4040" r="-2020" b="-31034"/>
+                          </a:stretch>
+                        </a:blipFill>
+                      </p:spPr>
+                      <p:txBody>
+                        <a:bodyPr/>
+                        <a:lstStyle/>
+                        <a:p>
+                          <a:r>
+                            <a:rPr lang="en-US">
+                              <a:noFill/>
+                            </a:rPr>
+                            <a:t> </a:t>
+                          </a:r>
+                        </a:p>
+                      </p:txBody>
+                    </p:sp>
+                  </mc:Fallback>
+                </mc:AlternateContent>
+              </p:grpSp>
+              <p:cxnSp>
+                <p:nvCxnSpPr>
+                  <p:cNvPr id="96" name="Straight Arrow Connector 95">
+                    <a:extLst>
+                      <a:ext uri="{FF2B5EF4-FFF2-40B4-BE49-F238E27FC236}">
+                        <a16:creationId xmlns:a16="http://schemas.microsoft.com/office/drawing/2014/main" id="{88772BC0-822A-9148-BB83-3B03285368D8}"/>
+                      </a:ext>
+                    </a:extLst>
+                  </p:cNvPr>
+                  <p:cNvCxnSpPr/>
+                  <p:nvPr/>
+                </p:nvCxnSpPr>
+                <p:spPr>
+                  <a:xfrm flipV="1">
+                    <a:off x="7629940" y="2294299"/>
+                    <a:ext cx="1362" cy="1277258"/>
+                  </a:xfrm>
+                  <a:prstGeom prst="straightConnector1">
+                    <a:avLst/>
+                  </a:prstGeom>
+                  <a:ln w="25400">
+                    <a:solidFill>
+                      <a:srgbClr val="00B0F0"/>
+                    </a:solidFill>
+                    <a:tailEnd type="none"/>
+                  </a:ln>
+                </p:spPr>
+                <p:style>
+                  <a:lnRef idx="1">
+                    <a:schemeClr val="accent1"/>
+                  </a:lnRef>
+                  <a:fillRef idx="0">
+                    <a:schemeClr val="accent1"/>
+                  </a:fillRef>
+                  <a:effectRef idx="0">
+                    <a:schemeClr val="accent1"/>
+                  </a:effectRef>
+                  <a:fontRef idx="minor">
+                    <a:schemeClr val="tx1"/>
+                  </a:fontRef>
+                </p:style>
+              </p:cxnSp>
+              <p:cxnSp>
+                <p:nvCxnSpPr>
+                  <p:cNvPr id="97" name="Straight Arrow Connector 96">
+                    <a:extLst>
+                      <a:ext uri="{FF2B5EF4-FFF2-40B4-BE49-F238E27FC236}">
+                        <a16:creationId xmlns:a16="http://schemas.microsoft.com/office/drawing/2014/main" id="{CAE170C4-236B-1A49-9F6D-E8A1B817D6E8}"/>
+                      </a:ext>
+                    </a:extLst>
+                  </p:cNvPr>
+                  <p:cNvCxnSpPr/>
+                  <p:nvPr/>
+                </p:nvCxnSpPr>
+                <p:spPr>
+                  <a:xfrm flipV="1">
+                    <a:off x="8263458" y="2126478"/>
+                    <a:ext cx="1362" cy="1277258"/>
+                  </a:xfrm>
+                  <a:prstGeom prst="straightConnector1">
+                    <a:avLst/>
+                  </a:prstGeom>
+                  <a:ln w="25400">
+                    <a:solidFill>
+                      <a:srgbClr val="00B0F0"/>
+                    </a:solidFill>
+                    <a:tailEnd type="none"/>
+                  </a:ln>
+                </p:spPr>
+                <p:style>
+                  <a:lnRef idx="1">
+                    <a:schemeClr val="accent1"/>
+                  </a:lnRef>
+                  <a:fillRef idx="0">
+                    <a:schemeClr val="accent1"/>
+                  </a:fillRef>
+                  <a:effectRef idx="0">
+                    <a:schemeClr val="accent1"/>
+                  </a:effectRef>
+                  <a:fontRef idx="minor">
+                    <a:schemeClr val="tx1"/>
+                  </a:fontRef>
+                </p:style>
+              </p:cxnSp>
+            </p:grpSp>
+            <p:cxnSp>
+              <p:nvCxnSpPr>
+                <p:cNvPr id="104" name="Straight Connector 103">
+                  <a:extLst>
+                    <a:ext uri="{FF2B5EF4-FFF2-40B4-BE49-F238E27FC236}">
+                      <a16:creationId xmlns:a16="http://schemas.microsoft.com/office/drawing/2014/main" id="{804B0612-4623-604C-9196-F19C9D3CB494}"/>
+                    </a:ext>
+                  </a:extLst>
+                </p:cNvPr>
+                <p:cNvCxnSpPr/>
+                <p:nvPr/>
+              </p:nvCxnSpPr>
+              <p:spPr>
+                <a:xfrm rot="17110431">
+                  <a:off x="6831188" y="3533700"/>
+                  <a:ext cx="132203" cy="176270"/>
+                </a:xfrm>
+                <a:prstGeom prst="line">
+                  <a:avLst/>
+                </a:prstGeom>
+                <a:ln w="38100">
+                  <a:solidFill>
+                    <a:schemeClr val="tx1"/>
+                  </a:solidFill>
+                </a:ln>
+              </p:spPr>
+              <p:style>
+                <a:lnRef idx="1">
+                  <a:schemeClr val="accent1"/>
+                </a:lnRef>
+                <a:fillRef idx="0">
+                  <a:schemeClr val="accent1"/>
+                </a:fillRef>
+                <a:effectRef idx="0">
+                  <a:schemeClr val="accent1"/>
+                </a:effectRef>
+                <a:fontRef idx="minor">
+                  <a:schemeClr val="tx1"/>
+                </a:fontRef>
+              </p:style>
+            </p:cxnSp>
+            <p:cxnSp>
+              <p:nvCxnSpPr>
+                <p:cNvPr id="105" name="Straight Connector 104">
+                  <a:extLst>
+                    <a:ext uri="{FF2B5EF4-FFF2-40B4-BE49-F238E27FC236}">
+                      <a16:creationId xmlns:a16="http://schemas.microsoft.com/office/drawing/2014/main" id="{A0090AEF-8874-7043-BAB5-C9A4D954B4DC}"/>
+                    </a:ext>
+                  </a:extLst>
+                </p:cNvPr>
+                <p:cNvCxnSpPr/>
+                <p:nvPr/>
+              </p:nvCxnSpPr>
+              <p:spPr>
+                <a:xfrm rot="17110431" flipH="1">
+                  <a:off x="6814111" y="3633197"/>
+                  <a:ext cx="112390" cy="176270"/>
+                </a:xfrm>
+                <a:prstGeom prst="line">
+                  <a:avLst/>
+                </a:prstGeom>
+                <a:ln w="38100">
+                  <a:solidFill>
+                    <a:schemeClr val="tx1"/>
+                  </a:solidFill>
+                </a:ln>
+              </p:spPr>
+              <p:style>
+                <a:lnRef idx="1">
+                  <a:schemeClr val="accent1"/>
+                </a:lnRef>
+                <a:fillRef idx="0">
+                  <a:schemeClr val="accent1"/>
+                </a:fillRef>
+                <a:effectRef idx="0">
+                  <a:schemeClr val="accent1"/>
+                </a:effectRef>
+                <a:fontRef idx="minor">
+                  <a:schemeClr val="tx1"/>
+                </a:fontRef>
+              </p:style>
+            </p:cxnSp>
+          </p:grpSp>
+          <p:cxnSp>
+            <p:nvCxnSpPr>
+              <p:cNvPr id="108" name="Straight Connector 107">
+                <a:extLst>
+                  <a:ext uri="{FF2B5EF4-FFF2-40B4-BE49-F238E27FC236}">
+                    <a16:creationId xmlns:a16="http://schemas.microsoft.com/office/drawing/2014/main" id="{712B3F5B-1B74-F34F-B570-CF02276F77F1}"/>
+                  </a:ext>
+                </a:extLst>
+              </p:cNvPr>
+              <p:cNvCxnSpPr>
+                <a:cxnSpLocks/>
+              </p:cNvCxnSpPr>
+              <p:nvPr/>
+            </p:nvCxnSpPr>
+            <p:spPr>
+              <a:xfrm>
+                <a:off x="6233002" y="1284559"/>
+                <a:ext cx="237304" cy="98530"/>
+              </a:xfrm>
+              <a:prstGeom prst="line">
+                <a:avLst/>
+              </a:prstGeom>
+              <a:ln w="38100">
+                <a:solidFill>
+                  <a:schemeClr val="tx1"/>
+                </a:solidFill>
+              </a:ln>
+            </p:spPr>
+            <p:style>
+              <a:lnRef idx="1">
+                <a:schemeClr val="accent1"/>
+              </a:lnRef>
+              <a:fillRef idx="0">
+                <a:schemeClr val="accent1"/>
+              </a:fillRef>
+              <a:effectRef idx="0">
+                <a:schemeClr val="accent1"/>
+              </a:effectRef>
+              <a:fontRef idx="minor">
+                <a:schemeClr val="tx1"/>
+              </a:fontRef>
+            </p:style>
+          </p:cxnSp>
+          <p:cxnSp>
+            <p:nvCxnSpPr>
+              <p:cNvPr id="109" name="Straight Connector 108">
+                <a:extLst>
+                  <a:ext uri="{FF2B5EF4-FFF2-40B4-BE49-F238E27FC236}">
+                    <a16:creationId xmlns:a16="http://schemas.microsoft.com/office/drawing/2014/main" id="{856C97DD-032F-CE4F-A46E-4F5A90BA85BD}"/>
+                  </a:ext>
+                </a:extLst>
+              </p:cNvPr>
+              <p:cNvCxnSpPr>
+                <a:cxnSpLocks/>
+              </p:cNvCxnSpPr>
+              <p:nvPr/>
+            </p:nvCxnSpPr>
+            <p:spPr>
+              <a:xfrm flipH="1">
+                <a:off x="6255172" y="1390205"/>
+                <a:ext cx="198965" cy="112711"/>
+              </a:xfrm>
+              <a:prstGeom prst="line">
+                <a:avLst/>
+              </a:prstGeom>
+              <a:ln w="38100">
+                <a:solidFill>
+                  <a:schemeClr val="tx1"/>
+                </a:solidFill>
+              </a:ln>
+            </p:spPr>
+            <p:style>
+              <a:lnRef idx="1">
+                <a:schemeClr val="accent1"/>
+              </a:lnRef>
+              <a:fillRef idx="0">
+                <a:schemeClr val="accent1"/>
+              </a:fillRef>
+              <a:effectRef idx="0">
+                <a:schemeClr val="accent1"/>
+              </a:effectRef>
+              <a:fontRef idx="minor">
+                <a:schemeClr val="tx1"/>
+              </a:fontRef>
+            </p:style>
+          </p:cxnSp>
+        </p:grpSp>
+        <p:pic>
+          <p:nvPicPr>
+            <p:cNvPr id="135" name="Picture 134" descr="A close up of a logo&#10;&#10;Description automatically generated">
+              <a:extLst>
+                <a:ext uri="{FF2B5EF4-FFF2-40B4-BE49-F238E27FC236}">
+                  <a16:creationId xmlns:a16="http://schemas.microsoft.com/office/drawing/2014/main" id="{4C53F318-4D5A-554B-AC55-9409FFF95920}"/>
+                </a:ext>
+              </a:extLst>
+            </p:cNvPr>
+            <p:cNvPicPr>
+              <a:picLocks noChangeAspect="1"/>
+            </p:cNvPicPr>
+            <p:nvPr/>
+          </p:nvPicPr>
+          <p:blipFill rotWithShape="1">
+            <a:blip r:embed="rId8">
+              <a:extLst>
+                <a:ext uri="{28A0092B-C50C-407E-A947-70E740481C1C}">
+                  <a14:useLocalDpi xmlns:a14="http://schemas.microsoft.com/office/drawing/2010/main" val="0"/>
+                </a:ext>
+              </a:extLst>
+            </a:blip>
+            <a:srcRect t="44592"/>
+            <a:stretch/>
+          </p:blipFill>
+          <p:spPr>
+            <a:xfrm rot="10800000">
+              <a:off x="6667732" y="1089010"/>
+              <a:ext cx="1825649" cy="835933"/>
+            </a:xfrm>
+            <a:prstGeom prst="rect">
+              <a:avLst/>
+            </a:prstGeom>
+          </p:spPr>
+        </p:pic>
+      </p:grpSp>
+      <p:grpSp>
+        <p:nvGrpSpPr>
+          <p:cNvPr id="139" name="Group 138">
+            <a:extLst>
+              <a:ext uri="{FF2B5EF4-FFF2-40B4-BE49-F238E27FC236}">
+                <a16:creationId xmlns:a16="http://schemas.microsoft.com/office/drawing/2014/main" id="{FD7C5587-2A37-3B4F-82CE-F7798EBD4E14}"/>
+              </a:ext>
+            </a:extLst>
+          </p:cNvPr>
+          <p:cNvGrpSpPr/>
+          <p:nvPr/>
+        </p:nvGrpSpPr>
+        <p:grpSpPr>
+          <a:xfrm>
+            <a:off x="8669784" y="1438639"/>
+            <a:ext cx="3700926" cy="2743349"/>
+            <a:chOff x="7712817" y="2264982"/>
+            <a:chExt cx="3700926" cy="2743349"/>
+          </a:xfrm>
+        </p:grpSpPr>
+        <p:pic>
+          <p:nvPicPr>
+            <p:cNvPr id="137" name="Picture 136" descr="A close up of a logo&#10;&#10;Description automatically generated">
+              <a:extLst>
+                <a:ext uri="{FF2B5EF4-FFF2-40B4-BE49-F238E27FC236}">
+                  <a16:creationId xmlns:a16="http://schemas.microsoft.com/office/drawing/2014/main" id="{08C53F7F-D429-AD40-A2BA-335B68E45A03}"/>
+                </a:ext>
+              </a:extLst>
+            </p:cNvPr>
+            <p:cNvPicPr>
+              <a:picLocks noChangeAspect="1"/>
+            </p:cNvPicPr>
+            <p:nvPr/>
+          </p:nvPicPr>
+          <p:blipFill rotWithShape="1">
+            <a:blip r:embed="rId8">
+              <a:extLst>
+                <a:ext uri="{28A0092B-C50C-407E-A947-70E740481C1C}">
+                  <a14:useLocalDpi xmlns:a14="http://schemas.microsoft.com/office/drawing/2010/main" val="0"/>
+                </a:ext>
+              </a:extLst>
+            </a:blip>
+            <a:srcRect t="44592"/>
+            <a:stretch/>
+          </p:blipFill>
+          <p:spPr>
+            <a:xfrm>
+              <a:off x="7712817" y="3664094"/>
+              <a:ext cx="1825649" cy="835933"/>
+            </a:xfrm>
+            <a:prstGeom prst="rect">
+              <a:avLst/>
+            </a:prstGeom>
+          </p:spPr>
+        </p:pic>
+        <p:grpSp>
+          <p:nvGrpSpPr>
+            <p:cNvPr id="136" name="Group 135">
+              <a:extLst>
+                <a:ext uri="{FF2B5EF4-FFF2-40B4-BE49-F238E27FC236}">
+                  <a16:creationId xmlns:a16="http://schemas.microsoft.com/office/drawing/2014/main" id="{3D369E38-6890-ED44-BFF2-2117D7FD2828}"/>
+                </a:ext>
+              </a:extLst>
+            </p:cNvPr>
+            <p:cNvGrpSpPr/>
+            <p:nvPr/>
+          </p:nvGrpSpPr>
+          <p:grpSpPr>
+            <a:xfrm>
+              <a:off x="8079985" y="2264982"/>
+              <a:ext cx="3333758" cy="2743349"/>
+              <a:chOff x="8079985" y="2264982"/>
+              <a:chExt cx="3333758" cy="2743349"/>
+            </a:xfrm>
+          </p:grpSpPr>
+          <p:grpSp>
+            <p:nvGrpSpPr>
+              <p:cNvPr id="115" name="Group 114">
+                <a:extLst>
+                  <a:ext uri="{FF2B5EF4-FFF2-40B4-BE49-F238E27FC236}">
+                    <a16:creationId xmlns:a16="http://schemas.microsoft.com/office/drawing/2014/main" id="{368C095D-77D2-F644-8006-34686AB9DB9D}"/>
+                  </a:ext>
+                </a:extLst>
+              </p:cNvPr>
+              <p:cNvGrpSpPr/>
+              <p:nvPr/>
+            </p:nvGrpSpPr>
+            <p:grpSpPr>
+              <a:xfrm>
+                <a:off x="8079985" y="2264982"/>
+                <a:ext cx="3333758" cy="2743349"/>
+                <a:chOff x="5458771" y="1795223"/>
+                <a:chExt cx="3333758" cy="2743349"/>
+              </a:xfrm>
+            </p:grpSpPr>
+            <p:grpSp>
+              <p:nvGrpSpPr>
+                <p:cNvPr id="116" name="Group 115">
+                  <a:extLst>
+                    <a:ext uri="{FF2B5EF4-FFF2-40B4-BE49-F238E27FC236}">
+                      <a16:creationId xmlns:a16="http://schemas.microsoft.com/office/drawing/2014/main" id="{4E072EBB-02FF-8B4A-9D08-4E1CD4CDB40C}"/>
+                    </a:ext>
+                  </a:extLst>
+                </p:cNvPr>
+                <p:cNvGrpSpPr/>
+                <p:nvPr/>
+              </p:nvGrpSpPr>
+              <p:grpSpPr>
+                <a:xfrm>
+                  <a:off x="5458771" y="1795223"/>
+                  <a:ext cx="3333758" cy="2743349"/>
+                  <a:chOff x="5458771" y="1795223"/>
+                  <a:chExt cx="3333758" cy="2743349"/>
+                </a:xfrm>
+              </p:grpSpPr>
+              <p:cxnSp>
+                <p:nvCxnSpPr>
+                  <p:cNvPr id="119" name="Straight Connector 118">
+                    <a:extLst>
+                      <a:ext uri="{FF2B5EF4-FFF2-40B4-BE49-F238E27FC236}">
+                        <a16:creationId xmlns:a16="http://schemas.microsoft.com/office/drawing/2014/main" id="{EBD73A7B-3DD9-F841-9E0A-BDB6674CCD55}"/>
+                      </a:ext>
+                    </a:extLst>
+                  </p:cNvPr>
+                  <p:cNvCxnSpPr/>
+                  <p:nvPr/>
+                </p:nvCxnSpPr>
+                <p:spPr>
+                  <a:xfrm>
+                    <a:off x="7629940" y="3571557"/>
+                    <a:ext cx="0" cy="967015"/>
+                  </a:xfrm>
+                  <a:prstGeom prst="line">
+                    <a:avLst/>
+                  </a:prstGeom>
+                  <a:ln w="25400">
+                    <a:solidFill>
+                      <a:srgbClr val="00B0F0"/>
+                    </a:solidFill>
+                    <a:tailEnd type="none"/>
+                  </a:ln>
+                </p:spPr>
+                <p:style>
+                  <a:lnRef idx="1">
+                    <a:schemeClr val="accent1"/>
+                  </a:lnRef>
+                  <a:fillRef idx="0">
+                    <a:schemeClr val="accent1"/>
+                  </a:fillRef>
+                  <a:effectRef idx="0">
+                    <a:schemeClr val="accent1"/>
+                  </a:effectRef>
+                  <a:fontRef idx="minor">
+                    <a:schemeClr val="tx1"/>
+                  </a:fontRef>
+                </p:style>
+              </p:cxnSp>
+              <p:cxnSp>
+                <p:nvCxnSpPr>
+                  <p:cNvPr id="120" name="Straight Connector 119">
+                    <a:extLst>
+                      <a:ext uri="{FF2B5EF4-FFF2-40B4-BE49-F238E27FC236}">
+                        <a16:creationId xmlns:a16="http://schemas.microsoft.com/office/drawing/2014/main" id="{59D86515-EE5D-A747-B65E-031D560AE1C3}"/>
+                      </a:ext>
+                    </a:extLst>
+                  </p:cNvPr>
+                  <p:cNvCxnSpPr/>
+                  <p:nvPr/>
+                </p:nvCxnSpPr>
+                <p:spPr>
+                  <a:xfrm>
+                    <a:off x="8263458" y="3388314"/>
+                    <a:ext cx="0" cy="967015"/>
+                  </a:xfrm>
+                  <a:prstGeom prst="line">
+                    <a:avLst/>
+                  </a:prstGeom>
+                  <a:ln w="25400">
+                    <a:solidFill>
+                      <a:srgbClr val="00B0F0"/>
+                    </a:solidFill>
+                    <a:tailEnd type="none"/>
+                  </a:ln>
+                </p:spPr>
+                <p:style>
+                  <a:lnRef idx="1">
+                    <a:schemeClr val="accent1"/>
+                  </a:lnRef>
+                  <a:fillRef idx="0">
+                    <a:schemeClr val="accent1"/>
+                  </a:fillRef>
+                  <a:effectRef idx="0">
+                    <a:schemeClr val="accent1"/>
+                  </a:effectRef>
+                  <a:fontRef idx="minor">
+                    <a:schemeClr val="tx1"/>
+                  </a:fontRef>
+                </p:style>
+              </p:cxnSp>
+              <p:grpSp>
+                <p:nvGrpSpPr>
+                  <p:cNvPr id="121" name="Group 120">
+                    <a:extLst>
+                      <a:ext uri="{FF2B5EF4-FFF2-40B4-BE49-F238E27FC236}">
+                        <a16:creationId xmlns:a16="http://schemas.microsoft.com/office/drawing/2014/main" id="{4FFFE0B7-9839-DE4B-B6D0-465F05149590}"/>
+                      </a:ext>
+                    </a:extLst>
+                  </p:cNvPr>
+                  <p:cNvGrpSpPr/>
+                  <p:nvPr/>
+                </p:nvGrpSpPr>
+                <p:grpSpPr>
+                  <a:xfrm>
+                    <a:off x="5458771" y="1795223"/>
+                    <a:ext cx="3333758" cy="2718553"/>
+                    <a:chOff x="652117" y="919217"/>
+                    <a:chExt cx="3333758" cy="2718553"/>
+                  </a:xfrm>
+                </p:grpSpPr>
+                <p:grpSp>
+                  <p:nvGrpSpPr>
+                    <p:cNvPr id="124" name="Group 123">
+                      <a:extLst>
+                        <a:ext uri="{FF2B5EF4-FFF2-40B4-BE49-F238E27FC236}">
+                          <a16:creationId xmlns:a16="http://schemas.microsoft.com/office/drawing/2014/main" id="{EFEAC709-E16A-DD4A-BE76-79644D8B8836}"/>
+                        </a:ext>
+                      </a:extLst>
+                    </p:cNvPr>
+                    <p:cNvGrpSpPr/>
+                    <p:nvPr/>
+                  </p:nvGrpSpPr>
+                  <p:grpSpPr>
+                    <a:xfrm>
+                      <a:off x="1024960" y="1225676"/>
+                      <a:ext cx="2960915" cy="2412094"/>
+                      <a:chOff x="1088571" y="1806121"/>
+                      <a:chExt cx="2960915" cy="2412094"/>
+                    </a:xfrm>
+                  </p:grpSpPr>
+                  <p:cxnSp>
+                    <p:nvCxnSpPr>
+                      <p:cNvPr id="126" name="Straight Connector 125">
+                        <a:extLst>
+                          <a:ext uri="{FF2B5EF4-FFF2-40B4-BE49-F238E27FC236}">
+                            <a16:creationId xmlns:a16="http://schemas.microsoft.com/office/drawing/2014/main" id="{47C71E00-BB6A-9843-846F-54A474AD32EB}"/>
+                          </a:ext>
+                        </a:extLst>
+                      </p:cNvPr>
+                      <p:cNvCxnSpPr/>
+                      <p:nvPr/>
+                    </p:nvCxnSpPr>
+                    <p:spPr>
+                      <a:xfrm>
+                        <a:off x="1688648" y="3251200"/>
+                        <a:ext cx="0" cy="967015"/>
+                      </a:xfrm>
+                      <a:prstGeom prst="line">
+                        <a:avLst/>
+                      </a:prstGeom>
+                      <a:ln w="25400">
+                        <a:solidFill>
+                          <a:srgbClr val="00B0F0"/>
+                        </a:solidFill>
+                        <a:tailEnd type="none"/>
+                      </a:ln>
+                    </p:spPr>
+                    <p:style>
+                      <a:lnRef idx="1">
+                        <a:schemeClr val="accent1"/>
+                      </a:lnRef>
+                      <a:fillRef idx="0">
+                        <a:schemeClr val="accent1"/>
+                      </a:fillRef>
+                      <a:effectRef idx="0">
+                        <a:schemeClr val="accent1"/>
+                      </a:effectRef>
+                      <a:fontRef idx="minor">
+                        <a:schemeClr val="tx1"/>
+                      </a:fontRef>
+                    </p:style>
+                  </p:cxnSp>
+                  <p:cxnSp>
+                    <p:nvCxnSpPr>
+                      <p:cNvPr id="127" name="Straight Connector 126">
+                        <a:extLst>
+                          <a:ext uri="{FF2B5EF4-FFF2-40B4-BE49-F238E27FC236}">
+                            <a16:creationId xmlns:a16="http://schemas.microsoft.com/office/drawing/2014/main" id="{3CF95221-0FF0-9F4D-9722-E0E1A11C6491}"/>
+                          </a:ext>
+                        </a:extLst>
+                      </p:cNvPr>
+                      <p:cNvCxnSpPr/>
+                      <p:nvPr/>
+                    </p:nvCxnSpPr>
+                    <p:spPr>
+                      <a:xfrm>
+                        <a:off x="2322166" y="3067957"/>
+                        <a:ext cx="0" cy="967015"/>
+                      </a:xfrm>
+                      <a:prstGeom prst="line">
+                        <a:avLst/>
+                      </a:prstGeom>
+                      <a:ln w="25400">
+                        <a:solidFill>
+                          <a:srgbClr val="00B0F0"/>
+                        </a:solidFill>
+                        <a:tailEnd type="none"/>
+                      </a:ln>
+                    </p:spPr>
+                    <p:style>
+                      <a:lnRef idx="1">
+                        <a:schemeClr val="accent1"/>
+                      </a:lnRef>
+                      <a:fillRef idx="0">
+                        <a:schemeClr val="accent1"/>
+                      </a:fillRef>
+                      <a:effectRef idx="0">
+                        <a:schemeClr val="accent1"/>
+                      </a:effectRef>
+                      <a:fontRef idx="minor">
+                        <a:schemeClr val="tx1"/>
+                      </a:fontRef>
+                    </p:style>
+                  </p:cxnSp>
+                  <p:sp>
+                    <p:nvSpPr>
+                      <p:cNvPr id="128" name="Oval 127">
+                        <a:extLst>
+                          <a:ext uri="{FF2B5EF4-FFF2-40B4-BE49-F238E27FC236}">
+                            <a16:creationId xmlns:a16="http://schemas.microsoft.com/office/drawing/2014/main" id="{870FDA3B-6467-4F4C-86AB-3A4117653BFE}"/>
+                          </a:ext>
+                        </a:extLst>
+                      </p:cNvPr>
+                      <p:cNvSpPr/>
+                      <p:nvPr/>
+                    </p:nvSpPr>
+                    <p:spPr>
+                      <a:xfrm>
+                        <a:off x="1088571" y="2699657"/>
+                        <a:ext cx="2960915" cy="696686"/>
+                      </a:xfrm>
+                      <a:prstGeom prst="ellipse">
+                        <a:avLst/>
+                      </a:prstGeom>
+                      <a:solidFill>
+                        <a:schemeClr val="bg2">
+                          <a:lumMod val="90000"/>
+                          <a:alpha val="79000"/>
+                        </a:schemeClr>
+                      </a:solidFill>
+                      <a:ln w="38100">
+                        <a:solidFill>
+                          <a:schemeClr val="tx1"/>
+                        </a:solidFill>
+                      </a:ln>
+                    </p:spPr>
+                    <p:style>
+                      <a:lnRef idx="2">
+                        <a:schemeClr val="accent1">
+                          <a:shade val="50000"/>
+                        </a:schemeClr>
+                      </a:lnRef>
+                      <a:fillRef idx="1">
+                        <a:schemeClr val="accent1"/>
+                      </a:fillRef>
+                      <a:effectRef idx="0">
+                        <a:schemeClr val="accent1"/>
+                      </a:effectRef>
+                      <a:fontRef idx="minor">
+                        <a:schemeClr val="lt1"/>
+                      </a:fontRef>
+                    </p:style>
+                    <p:txBody>
+                      <a:bodyPr rtlCol="0" anchor="ctr"/>
+                      <a:lstStyle/>
+                      <a:p>
+                        <a:pPr algn="ctr"/>
+                        <a:endParaRPr lang="en-US"/>
+                      </a:p>
+                    </p:txBody>
+                  </p:sp>
+                  <p:cxnSp>
+                    <p:nvCxnSpPr>
+                      <p:cNvPr id="129" name="Straight Arrow Connector 128">
+                        <a:extLst>
+                          <a:ext uri="{FF2B5EF4-FFF2-40B4-BE49-F238E27FC236}">
+                            <a16:creationId xmlns:a16="http://schemas.microsoft.com/office/drawing/2014/main" id="{A538B2E5-424F-E04B-89BA-EBD93832A81D}"/>
+                          </a:ext>
+                        </a:extLst>
+                      </p:cNvPr>
+                      <p:cNvCxnSpPr/>
+                      <p:nvPr/>
+                    </p:nvCxnSpPr>
+                    <p:spPr>
+                      <a:xfrm flipV="1">
+                        <a:off x="1688648" y="1973942"/>
+                        <a:ext cx="1362" cy="1277258"/>
+                      </a:xfrm>
+                      <a:prstGeom prst="straightConnector1">
+                        <a:avLst/>
+                      </a:prstGeom>
+                      <a:ln w="25400">
+                        <a:solidFill>
+                          <a:srgbClr val="00B0F0"/>
+                        </a:solidFill>
+                        <a:tailEnd type="triangle"/>
+                      </a:ln>
+                    </p:spPr>
+                    <p:style>
+                      <a:lnRef idx="1">
+                        <a:schemeClr val="accent1"/>
+                      </a:lnRef>
+                      <a:fillRef idx="0">
+                        <a:schemeClr val="accent1"/>
+                      </a:fillRef>
+                      <a:effectRef idx="0">
+                        <a:schemeClr val="accent1"/>
+                      </a:effectRef>
+                      <a:fontRef idx="minor">
+                        <a:schemeClr val="tx1"/>
+                      </a:fontRef>
+                    </p:style>
+                  </p:cxnSp>
+                  <p:cxnSp>
+                    <p:nvCxnSpPr>
+                      <p:cNvPr id="130" name="Straight Arrow Connector 129">
+                        <a:extLst>
+                          <a:ext uri="{FF2B5EF4-FFF2-40B4-BE49-F238E27FC236}">
+                            <a16:creationId xmlns:a16="http://schemas.microsoft.com/office/drawing/2014/main" id="{CE3F3581-C127-FB44-B649-757C03CD9547}"/>
+                          </a:ext>
+                        </a:extLst>
+                      </p:cNvPr>
+                      <p:cNvCxnSpPr/>
+                      <p:nvPr/>
+                    </p:nvCxnSpPr>
+                    <p:spPr>
+                      <a:xfrm flipV="1">
+                        <a:off x="2322166" y="1806121"/>
+                        <a:ext cx="1362" cy="1277258"/>
+                      </a:xfrm>
+                      <a:prstGeom prst="straightConnector1">
+                        <a:avLst/>
+                      </a:prstGeom>
+                      <a:ln w="25400">
+                        <a:solidFill>
+                          <a:srgbClr val="00B0F0"/>
+                        </a:solidFill>
+                        <a:tailEnd type="triangle"/>
+                      </a:ln>
+                    </p:spPr>
+                    <p:style>
+                      <a:lnRef idx="1">
+                        <a:schemeClr val="accent1"/>
+                      </a:lnRef>
+                      <a:fillRef idx="0">
+                        <a:schemeClr val="accent1"/>
+                      </a:fillRef>
+                      <a:effectRef idx="0">
+                        <a:schemeClr val="accent1"/>
+                      </a:effectRef>
+                      <a:fontRef idx="minor">
+                        <a:schemeClr val="tx1"/>
+                      </a:fontRef>
+                    </p:style>
+                  </p:cxnSp>
+                </p:grpSp>
+                <mc:AlternateContent xmlns:mc="http://schemas.openxmlformats.org/markup-compatibility/2006">
+                  <mc:Choice xmlns:a14="http://schemas.microsoft.com/office/drawing/2010/main" Requires="a14">
+                    <p:sp>
+                      <p:nvSpPr>
+                        <p:cNvPr id="125" name="TextBox 124">
+                          <a:extLst>
+                            <a:ext uri="{FF2B5EF4-FFF2-40B4-BE49-F238E27FC236}">
+                              <a16:creationId xmlns:a16="http://schemas.microsoft.com/office/drawing/2014/main" id="{43F5A388-22BF-5D4F-AC8D-60D715905D15}"/>
+                            </a:ext>
+                          </a:extLst>
+                        </p:cNvPr>
+                        <p:cNvSpPr txBox="1"/>
+                        <p:nvPr/>
+                      </p:nvSpPr>
+                      <p:spPr>
+                        <a:xfrm>
+                          <a:off x="652117" y="919217"/>
+                          <a:ext cx="1246110" cy="345159"/>
+                        </a:xfrm>
+                        <a:prstGeom prst="rect">
+                          <a:avLst/>
+                        </a:prstGeom>
+                        <a:noFill/>
+                      </p:spPr>
+                      <p:txBody>
+                        <a:bodyPr wrap="none" lIns="0" tIns="0" rIns="0" bIns="0" rtlCol="0">
+                          <a:spAutoFit/>
+                        </a:bodyPr>
+                        <a:lstStyle/>
+                        <a:p>
+                          <a:pPr/>
+                          <a14:m>
+                            <m:oMathPara xmlns:m="http://schemas.openxmlformats.org/officeDocument/2006/math">
+                              <m:oMathParaPr>
+                                <m:jc m:val="centerGroup"/>
+                              </m:oMathParaPr>
+                              <m:oMath xmlns:m="http://schemas.openxmlformats.org/officeDocument/2006/math">
+                                <m:r>
+                                  <a:rPr lang="en-CA" sz="2000" b="0" i="1" smtClean="0">
+                                    <a:solidFill>
+                                      <a:srgbClr val="00B0F0"/>
+                                    </a:solidFill>
+                                    <a:latin typeface="Cambria Math" panose="02040503050406030204" pitchFamily="18" charset="0"/>
+                                    <a:cs typeface="Arial" panose="020B0604020202020204" pitchFamily="34" charset="0"/>
+                                  </a:rPr>
+                                  <m:t>𝐼𝑛𝑑𝑢𝑐𝑒𝑑</m:t>
+                                </m:r>
+                                <m:r>
+                                  <a:rPr lang="en-CA" sz="2000" b="0" i="1" smtClean="0">
+                                    <a:solidFill>
+                                      <a:srgbClr val="00B0F0"/>
+                                    </a:solidFill>
+                                    <a:latin typeface="Cambria Math" panose="02040503050406030204" pitchFamily="18" charset="0"/>
+                                    <a:cs typeface="Arial" panose="020B0604020202020204" pitchFamily="34" charset="0"/>
+                                  </a:rPr>
+                                  <m:t> </m:t>
+                                </m:r>
+                                <m:acc>
+                                  <m:accPr>
+                                    <m:chr m:val="⃗"/>
+                                    <m:ctrlPr>
+                                      <a:rPr lang="en-US" sz="2000" b="0" i="1" smtClean="0">
+                                        <a:solidFill>
+                                          <a:srgbClr val="00B0F0"/>
+                                        </a:solidFill>
+                                        <a:latin typeface="Cambria Math" panose="02040503050406030204" pitchFamily="18" charset="0"/>
+                                        <a:cs typeface="Arial" panose="020B0604020202020204" pitchFamily="34" charset="0"/>
+                                      </a:rPr>
+                                    </m:ctrlPr>
+                                  </m:accPr>
+                                  <m:e>
+                                    <m:r>
+                                      <a:rPr lang="en-US" sz="2000" b="0" i="1" smtClean="0">
+                                        <a:solidFill>
+                                          <a:srgbClr val="00B0F0"/>
+                                        </a:solidFill>
+                                        <a:latin typeface="Cambria Math" panose="02040503050406030204" pitchFamily="18" charset="0"/>
+                                        <a:cs typeface="Arial" panose="020B0604020202020204" pitchFamily="34" charset="0"/>
+                                      </a:rPr>
+                                      <m:t>𝐵</m:t>
+                                    </m:r>
+                                  </m:e>
+                                </m:acc>
+                              </m:oMath>
+                            </m:oMathPara>
+                          </a14:m>
+                          <a:endParaRPr lang="en-US" sz="2000" dirty="0">
+                            <a:solidFill>
+                              <a:srgbClr val="00B0F0"/>
+                            </a:solidFill>
+                            <a:latin typeface="Arial" panose="020B0604020202020204" pitchFamily="34" charset="0"/>
+                            <a:cs typeface="Arial" panose="020B0604020202020204" pitchFamily="34" charset="0"/>
+                          </a:endParaRPr>
+                        </a:p>
+                      </p:txBody>
+                    </p:sp>
+                  </mc:Choice>
+                  <mc:Fallback>
+                    <p:sp>
+                      <p:nvSpPr>
+                        <p:cNvPr id="125" name="TextBox 124">
+                          <a:extLst>
+                            <a:ext uri="{FF2B5EF4-FFF2-40B4-BE49-F238E27FC236}">
+                              <a16:creationId xmlns:a16="http://schemas.microsoft.com/office/drawing/2014/main" id="{43F5A388-22BF-5D4F-AC8D-60D715905D15}"/>
+                            </a:ext>
+                          </a:extLst>
+                        </p:cNvPr>
+                        <p:cNvSpPr txBox="1">
+                          <a:spLocks noRot="1" noChangeAspect="1" noMove="1" noResize="1" noEditPoints="1" noAdjustHandles="1" noChangeArrowheads="1" noChangeShapeType="1" noTextEdit="1"/>
+                        </p:cNvSpPr>
+                        <p:nvPr/>
+                      </p:nvSpPr>
+                      <p:spPr>
+                        <a:xfrm>
+                          <a:off x="652117" y="919217"/>
+                          <a:ext cx="1246110" cy="345159"/>
+                        </a:xfrm>
+                        <a:prstGeom prst="rect">
+                          <a:avLst/>
+                        </a:prstGeom>
+                        <a:blipFill>
+                          <a:blip r:embed="rId9"/>
+                          <a:stretch>
+                            <a:fillRect l="-4040" r="-2020" b="-32143"/>
+                          </a:stretch>
+                        </a:blipFill>
+                      </p:spPr>
+                      <p:txBody>
+                        <a:bodyPr/>
+                        <a:lstStyle/>
+                        <a:p>
+                          <a:r>
+                            <a:rPr lang="en-US">
+                              <a:noFill/>
+                            </a:rPr>
+                            <a:t> </a:t>
+                          </a:r>
+                        </a:p>
+                      </p:txBody>
+                    </p:sp>
+                  </mc:Fallback>
+                </mc:AlternateContent>
+              </p:grpSp>
+              <p:cxnSp>
+                <p:nvCxnSpPr>
+                  <p:cNvPr id="122" name="Straight Arrow Connector 121">
+                    <a:extLst>
+                      <a:ext uri="{FF2B5EF4-FFF2-40B4-BE49-F238E27FC236}">
+                        <a16:creationId xmlns:a16="http://schemas.microsoft.com/office/drawing/2014/main" id="{22A32BB2-BD43-574D-8E53-6A5CCA4EC94B}"/>
+                      </a:ext>
+                    </a:extLst>
+                  </p:cNvPr>
+                  <p:cNvCxnSpPr/>
+                  <p:nvPr/>
+                </p:nvCxnSpPr>
+                <p:spPr>
+                  <a:xfrm flipV="1">
+                    <a:off x="7629940" y="2294299"/>
+                    <a:ext cx="1362" cy="1277258"/>
+                  </a:xfrm>
+                  <a:prstGeom prst="straightConnector1">
+                    <a:avLst/>
+                  </a:prstGeom>
+                  <a:ln w="25400">
+                    <a:solidFill>
+                      <a:srgbClr val="00B0F0"/>
+                    </a:solidFill>
+                    <a:tailEnd type="triangle"/>
+                  </a:ln>
+                </p:spPr>
+                <p:style>
+                  <a:lnRef idx="1">
+                    <a:schemeClr val="accent1"/>
+                  </a:lnRef>
+                  <a:fillRef idx="0">
+                    <a:schemeClr val="accent1"/>
+                  </a:fillRef>
+                  <a:effectRef idx="0">
+                    <a:schemeClr val="accent1"/>
+                  </a:effectRef>
+                  <a:fontRef idx="minor">
+                    <a:schemeClr val="tx1"/>
+                  </a:fontRef>
+                </p:style>
+              </p:cxnSp>
+              <p:cxnSp>
+                <p:nvCxnSpPr>
+                  <p:cNvPr id="123" name="Straight Arrow Connector 122">
+                    <a:extLst>
+                      <a:ext uri="{FF2B5EF4-FFF2-40B4-BE49-F238E27FC236}">
+                        <a16:creationId xmlns:a16="http://schemas.microsoft.com/office/drawing/2014/main" id="{74A696CD-759B-8C47-88BC-9D356065D68C}"/>
+                      </a:ext>
+                    </a:extLst>
+                  </p:cNvPr>
+                  <p:cNvCxnSpPr/>
+                  <p:nvPr/>
+                </p:nvCxnSpPr>
+                <p:spPr>
+                  <a:xfrm flipV="1">
+                    <a:off x="8263458" y="2126478"/>
+                    <a:ext cx="1362" cy="1277258"/>
+                  </a:xfrm>
+                  <a:prstGeom prst="straightConnector1">
+                    <a:avLst/>
+                  </a:prstGeom>
+                  <a:ln w="25400">
+                    <a:solidFill>
+                      <a:srgbClr val="00B0F0"/>
+                    </a:solidFill>
+                    <a:tailEnd type="triangle"/>
+                  </a:ln>
+                </p:spPr>
+                <p:style>
+                  <a:lnRef idx="1">
+                    <a:schemeClr val="accent1"/>
+                  </a:lnRef>
+                  <a:fillRef idx="0">
+                    <a:schemeClr val="accent1"/>
+                  </a:fillRef>
+                  <a:effectRef idx="0">
+                    <a:schemeClr val="accent1"/>
+                  </a:effectRef>
+                  <a:fontRef idx="minor">
+                    <a:schemeClr val="tx1"/>
+                  </a:fontRef>
+                </p:style>
+              </p:cxnSp>
+            </p:grpSp>
+            <p:cxnSp>
+              <p:nvCxnSpPr>
+                <p:cNvPr id="117" name="Straight Connector 116">
+                  <a:extLst>
+                    <a:ext uri="{FF2B5EF4-FFF2-40B4-BE49-F238E27FC236}">
+                      <a16:creationId xmlns:a16="http://schemas.microsoft.com/office/drawing/2014/main" id="{F404B57D-E10D-0B4C-B27A-8C6F49B61979}"/>
+                    </a:ext>
+                  </a:extLst>
+                </p:cNvPr>
+                <p:cNvCxnSpPr/>
+                <p:nvPr/>
+              </p:nvCxnSpPr>
+              <p:spPr>
+                <a:xfrm rot="17110431">
+                  <a:off x="7301060" y="2884501"/>
+                  <a:ext cx="132203" cy="176270"/>
+                </a:xfrm>
+                <a:prstGeom prst="line">
+                  <a:avLst/>
+                </a:prstGeom>
+                <a:ln w="38100">
+                  <a:solidFill>
+                    <a:schemeClr val="tx1"/>
+                  </a:solidFill>
+                </a:ln>
+              </p:spPr>
+              <p:style>
+                <a:lnRef idx="1">
+                  <a:schemeClr val="accent1"/>
+                </a:lnRef>
+                <a:fillRef idx="0">
+                  <a:schemeClr val="accent1"/>
+                </a:fillRef>
+                <a:effectRef idx="0">
+                  <a:schemeClr val="accent1"/>
+                </a:effectRef>
+                <a:fontRef idx="minor">
+                  <a:schemeClr val="tx1"/>
+                </a:fontRef>
+              </p:style>
+            </p:cxnSp>
+            <p:cxnSp>
+              <p:nvCxnSpPr>
+                <p:cNvPr id="118" name="Straight Connector 117">
+                  <a:extLst>
+                    <a:ext uri="{FF2B5EF4-FFF2-40B4-BE49-F238E27FC236}">
+                      <a16:creationId xmlns:a16="http://schemas.microsoft.com/office/drawing/2014/main" id="{001B950A-E15C-DE4B-AC04-29693E6014AB}"/>
+                    </a:ext>
+                  </a:extLst>
+                </p:cNvPr>
+                <p:cNvCxnSpPr/>
+                <p:nvPr/>
+              </p:nvCxnSpPr>
+              <p:spPr>
+                <a:xfrm rot="17110431" flipH="1">
+                  <a:off x="7283983" y="2983998"/>
+                  <a:ext cx="112390" cy="176270"/>
+                </a:xfrm>
+                <a:prstGeom prst="line">
+                  <a:avLst/>
+                </a:prstGeom>
+                <a:ln w="38100">
+                  <a:solidFill>
+                    <a:schemeClr val="tx1"/>
+                  </a:solidFill>
+                </a:ln>
+              </p:spPr>
+              <p:style>
+                <a:lnRef idx="1">
+                  <a:schemeClr val="accent1"/>
+                </a:lnRef>
+                <a:fillRef idx="0">
+                  <a:schemeClr val="accent1"/>
+                </a:fillRef>
+                <a:effectRef idx="0">
+                  <a:schemeClr val="accent1"/>
+                </a:effectRef>
+                <a:fontRef idx="minor">
+                  <a:schemeClr val="tx1"/>
+                </a:fontRef>
+              </p:style>
+            </p:cxnSp>
+          </p:grpSp>
+          <p:cxnSp>
+            <p:nvCxnSpPr>
+              <p:cNvPr id="132" name="Straight Connector 131">
+                <a:extLst>
+                  <a:ext uri="{FF2B5EF4-FFF2-40B4-BE49-F238E27FC236}">
+                    <a16:creationId xmlns:a16="http://schemas.microsoft.com/office/drawing/2014/main" id="{70A7AF6E-56D4-2E43-994B-2C970871E36F}"/>
+                  </a:ext>
+                </a:extLst>
+              </p:cNvPr>
+              <p:cNvCxnSpPr>
+                <a:cxnSpLocks/>
+              </p:cNvCxnSpPr>
+              <p:nvPr/>
+            </p:nvCxnSpPr>
+            <p:spPr>
+              <a:xfrm>
+                <a:off x="9768785" y="4073293"/>
+                <a:ext cx="237304" cy="98530"/>
+              </a:xfrm>
+              <a:prstGeom prst="line">
+                <a:avLst/>
+              </a:prstGeom>
+              <a:ln w="38100">
+                <a:solidFill>
+                  <a:schemeClr val="tx1"/>
+                </a:solidFill>
+              </a:ln>
+            </p:spPr>
+            <p:style>
+              <a:lnRef idx="1">
+                <a:schemeClr val="accent1"/>
+              </a:lnRef>
+              <a:fillRef idx="0">
+                <a:schemeClr val="accent1"/>
+              </a:fillRef>
+              <a:effectRef idx="0">
+                <a:schemeClr val="accent1"/>
+              </a:effectRef>
+              <a:fontRef idx="minor">
+                <a:schemeClr val="tx1"/>
+              </a:fontRef>
+            </p:style>
+          </p:cxnSp>
+          <p:cxnSp>
+            <p:nvCxnSpPr>
+              <p:cNvPr id="133" name="Straight Connector 132">
+                <a:extLst>
+                  <a:ext uri="{FF2B5EF4-FFF2-40B4-BE49-F238E27FC236}">
+                    <a16:creationId xmlns:a16="http://schemas.microsoft.com/office/drawing/2014/main" id="{81BED57E-726B-7A46-A363-F257207F38DA}"/>
+                  </a:ext>
+                </a:extLst>
+              </p:cNvPr>
+              <p:cNvCxnSpPr>
+                <a:cxnSpLocks/>
+              </p:cNvCxnSpPr>
+              <p:nvPr/>
+            </p:nvCxnSpPr>
+            <p:spPr>
+              <a:xfrm flipH="1">
+                <a:off x="9790955" y="4178939"/>
+                <a:ext cx="198965" cy="112711"/>
+              </a:xfrm>
+              <a:prstGeom prst="line">
+                <a:avLst/>
+              </a:prstGeom>
+              <a:ln w="38100">
+                <a:solidFill>
+                  <a:schemeClr val="tx1"/>
+                </a:solidFill>
+              </a:ln>
+            </p:spPr>
+            <p:style>
+              <a:lnRef idx="1">
+                <a:schemeClr val="accent1"/>
+              </a:lnRef>
+              <a:fillRef idx="0">
+                <a:schemeClr val="accent1"/>
+              </a:fillRef>
+              <a:effectRef idx="0">
+                <a:schemeClr val="accent1"/>
+              </a:effectRef>
+              <a:fontRef idx="minor">
+                <a:schemeClr val="tx1"/>
+              </a:fontRef>
+            </p:style>
+          </p:cxnSp>
+        </p:grpSp>
+      </p:grpSp>
+      <mc:AlternateContent xmlns:mc="http://schemas.openxmlformats.org/markup-compatibility/2006">
+        <mc:Choice xmlns:a14="http://schemas.microsoft.com/office/drawing/2010/main" Requires="a14">
+          <p:sp>
+            <p:nvSpPr>
+              <p:cNvPr id="141" name="TextBox 140">
+                <a:extLst>
+                  <a:ext uri="{FF2B5EF4-FFF2-40B4-BE49-F238E27FC236}">
+                    <a16:creationId xmlns:a16="http://schemas.microsoft.com/office/drawing/2014/main" id="{48669BE5-175C-9644-BFF5-0C5F5B26F126}"/>
+                  </a:ext>
+                </a:extLst>
+              </p:cNvPr>
+              <p:cNvSpPr txBox="1"/>
+              <p:nvPr/>
+            </p:nvSpPr>
+            <p:spPr>
+              <a:xfrm>
+                <a:off x="2722529" y="4608671"/>
+                <a:ext cx="431080" cy="307777"/>
+              </a:xfrm>
+              <a:prstGeom prst="rect">
+                <a:avLst/>
+              </a:prstGeom>
+              <a:noFill/>
+            </p:spPr>
+            <p:txBody>
+              <a:bodyPr wrap="none" lIns="0" tIns="0" rIns="0" bIns="0" rtlCol="0">
+                <a:spAutoFit/>
+              </a:bodyPr>
+              <a:lstStyle/>
+              <a:p>
+                <a14:m>
+                  <m:oMathPara xmlns:m="http://schemas.openxmlformats.org/officeDocument/2006/math">
+                    <m:oMathParaPr>
+                      <m:jc m:val="centerGroup"/>
+                    </m:oMathParaPr>
+                    <m:oMath xmlns:m="http://schemas.openxmlformats.org/officeDocument/2006/math">
+                      <m:r>
+                        <a:rPr lang="en-CA" sz="2000" b="0" i="1" smtClean="0">
+                          <a:latin typeface="Cambria Math" panose="02040503050406030204" pitchFamily="18" charset="0"/>
+                          <a:cs typeface="Arial" panose="020B0604020202020204" pitchFamily="34" charset="0"/>
+                        </a:rPr>
+                        <m:t>(</m:t>
+                      </m:r>
+                      <m:r>
+                        <a:rPr lang="en-CA" sz="2000" b="0" i="1" smtClean="0">
+                          <a:latin typeface="Cambria Math" panose="02040503050406030204" pitchFamily="18" charset="0"/>
+                          <a:cs typeface="Arial" panose="020B0604020202020204" pitchFamily="34" charset="0"/>
+                        </a:rPr>
+                        <m:t>𝑎</m:t>
+                      </m:r>
+                      <m:r>
+                        <a:rPr lang="en-CA" sz="2000" b="0" i="1" smtClean="0">
+                          <a:latin typeface="Cambria Math" panose="02040503050406030204" pitchFamily="18" charset="0"/>
+                          <a:cs typeface="Arial" panose="020B0604020202020204" pitchFamily="34" charset="0"/>
+                        </a:rPr>
+                        <m:t>)</m:t>
+                      </m:r>
+                    </m:oMath>
+                  </m:oMathPara>
+                </a14:m>
+                <a:endParaRPr lang="en-US" sz="2000" dirty="0">
+                  <a:latin typeface="Arial" panose="020B0604020202020204" pitchFamily="34" charset="0"/>
+                  <a:cs typeface="Arial" panose="020B0604020202020204" pitchFamily="34" charset="0"/>
+                </a:endParaRPr>
+              </a:p>
+            </p:txBody>
+          </p:sp>
+        </mc:Choice>
+        <mc:Fallback>
+          <p:sp>
+            <p:nvSpPr>
+              <p:cNvPr id="141" name="TextBox 140">
+                <a:extLst>
+                  <a:ext uri="{FF2B5EF4-FFF2-40B4-BE49-F238E27FC236}">
+                    <a16:creationId xmlns:a16="http://schemas.microsoft.com/office/drawing/2014/main" id="{48669BE5-175C-9644-BFF5-0C5F5B26F126}"/>
+                  </a:ext>
+                </a:extLst>
+              </p:cNvPr>
+              <p:cNvSpPr txBox="1">
+                <a:spLocks noRot="1" noChangeAspect="1" noMove="1" noResize="1" noEditPoints="1" noAdjustHandles="1" noChangeArrowheads="1" noChangeShapeType="1" noTextEdit="1"/>
+              </p:cNvSpPr>
+              <p:nvPr/>
+            </p:nvSpPr>
+            <p:spPr>
+              <a:xfrm>
+                <a:off x="2722529" y="4608671"/>
+                <a:ext cx="431080" cy="307777"/>
+              </a:xfrm>
+              <a:prstGeom prst="rect">
+                <a:avLst/>
+              </a:prstGeom>
+              <a:blipFill>
+                <a:blip r:embed="rId10"/>
+                <a:stretch>
+                  <a:fillRect l="-17143" r="-17143" b="-32000"/>
+                </a:stretch>
+              </a:blipFill>
+            </p:spPr>
+            <p:txBody>
+              <a:bodyPr/>
+              <a:lstStyle/>
+              <a:p>
+                <a:r>
+                  <a:rPr lang="en-US">
+                    <a:noFill/>
+                  </a:rPr>
+                  <a:t> </a:t>
+                </a:r>
+              </a:p>
+            </p:txBody>
+          </p:sp>
+        </mc:Fallback>
+      </mc:AlternateContent>
+      <mc:AlternateContent xmlns:mc="http://schemas.openxmlformats.org/markup-compatibility/2006">
+        <mc:Choice xmlns:a14="http://schemas.microsoft.com/office/drawing/2010/main" Requires="a14">
+          <p:sp>
+            <p:nvSpPr>
+              <p:cNvPr id="142" name="TextBox 141">
+                <a:extLst>
+                  <a:ext uri="{FF2B5EF4-FFF2-40B4-BE49-F238E27FC236}">
+                    <a16:creationId xmlns:a16="http://schemas.microsoft.com/office/drawing/2014/main" id="{EB15AB6D-23FD-9F41-AD10-04D1B2701869}"/>
+                  </a:ext>
+                </a:extLst>
+              </p:cNvPr>
+              <p:cNvSpPr txBox="1"/>
+              <p:nvPr/>
+            </p:nvSpPr>
+            <p:spPr>
+              <a:xfrm>
+                <a:off x="6202198" y="4608671"/>
+                <a:ext cx="425629" cy="307777"/>
+              </a:xfrm>
+              <a:prstGeom prst="rect">
+                <a:avLst/>
+              </a:prstGeom>
+              <a:noFill/>
+            </p:spPr>
+            <p:txBody>
+              <a:bodyPr wrap="none" lIns="0" tIns="0" rIns="0" bIns="0" rtlCol="0">
+                <a:spAutoFit/>
+              </a:bodyPr>
+              <a:lstStyle/>
+              <a:p>
+                <a14:m>
+                  <m:oMathPara xmlns:m="http://schemas.openxmlformats.org/officeDocument/2006/math">
+                    <m:oMathParaPr>
+                      <m:jc m:val="centerGroup"/>
+                    </m:oMathParaPr>
+                    <m:oMath xmlns:m="http://schemas.openxmlformats.org/officeDocument/2006/math">
+                      <m:r>
+                        <a:rPr lang="en-CA" sz="2000" b="0" i="1" smtClean="0">
+                          <a:latin typeface="Cambria Math" panose="02040503050406030204" pitchFamily="18" charset="0"/>
+                          <a:cs typeface="Arial" panose="020B0604020202020204" pitchFamily="34" charset="0"/>
+                        </a:rPr>
+                        <m:t>(</m:t>
+                      </m:r>
+                      <m:r>
+                        <a:rPr lang="en-CA" sz="2000" b="0" i="1" smtClean="0">
+                          <a:latin typeface="Cambria Math" panose="02040503050406030204" pitchFamily="18" charset="0"/>
+                          <a:cs typeface="Arial" panose="020B0604020202020204" pitchFamily="34" charset="0"/>
+                        </a:rPr>
+                        <m:t>𝑏</m:t>
+                      </m:r>
+                      <m:r>
+                        <a:rPr lang="en-CA" sz="2000" b="0" i="1" smtClean="0">
+                          <a:latin typeface="Cambria Math" panose="02040503050406030204" pitchFamily="18" charset="0"/>
+                          <a:cs typeface="Arial" panose="020B0604020202020204" pitchFamily="34" charset="0"/>
+                        </a:rPr>
+                        <m:t>)</m:t>
+                      </m:r>
+                    </m:oMath>
+                  </m:oMathPara>
+                </a14:m>
+                <a:endParaRPr lang="en-US" sz="2000" dirty="0">
+                  <a:latin typeface="Arial" panose="020B0604020202020204" pitchFamily="34" charset="0"/>
+                  <a:cs typeface="Arial" panose="020B0604020202020204" pitchFamily="34" charset="0"/>
+                </a:endParaRPr>
+              </a:p>
+            </p:txBody>
+          </p:sp>
+        </mc:Choice>
+        <mc:Fallback>
+          <p:sp>
+            <p:nvSpPr>
+              <p:cNvPr id="142" name="TextBox 141">
+                <a:extLst>
+                  <a:ext uri="{FF2B5EF4-FFF2-40B4-BE49-F238E27FC236}">
+                    <a16:creationId xmlns:a16="http://schemas.microsoft.com/office/drawing/2014/main" id="{EB15AB6D-23FD-9F41-AD10-04D1B2701869}"/>
+                  </a:ext>
+                </a:extLst>
+              </p:cNvPr>
+              <p:cNvSpPr txBox="1">
+                <a:spLocks noRot="1" noChangeAspect="1" noMove="1" noResize="1" noEditPoints="1" noAdjustHandles="1" noChangeArrowheads="1" noChangeShapeType="1" noTextEdit="1"/>
+              </p:cNvSpPr>
+              <p:nvPr/>
+            </p:nvSpPr>
+            <p:spPr>
+              <a:xfrm>
+                <a:off x="6202198" y="4608671"/>
+                <a:ext cx="425629" cy="307777"/>
+              </a:xfrm>
+              <a:prstGeom prst="rect">
+                <a:avLst/>
+              </a:prstGeom>
+              <a:blipFill>
+                <a:blip r:embed="rId11"/>
+                <a:stretch>
+                  <a:fillRect l="-17143" r="-17143" b="-32000"/>
+                </a:stretch>
+              </a:blipFill>
+            </p:spPr>
+            <p:txBody>
+              <a:bodyPr/>
+              <a:lstStyle/>
+              <a:p>
+                <a:r>
+                  <a:rPr lang="en-US">
+                    <a:noFill/>
+                  </a:rPr>
+                  <a:t> </a:t>
+                </a:r>
+              </a:p>
+            </p:txBody>
+          </p:sp>
+        </mc:Fallback>
+      </mc:AlternateContent>
+      <mc:AlternateContent xmlns:mc="http://schemas.openxmlformats.org/markup-compatibility/2006">
+        <mc:Choice xmlns:a14="http://schemas.microsoft.com/office/drawing/2010/main" Requires="a14">
+          <p:sp>
+            <p:nvSpPr>
+              <p:cNvPr id="143" name="TextBox 142">
+                <a:extLst>
+                  <a:ext uri="{FF2B5EF4-FFF2-40B4-BE49-F238E27FC236}">
+                    <a16:creationId xmlns:a16="http://schemas.microsoft.com/office/drawing/2014/main" id="{52920866-92F2-8348-B4CB-FF339F35DA96}"/>
+                  </a:ext>
+                </a:extLst>
+              </p:cNvPr>
+              <p:cNvSpPr txBox="1"/>
+              <p:nvPr/>
+            </p:nvSpPr>
+            <p:spPr>
+              <a:xfrm>
+                <a:off x="10643390" y="4608671"/>
+                <a:ext cx="408894" cy="307777"/>
+              </a:xfrm>
+              <a:prstGeom prst="rect">
+                <a:avLst/>
+              </a:prstGeom>
+              <a:noFill/>
+            </p:spPr>
+            <p:txBody>
+              <a:bodyPr wrap="none" lIns="0" tIns="0" rIns="0" bIns="0" rtlCol="0">
+                <a:spAutoFit/>
+              </a:bodyPr>
+              <a:lstStyle/>
+              <a:p>
+                <a14:m>
+                  <m:oMathPara xmlns:m="http://schemas.openxmlformats.org/officeDocument/2006/math">
+                    <m:oMathParaPr>
+                      <m:jc m:val="centerGroup"/>
+                    </m:oMathParaPr>
+                    <m:oMath xmlns:m="http://schemas.openxmlformats.org/officeDocument/2006/math">
+                      <m:r>
+                        <a:rPr lang="en-CA" sz="2000" b="0" i="1" smtClean="0">
+                          <a:latin typeface="Cambria Math" panose="02040503050406030204" pitchFamily="18" charset="0"/>
+                          <a:cs typeface="Arial" panose="020B0604020202020204" pitchFamily="34" charset="0"/>
+                        </a:rPr>
+                        <m:t>(</m:t>
+                      </m:r>
+                      <m:r>
+                        <a:rPr lang="en-CA" sz="2000" b="0" i="1" smtClean="0">
+                          <a:latin typeface="Cambria Math" panose="02040503050406030204" pitchFamily="18" charset="0"/>
+                          <a:cs typeface="Arial" panose="020B0604020202020204" pitchFamily="34" charset="0"/>
+                        </a:rPr>
+                        <m:t>𝑐</m:t>
+                      </m:r>
+                      <m:r>
+                        <a:rPr lang="en-CA" sz="2000" b="0" i="1" smtClean="0">
+                          <a:latin typeface="Cambria Math" panose="02040503050406030204" pitchFamily="18" charset="0"/>
+                          <a:cs typeface="Arial" panose="020B0604020202020204" pitchFamily="34" charset="0"/>
+                        </a:rPr>
+                        <m:t>)</m:t>
+                      </m:r>
+                    </m:oMath>
+                  </m:oMathPara>
+                </a14:m>
+                <a:endParaRPr lang="en-US" sz="2000" dirty="0">
+                  <a:latin typeface="Arial" panose="020B0604020202020204" pitchFamily="34" charset="0"/>
+                  <a:cs typeface="Arial" panose="020B0604020202020204" pitchFamily="34" charset="0"/>
+                </a:endParaRPr>
+              </a:p>
+            </p:txBody>
+          </p:sp>
+        </mc:Choice>
+        <mc:Fallback>
+          <p:sp>
+            <p:nvSpPr>
+              <p:cNvPr id="143" name="TextBox 142">
+                <a:extLst>
+                  <a:ext uri="{FF2B5EF4-FFF2-40B4-BE49-F238E27FC236}">
+                    <a16:creationId xmlns:a16="http://schemas.microsoft.com/office/drawing/2014/main" id="{52920866-92F2-8348-B4CB-FF339F35DA96}"/>
+                  </a:ext>
+                </a:extLst>
+              </p:cNvPr>
+              <p:cNvSpPr txBox="1">
+                <a:spLocks noRot="1" noChangeAspect="1" noMove="1" noResize="1" noEditPoints="1" noAdjustHandles="1" noChangeArrowheads="1" noChangeShapeType="1" noTextEdit="1"/>
+              </p:cNvSpPr>
+              <p:nvPr/>
+            </p:nvSpPr>
+            <p:spPr>
+              <a:xfrm>
+                <a:off x="10643390" y="4608671"/>
+                <a:ext cx="408894" cy="307777"/>
+              </a:xfrm>
+              <a:prstGeom prst="rect">
+                <a:avLst/>
+              </a:prstGeom>
+              <a:blipFill>
+                <a:blip r:embed="rId12"/>
+                <a:stretch>
+                  <a:fillRect l="-18182" r="-18182" b="-32000"/>
+                </a:stretch>
+              </a:blipFill>
+            </p:spPr>
+            <p:txBody>
+              <a:bodyPr/>
+              <a:lstStyle/>
+              <a:p>
+                <a:r>
+                  <a:rPr lang="en-US">
+                    <a:noFill/>
+                  </a:rPr>
+                  <a:t> </a:t>
+                </a:r>
+              </a:p>
+            </p:txBody>
+          </p:sp>
+        </mc:Fallback>
+      </mc:AlternateContent>
+    </p:spTree>
+    <p:extLst>
+      <p:ext uri="{BB962C8B-B14F-4D97-AF65-F5344CB8AC3E}">
+        <p14:creationId xmlns:p14="http://schemas.microsoft.com/office/powerpoint/2010/main" val="1135091936"/>
       </p:ext>
     </p:extLst>
   </p:cSld>
@@ -51871,8 +55506,8 @@
             </a:fontRef>
           </p:style>
         </p:cxnSp>
-        <mc:AlternateContent xmlns:mc="http://schemas.openxmlformats.org/markup-compatibility/2006">
-          <mc:Choice xmlns:a14="http://schemas.microsoft.com/office/drawing/2010/main" Requires="a14">
+        <mc:AlternateContent xmlns:mc="http://schemas.openxmlformats.org/markup-compatibility/2006" xmlns:a14="http://schemas.microsoft.com/office/drawing/2010/main">
+          <mc:Choice Requires="a14">
             <p:sp>
               <p:nvSpPr>
                 <p:cNvPr id="47" name="TextBox 46">
@@ -51939,7 +55574,7 @@
               </p:txBody>
             </p:sp>
           </mc:Choice>
-          <mc:Fallback>
+          <mc:Fallback xmlns="">
             <p:sp>
               <p:nvSpPr>
                 <p:cNvPr id="47" name="TextBox 46">
@@ -51984,8 +55619,8 @@
             </p:sp>
           </mc:Fallback>
         </mc:AlternateContent>
-        <mc:AlternateContent xmlns:mc="http://schemas.openxmlformats.org/markup-compatibility/2006">
-          <mc:Choice xmlns:a14="http://schemas.microsoft.com/office/drawing/2010/main" Requires="a14">
+        <mc:AlternateContent xmlns:mc="http://schemas.openxmlformats.org/markup-compatibility/2006" xmlns:a14="http://schemas.microsoft.com/office/drawing/2010/main">
+          <mc:Choice Requires="a14">
             <p:sp>
               <p:nvSpPr>
                 <p:cNvPr id="69" name="TextBox 68">
@@ -52067,7 +55702,7 @@
               </p:txBody>
             </p:sp>
           </mc:Choice>
-          <mc:Fallback>
+          <mc:Fallback xmlns="">
             <p:sp>
               <p:nvSpPr>
                 <p:cNvPr id="69" name="TextBox 68">

</xml_diff>